<commit_message>
atualização slides de aulass 12Set2023
</commit_message>
<xml_diff>
--- a/01 Classes/Aula 11 Programação Python - Classes - Orientação a Objetos.pptx
+++ b/01 Classes/Aula 11 Programação Python - Classes - Orientação a Objetos.pptx
@@ -15,8 +15,8 @@
     <p:sldId id="352" r:id="rId6"/>
     <p:sldId id="353" r:id="rId7"/>
     <p:sldId id="354" r:id="rId8"/>
-    <p:sldId id="355" r:id="rId9"/>
-    <p:sldId id="356" r:id="rId10"/>
+    <p:sldId id="356" r:id="rId9"/>
+    <p:sldId id="355" r:id="rId10"/>
     <p:sldId id="357" r:id="rId11"/>
     <p:sldId id="358" r:id="rId12"/>
     <p:sldId id="359" r:id="rId13"/>
@@ -2105,7 +2105,7 @@
     </p:spTree>
     <p:extLst>
       <p:ext uri="{BB962C8B-B14F-4D97-AF65-F5344CB8AC3E}">
-        <p14:creationId xmlns:p14="http://schemas.microsoft.com/office/powerpoint/2010/main" val="983952286"/>
+        <p14:creationId xmlns:p14="http://schemas.microsoft.com/office/powerpoint/2010/main" val="1407899389"/>
       </p:ext>
     </p:extLst>
   </p:cSld>
@@ -2171,7 +2171,7 @@
     </p:spTree>
     <p:extLst>
       <p:ext uri="{BB962C8B-B14F-4D97-AF65-F5344CB8AC3E}">
-        <p14:creationId xmlns:p14="http://schemas.microsoft.com/office/powerpoint/2010/main" val="1407899389"/>
+        <p14:creationId xmlns:p14="http://schemas.microsoft.com/office/powerpoint/2010/main" val="983952286"/>
       </p:ext>
     </p:extLst>
   </p:cSld>
@@ -2452,7 +2452,7 @@
           <a:p>
             <a:fld id="{48A87A34-81AB-432B-8DAE-1953F412C126}" type="datetimeFigureOut">
               <a:rPr lang="en-US" smtClean="0"/>
-              <a:t>5/16/2022</a:t>
+              <a:t>9/12/2023</a:t>
             </a:fld>
             <a:endParaRPr lang="en-US" dirty="0"/>
           </a:p>
@@ -2663,7 +2663,7 @@
           <a:p>
             <a:fld id="{48A87A34-81AB-432B-8DAE-1953F412C126}" type="datetimeFigureOut">
               <a:rPr lang="en-US" smtClean="0"/>
-              <a:t>5/16/2022</a:t>
+              <a:t>9/12/2023</a:t>
             </a:fld>
             <a:endParaRPr lang="en-US" dirty="0"/>
           </a:p>
@@ -2878,7 +2878,7 @@
           <a:p>
             <a:fld id="{48A87A34-81AB-432B-8DAE-1953F412C126}" type="datetimeFigureOut">
               <a:rPr lang="en-US" smtClean="0"/>
-              <a:t>5/16/2022</a:t>
+              <a:t>9/12/2023</a:t>
             </a:fld>
             <a:endParaRPr lang="en-US" dirty="0"/>
           </a:p>
@@ -3246,7 +3246,7 @@
           <a:p>
             <a:fld id="{48A87A34-81AB-432B-8DAE-1953F412C126}" type="datetimeFigureOut">
               <a:rPr lang="en-US" smtClean="0"/>
-              <a:t>5/16/2022</a:t>
+              <a:t>9/12/2023</a:t>
             </a:fld>
             <a:endParaRPr lang="en-US" dirty="0"/>
           </a:p>
@@ -3525,7 +3525,7 @@
           <a:p>
             <a:fld id="{48A87A34-81AB-432B-8DAE-1953F412C126}" type="datetimeFigureOut">
               <a:rPr lang="en-US" smtClean="0"/>
-              <a:t>5/16/2022</a:t>
+              <a:t>9/12/2023</a:t>
             </a:fld>
             <a:endParaRPr lang="en-US" dirty="0"/>
           </a:p>
@@ -3793,7 +3793,7 @@
           <a:p>
             <a:fld id="{48A87A34-81AB-432B-8DAE-1953F412C126}" type="datetimeFigureOut">
               <a:rPr lang="en-US" smtClean="0"/>
-              <a:t>5/16/2022</a:t>
+              <a:t>9/12/2023</a:t>
             </a:fld>
             <a:endParaRPr lang="en-US" dirty="0"/>
           </a:p>
@@ -4209,7 +4209,7 @@
           <a:p>
             <a:fld id="{48A87A34-81AB-432B-8DAE-1953F412C126}" type="datetimeFigureOut">
               <a:rPr lang="en-US" smtClean="0"/>
-              <a:t>5/16/2022</a:t>
+              <a:t>9/12/2023</a:t>
             </a:fld>
             <a:endParaRPr lang="en-US" dirty="0"/>
           </a:p>
@@ -4358,7 +4358,7 @@
           <a:p>
             <a:fld id="{48A87A34-81AB-432B-8DAE-1953F412C126}" type="datetimeFigureOut">
               <a:rPr lang="en-US" smtClean="0"/>
-              <a:t>5/16/2022</a:t>
+              <a:t>9/12/2023</a:t>
             </a:fld>
             <a:endParaRPr lang="en-US" dirty="0"/>
           </a:p>
@@ -4484,7 +4484,7 @@
           <a:p>
             <a:fld id="{48A87A34-81AB-432B-8DAE-1953F412C126}" type="datetimeFigureOut">
               <a:rPr lang="en-US" smtClean="0"/>
-              <a:t>5/16/2022</a:t>
+              <a:t>9/12/2023</a:t>
             </a:fld>
             <a:endParaRPr lang="en-US" dirty="0"/>
           </a:p>
@@ -4735,7 +4735,7 @@
           <a:p>
             <a:fld id="{48A87A34-81AB-432B-8DAE-1953F412C126}" type="datetimeFigureOut">
               <a:rPr lang="en-US" smtClean="0"/>
-              <a:t>5/16/2022</a:t>
+              <a:t>9/12/2023</a:t>
             </a:fld>
             <a:endParaRPr lang="en-US" dirty="0"/>
           </a:p>
@@ -5181,7 +5181,7 @@
             <a:fld id="{48A87A34-81AB-432B-8DAE-1953F412C126}" type="datetimeFigureOut">
               <a:rPr lang="en-US" smtClean="0"/>
               <a:pPr/>
-              <a:t>5/16/2022</a:t>
+              <a:t>9/12/2023</a:t>
             </a:fld>
             <a:endParaRPr lang="en-US" dirty="0"/>
           </a:p>
@@ -5509,7 +5509,7 @@
             <a:fld id="{48A87A34-81AB-432B-8DAE-1953F412C126}" type="datetimeFigureOut">
               <a:rPr lang="en-US" smtClean="0"/>
               <a:pPr/>
-              <a:t>5/16/2022</a:t>
+              <a:t>9/12/2023</a:t>
             </a:fld>
             <a:endParaRPr lang="en-US" dirty="0"/>
           </a:p>
@@ -10527,6 +10527,9 @@
             </a:r>
             <a:r>
               <a:rPr lang="pt-BR" sz="2000" b="1" dirty="0">
+                <a:solidFill>
+                  <a:srgbClr val="0070C0"/>
+                </a:solidFill>
                 <a:latin typeface="Times New Roman" panose="02020603050405020304" pitchFamily="18" charset="0"/>
                 <a:cs typeface="Times New Roman" panose="02020603050405020304" pitchFamily="18" charset="0"/>
               </a:rPr>
@@ -10805,6 +10808,9 @@
             </a:r>
             <a:r>
               <a:rPr lang="pt-BR" sz="2000" b="1" dirty="0">
+                <a:solidFill>
+                  <a:srgbClr val="0070C0"/>
+                </a:solidFill>
                 <a:latin typeface="Times New Roman" panose="02020603050405020304" pitchFamily="18" charset="0"/>
                 <a:cs typeface="Times New Roman" panose="02020603050405020304" pitchFamily="18" charset="0"/>
               </a:rPr>
@@ -11772,7 +11778,75 @@
                 <a:latin typeface="Times New Roman" panose="02020603050405020304" pitchFamily="18" charset="0"/>
                 <a:cs typeface="Times New Roman" panose="02020603050405020304" pitchFamily="18" charset="0"/>
               </a:rPr>
-              <a:t>(Julia’, ‘Digital Influencer’, </a:t>
+              <a:t>(</a:t>
+            </a:r>
+            <a:r>
+              <a:rPr lang="pt-BR" sz="2000" dirty="0">
+                <a:latin typeface="Times New Roman" panose="02020603050405020304" pitchFamily="18" charset="0"/>
+                <a:cs typeface="Times New Roman" panose="02020603050405020304" pitchFamily="18" charset="0"/>
+              </a:rPr>
+              <a:t>"</a:t>
+            </a:r>
+            <a:r>
+              <a:rPr lang="pt-BR" sz="2000" dirty="0">
+                <a:solidFill>
+                  <a:schemeClr val="tx1"/>
+                </a:solidFill>
+                <a:latin typeface="Times New Roman" panose="02020603050405020304" pitchFamily="18" charset="0"/>
+                <a:cs typeface="Times New Roman" panose="02020603050405020304" pitchFamily="18" charset="0"/>
+              </a:rPr>
+              <a:t>Julia</a:t>
+            </a:r>
+            <a:r>
+              <a:rPr lang="pt-BR" sz="2000" dirty="0">
+                <a:latin typeface="Times New Roman" panose="02020603050405020304" pitchFamily="18" charset="0"/>
+                <a:cs typeface="Times New Roman" panose="02020603050405020304" pitchFamily="18" charset="0"/>
+              </a:rPr>
+              <a:t>"</a:t>
+            </a:r>
+            <a:r>
+              <a:rPr lang="pt-BR" sz="2000" dirty="0">
+                <a:solidFill>
+                  <a:schemeClr val="tx1"/>
+                </a:solidFill>
+                <a:latin typeface="Times New Roman" panose="02020603050405020304" pitchFamily="18" charset="0"/>
+                <a:cs typeface="Times New Roman" panose="02020603050405020304" pitchFamily="18" charset="0"/>
+              </a:rPr>
+              <a:t>, </a:t>
+            </a:r>
+            <a:r>
+              <a:rPr lang="pt-BR" sz="2000" dirty="0">
+                <a:latin typeface="Times New Roman" panose="02020603050405020304" pitchFamily="18" charset="0"/>
+                <a:cs typeface="Times New Roman" panose="02020603050405020304" pitchFamily="18" charset="0"/>
+              </a:rPr>
+              <a:t>"</a:t>
+            </a:r>
+            <a:r>
+              <a:rPr lang="pt-BR" sz="2000">
+                <a:solidFill>
+                  <a:schemeClr val="tx1"/>
+                </a:solidFill>
+                <a:latin typeface="Times New Roman" panose="02020603050405020304" pitchFamily="18" charset="0"/>
+                <a:cs typeface="Times New Roman" panose="02020603050405020304" pitchFamily="18" charset="0"/>
+              </a:rPr>
+              <a:t>Digital Influencer</a:t>
+            </a:r>
+            <a:r>
+              <a:rPr lang="pt-BR" sz="2000">
+                <a:latin typeface="Times New Roman" panose="02020603050405020304" pitchFamily="18" charset="0"/>
+                <a:cs typeface="Times New Roman" panose="02020603050405020304" pitchFamily="18" charset="0"/>
+              </a:rPr>
+              <a:t>"</a:t>
+            </a:r>
+            <a:r>
+              <a:rPr lang="pt-BR" sz="2000">
+                <a:solidFill>
+                  <a:schemeClr val="tx1"/>
+                </a:solidFill>
+                <a:latin typeface="Times New Roman" panose="02020603050405020304" pitchFamily="18" charset="0"/>
+                <a:cs typeface="Times New Roman" panose="02020603050405020304" pitchFamily="18" charset="0"/>
+              </a:rPr>
+              <a:t>, </a:t>
             </a:r>
             <a:r>
               <a:rPr lang="pt-BR" sz="2000" b="1" dirty="0">
@@ -12659,7 +12733,55 @@
                 <a:latin typeface="Times New Roman" panose="02020603050405020304" pitchFamily="18" charset="0"/>
                 <a:cs typeface="Times New Roman" panose="02020603050405020304" pitchFamily="18" charset="0"/>
               </a:rPr>
-              <a:t>, em Python, é a capacidade que uma subclasse tem de ter métodos com o mesmo nome de sua superclasse, e o programa saber qual método deve ser invocado, especificamente (da super ou sub).</a:t>
+              <a:t>, em Python, é a capacidade que uma </a:t>
+            </a:r>
+            <a:r>
+              <a:rPr lang="pt-BR" sz="2000" b="1" dirty="0">
+                <a:latin typeface="Times New Roman" panose="02020603050405020304" pitchFamily="18" charset="0"/>
+                <a:cs typeface="Times New Roman" panose="02020603050405020304" pitchFamily="18" charset="0"/>
+              </a:rPr>
+              <a:t>subclasse</a:t>
+            </a:r>
+            <a:r>
+              <a:rPr lang="pt-BR" sz="2000" dirty="0">
+                <a:latin typeface="Times New Roman" panose="02020603050405020304" pitchFamily="18" charset="0"/>
+                <a:cs typeface="Times New Roman" panose="02020603050405020304" pitchFamily="18" charset="0"/>
+              </a:rPr>
+              <a:t> tem de ter </a:t>
+            </a:r>
+            <a:r>
+              <a:rPr lang="pt-BR" sz="2000" b="1" dirty="0">
+                <a:solidFill>
+                  <a:srgbClr val="0070C0"/>
+                </a:solidFill>
+                <a:latin typeface="Times New Roman" panose="02020603050405020304" pitchFamily="18" charset="0"/>
+                <a:cs typeface="Times New Roman" panose="02020603050405020304" pitchFamily="18" charset="0"/>
+              </a:rPr>
+              <a:t>métodos com o mesmo nome</a:t>
+            </a:r>
+            <a:r>
+              <a:rPr lang="pt-BR" sz="2000" dirty="0">
+                <a:latin typeface="Times New Roman" panose="02020603050405020304" pitchFamily="18" charset="0"/>
+                <a:cs typeface="Times New Roman" panose="02020603050405020304" pitchFamily="18" charset="0"/>
+              </a:rPr>
+              <a:t> de sua </a:t>
+            </a:r>
+            <a:r>
+              <a:rPr lang="pt-BR" sz="2000" b="1" dirty="0">
+                <a:solidFill>
+                  <a:srgbClr val="FF0000"/>
+                </a:solidFill>
+                <a:latin typeface="Times New Roman" panose="02020603050405020304" pitchFamily="18" charset="0"/>
+                <a:cs typeface="Times New Roman" panose="02020603050405020304" pitchFamily="18" charset="0"/>
+              </a:rPr>
+              <a:t>superclasse</a:t>
+            </a:r>
+            <a:r>
+              <a:rPr lang="pt-BR" sz="2000" dirty="0">
+                <a:latin typeface="Times New Roman" panose="02020603050405020304" pitchFamily="18" charset="0"/>
+                <a:cs typeface="Times New Roman" panose="02020603050405020304" pitchFamily="18" charset="0"/>
+              </a:rPr>
+              <a:t>, e o programa saber qual método deve ser invocado, especificamente (da super ou sub).</a:t>
             </a:r>
           </a:p>
           <a:p>
@@ -12680,7 +12802,52 @@
                 <a:latin typeface="Times New Roman" panose="02020603050405020304" pitchFamily="18" charset="0"/>
                 <a:cs typeface="Times New Roman" panose="02020603050405020304" pitchFamily="18" charset="0"/>
               </a:rPr>
-              <a:t>Ou seja, o objeto tem a capacidade de assumir diferentes formas (</a:t>
+              <a:t>Ou seja, o </a:t>
+            </a:r>
+            <a:r>
+              <a:rPr lang="pt-BR" sz="2000" b="1" dirty="0">
+                <a:latin typeface="Times New Roman" panose="02020603050405020304" pitchFamily="18" charset="0"/>
+                <a:cs typeface="Times New Roman" panose="02020603050405020304" pitchFamily="18" charset="0"/>
+              </a:rPr>
+              <a:t>objeto</a:t>
+            </a:r>
+            <a:r>
+              <a:rPr lang="pt-BR" sz="2000" dirty="0">
+                <a:latin typeface="Times New Roman" panose="02020603050405020304" pitchFamily="18" charset="0"/>
+                <a:cs typeface="Times New Roman" panose="02020603050405020304" pitchFamily="18" charset="0"/>
+              </a:rPr>
+              <a:t> tem a </a:t>
+            </a:r>
+            <a:r>
+              <a:rPr lang="pt-BR" sz="2000" b="1" dirty="0">
+                <a:latin typeface="Times New Roman" panose="02020603050405020304" pitchFamily="18" charset="0"/>
+                <a:cs typeface="Times New Roman" panose="02020603050405020304" pitchFamily="18" charset="0"/>
+              </a:rPr>
+              <a:t>capacidade</a:t>
+            </a:r>
+            <a:r>
+              <a:rPr lang="pt-BR" sz="2000" dirty="0">
+                <a:latin typeface="Times New Roman" panose="02020603050405020304" pitchFamily="18" charset="0"/>
+                <a:cs typeface="Times New Roman" panose="02020603050405020304" pitchFamily="18" charset="0"/>
+              </a:rPr>
+              <a:t> de </a:t>
+            </a:r>
+            <a:r>
+              <a:rPr lang="pt-BR" sz="2000" b="1" dirty="0">
+                <a:solidFill>
+                  <a:srgbClr val="0070C0"/>
+                </a:solidFill>
+                <a:latin typeface="Times New Roman" panose="02020603050405020304" pitchFamily="18" charset="0"/>
+                <a:cs typeface="Times New Roman" panose="02020603050405020304" pitchFamily="18" charset="0"/>
+              </a:rPr>
+              <a:t>assumir diferentes formas </a:t>
+            </a:r>
+            <a:r>
+              <a:rPr lang="pt-BR" sz="2000" dirty="0">
+                <a:latin typeface="Times New Roman" panose="02020603050405020304" pitchFamily="18" charset="0"/>
+                <a:cs typeface="Times New Roman" panose="02020603050405020304" pitchFamily="18" charset="0"/>
+              </a:rPr>
+              <a:t>(</a:t>
             </a:r>
             <a:r>
               <a:rPr lang="pt-BR" sz="2000" b="1" dirty="0">
@@ -14294,12 +14461,15 @@
                 <a:cs typeface="Times New Roman" panose="02020603050405020304" pitchFamily="18" charset="0"/>
                 <a:hlinkClick r:id="rId3"/>
               </a:rPr>
-              <a:t>https://www.w3schools.com/python/python_variables.asp</a:t>
-            </a:r>
-            <a:endParaRPr lang="pt-BR" sz="2400" dirty="0">
-              <a:latin typeface="Times New Roman" panose="02020603050405020304" pitchFamily="18" charset="0"/>
-              <a:cs typeface="Times New Roman" panose="02020603050405020304" pitchFamily="18" charset="0"/>
-            </a:endParaRPr>
+              <a:t>https://www.w3schools.com/python/python_classes.asp</a:t>
+            </a:r>
+            <a:r>
+              <a:rPr lang="pt-BR" sz="2400" dirty="0">
+                <a:latin typeface="Times New Roman" panose="02020603050405020304" pitchFamily="18" charset="0"/>
+                <a:cs typeface="Times New Roman" panose="02020603050405020304" pitchFamily="18" charset="0"/>
+              </a:rPr>
+              <a:t> </a:t>
+            </a:r>
           </a:p>
           <a:p>
             <a:pPr marL="0" indent="0" algn="just">
@@ -16796,7 +16966,21 @@
                 <a:latin typeface="Times New Roman" panose="02020603050405020304" pitchFamily="18" charset="0"/>
                 <a:cs typeface="Times New Roman" panose="02020603050405020304" pitchFamily="18" charset="0"/>
               </a:rPr>
-              <a:t>(“Julia", 17)</a:t>
+              <a:t>(</a:t>
+            </a:r>
+            <a:r>
+              <a:rPr lang="pt-BR" sz="2400" dirty="0">
+                <a:latin typeface="Times New Roman" panose="02020603050405020304" pitchFamily="18" charset="0"/>
+                <a:cs typeface="Times New Roman" panose="02020603050405020304" pitchFamily="18" charset="0"/>
+              </a:rPr>
+              <a:t>"</a:t>
+            </a:r>
+            <a:r>
+              <a:rPr lang="en-US" sz="2400" dirty="0">
+                <a:latin typeface="Times New Roman" panose="02020603050405020304" pitchFamily="18" charset="0"/>
+                <a:cs typeface="Times New Roman" panose="02020603050405020304" pitchFamily="18" charset="0"/>
+              </a:rPr>
+              <a:t>Julia", 17)</a:t>
             </a:r>
           </a:p>
           <a:p>
@@ -16906,13 +17090,16 @@
                   <a:srgbClr val="0070C0"/>
                 </a:solidFill>
               </a:rPr>
-              <a:t>metódos</a:t>
-            </a:r>
-            <a:endParaRPr lang="en-US" b="1" dirty="0">
-              <a:solidFill>
-                <a:srgbClr val="0070C0"/>
-              </a:solidFill>
-            </a:endParaRPr>
+              <a:t>Parâmetro</a:t>
+            </a:r>
+            <a:r>
+              <a:rPr lang="en-US" b="1" dirty="0">
+                <a:solidFill>
+                  <a:srgbClr val="0070C0"/>
+                </a:solidFill>
+              </a:rPr>
+              <a:t> SELF</a:t>
+            </a:r>
           </a:p>
         </p:txBody>
       </p:sp>
@@ -16942,73 +17129,66 @@
               <a:buNone/>
             </a:pPr>
             <a:r>
+              <a:rPr lang="pt-BR" sz="2400" dirty="0">
+                <a:latin typeface="Times New Roman" panose="02020603050405020304" pitchFamily="18" charset="0"/>
+                <a:cs typeface="Times New Roman" panose="02020603050405020304" pitchFamily="18" charset="0"/>
+              </a:rPr>
+              <a:t>O </a:t>
+            </a:r>
+            <a:r>
               <a:rPr lang="pt-BR" sz="2400" b="1" dirty="0">
-                <a:latin typeface="Times New Roman" panose="02020603050405020304" pitchFamily="18" charset="0"/>
-                <a:cs typeface="Times New Roman" panose="02020603050405020304" pitchFamily="18" charset="0"/>
-              </a:rPr>
-              <a:t>Objetos</a:t>
+                <a:solidFill>
+                  <a:srgbClr val="FF0000"/>
+                </a:solidFill>
+                <a:latin typeface="Times New Roman" panose="02020603050405020304" pitchFamily="18" charset="0"/>
+                <a:cs typeface="Times New Roman" panose="02020603050405020304" pitchFamily="18" charset="0"/>
+              </a:rPr>
+              <a:t>parâmetro self </a:t>
             </a:r>
             <a:r>
               <a:rPr lang="pt-BR" sz="2400" dirty="0">
                 <a:latin typeface="Times New Roman" panose="02020603050405020304" pitchFamily="18" charset="0"/>
                 <a:cs typeface="Times New Roman" panose="02020603050405020304" pitchFamily="18" charset="0"/>
               </a:rPr>
-              <a:t> também podem conter </a:t>
+              <a:t>é uma </a:t>
             </a:r>
             <a:r>
               <a:rPr lang="pt-BR" sz="2400" b="1" dirty="0">
-                <a:latin typeface="Times New Roman" panose="02020603050405020304" pitchFamily="18" charset="0"/>
-                <a:cs typeface="Times New Roman" panose="02020603050405020304" pitchFamily="18" charset="0"/>
-              </a:rPr>
-              <a:t>métodos</a:t>
+                <a:solidFill>
+                  <a:srgbClr val="FF0000"/>
+                </a:solidFill>
+                <a:latin typeface="Times New Roman" panose="02020603050405020304" pitchFamily="18" charset="0"/>
+                <a:cs typeface="Times New Roman" panose="02020603050405020304" pitchFamily="18" charset="0"/>
+              </a:rPr>
+              <a:t>referência à instância atual da classe</a:t>
             </a:r>
             <a:r>
               <a:rPr lang="pt-BR" sz="2400" dirty="0">
                 <a:latin typeface="Times New Roman" panose="02020603050405020304" pitchFamily="18" charset="0"/>
                 <a:cs typeface="Times New Roman" panose="02020603050405020304" pitchFamily="18" charset="0"/>
               </a:rPr>
-              <a:t>. </a:t>
+              <a:t> e é usado para acessar </a:t>
             </a:r>
             <a:r>
               <a:rPr lang="pt-BR" sz="2400" b="1" dirty="0">
-                <a:solidFill>
-                  <a:srgbClr val="FF0000"/>
-                </a:solidFill>
-                <a:latin typeface="Times New Roman" panose="02020603050405020304" pitchFamily="18" charset="0"/>
-                <a:cs typeface="Times New Roman" panose="02020603050405020304" pitchFamily="18" charset="0"/>
-              </a:rPr>
-              <a:t>Métodos</a:t>
+                <a:latin typeface="Times New Roman" panose="02020603050405020304" pitchFamily="18" charset="0"/>
+                <a:cs typeface="Times New Roman" panose="02020603050405020304" pitchFamily="18" charset="0"/>
+              </a:rPr>
+              <a:t>variáveis</a:t>
             </a:r>
             <a:r>
               <a:rPr lang="pt-BR" sz="2400" dirty="0">
                 <a:latin typeface="Times New Roman" panose="02020603050405020304" pitchFamily="18" charset="0"/>
                 <a:cs typeface="Times New Roman" panose="02020603050405020304" pitchFamily="18" charset="0"/>
               </a:rPr>
-              <a:t> em objetos </a:t>
+              <a:t> ​​que pertencem à </a:t>
             </a:r>
             <a:r>
               <a:rPr lang="pt-BR" sz="2400" b="1" dirty="0">
                 <a:latin typeface="Times New Roman" panose="02020603050405020304" pitchFamily="18" charset="0"/>
                 <a:cs typeface="Times New Roman" panose="02020603050405020304" pitchFamily="18" charset="0"/>
               </a:rPr>
-              <a:t>são funções</a:t>
-            </a:r>
-            <a:r>
-              <a:rPr lang="pt-BR" sz="2400" dirty="0">
-                <a:latin typeface="Times New Roman" panose="02020603050405020304" pitchFamily="18" charset="0"/>
-                <a:cs typeface="Times New Roman" panose="02020603050405020304" pitchFamily="18" charset="0"/>
-              </a:rPr>
-              <a:t> que pertencem ao </a:t>
-            </a:r>
-            <a:r>
-              <a:rPr lang="pt-BR" sz="2400" b="1" dirty="0">
-                <a:solidFill>
-                  <a:srgbClr val="FF0000"/>
-                </a:solidFill>
-                <a:latin typeface="Times New Roman" panose="02020603050405020304" pitchFamily="18" charset="0"/>
-                <a:cs typeface="Times New Roman" panose="02020603050405020304" pitchFamily="18" charset="0"/>
-              </a:rPr>
-              <a:t>objeto</a:t>
+              <a:t>classe</a:t>
             </a:r>
             <a:r>
               <a:rPr lang="pt-BR" sz="2400" dirty="0">
@@ -17032,164 +17212,67 @@
               <a:buNone/>
             </a:pPr>
             <a:r>
-              <a:rPr lang="en-US" sz="2400" dirty="0">
-                <a:latin typeface="Times New Roman" panose="02020603050405020304" pitchFamily="18" charset="0"/>
-                <a:cs typeface="Times New Roman" panose="02020603050405020304" pitchFamily="18" charset="0"/>
-              </a:rPr>
-              <a:t> </a:t>
-            </a:r>
-            <a:r>
-              <a:rPr lang="en-US" sz="2400" b="1" dirty="0">
-                <a:latin typeface="Times New Roman" panose="02020603050405020304" pitchFamily="18" charset="0"/>
-                <a:cs typeface="Times New Roman" panose="02020603050405020304" pitchFamily="18" charset="0"/>
-              </a:rPr>
-              <a:t>def</a:t>
-            </a:r>
-            <a:r>
-              <a:rPr lang="en-US" sz="2400" dirty="0">
-                <a:latin typeface="Times New Roman" panose="02020603050405020304" pitchFamily="18" charset="0"/>
-                <a:cs typeface="Times New Roman" panose="02020603050405020304" pitchFamily="18" charset="0"/>
-              </a:rPr>
-              <a:t> </a:t>
-            </a:r>
-            <a:r>
-              <a:rPr lang="en-US" sz="2400" b="1" dirty="0" err="1">
-                <a:solidFill>
-                  <a:srgbClr val="FF0000"/>
-                </a:solidFill>
-                <a:latin typeface="Times New Roman" panose="02020603050405020304" pitchFamily="18" charset="0"/>
-                <a:cs typeface="Times New Roman" panose="02020603050405020304" pitchFamily="18" charset="0"/>
-              </a:rPr>
-              <a:t>imprime_nome</a:t>
-            </a:r>
-            <a:r>
-              <a:rPr lang="en-US" sz="2400" dirty="0">
-                <a:latin typeface="Times New Roman" panose="02020603050405020304" pitchFamily="18" charset="0"/>
-                <a:cs typeface="Times New Roman" panose="02020603050405020304" pitchFamily="18" charset="0"/>
-              </a:rPr>
-              <a:t>(</a:t>
-            </a:r>
-            <a:r>
-              <a:rPr lang="en-US" sz="2400" b="1" dirty="0">
-                <a:latin typeface="Times New Roman" panose="02020603050405020304" pitchFamily="18" charset="0"/>
-                <a:cs typeface="Times New Roman" panose="02020603050405020304" pitchFamily="18" charset="0"/>
-              </a:rPr>
-              <a:t>self</a:t>
-            </a:r>
-            <a:r>
-              <a:rPr lang="en-US" sz="2400" dirty="0">
-                <a:latin typeface="Times New Roman" panose="02020603050405020304" pitchFamily="18" charset="0"/>
-                <a:cs typeface="Times New Roman" panose="02020603050405020304" pitchFamily="18" charset="0"/>
-              </a:rPr>
-              <a:t>):</a:t>
-            </a:r>
+              <a:rPr lang="pt-BR" sz="2400" dirty="0">
+                <a:latin typeface="Times New Roman" panose="02020603050405020304" pitchFamily="18" charset="0"/>
+                <a:cs typeface="Times New Roman" panose="02020603050405020304" pitchFamily="18" charset="0"/>
+              </a:rPr>
+              <a:t>Ele não precisa ser </a:t>
+            </a:r>
+            <a:r>
+              <a:rPr lang="pt-BR" sz="2400" b="1" dirty="0">
+                <a:latin typeface="Times New Roman" panose="02020603050405020304" pitchFamily="18" charset="0"/>
+                <a:cs typeface="Times New Roman" panose="02020603050405020304" pitchFamily="18" charset="0"/>
+              </a:rPr>
+              <a:t>nomeado self</a:t>
+            </a:r>
+            <a:r>
+              <a:rPr lang="pt-BR" sz="2400" dirty="0">
+                <a:latin typeface="Times New Roman" panose="02020603050405020304" pitchFamily="18" charset="0"/>
+                <a:cs typeface="Times New Roman" panose="02020603050405020304" pitchFamily="18" charset="0"/>
+              </a:rPr>
+              <a:t>, você pode chamá-lo como quiser, mas deve ser o </a:t>
+            </a:r>
+            <a:r>
+              <a:rPr lang="pt-BR" sz="2400" b="1" dirty="0">
+                <a:latin typeface="Times New Roman" panose="02020603050405020304" pitchFamily="18" charset="0"/>
+                <a:cs typeface="Times New Roman" panose="02020603050405020304" pitchFamily="18" charset="0"/>
+              </a:rPr>
+              <a:t>primeiro parâmetro</a:t>
+            </a:r>
+            <a:r>
+              <a:rPr lang="pt-BR" sz="2400" dirty="0">
+                <a:latin typeface="Times New Roman" panose="02020603050405020304" pitchFamily="18" charset="0"/>
+                <a:cs typeface="Times New Roman" panose="02020603050405020304" pitchFamily="18" charset="0"/>
+              </a:rPr>
+              <a:t> de qualquer </a:t>
+            </a:r>
+            <a:r>
+              <a:rPr lang="pt-BR" sz="2400" b="1" dirty="0">
+                <a:latin typeface="Times New Roman" panose="02020603050405020304" pitchFamily="18" charset="0"/>
+                <a:cs typeface="Times New Roman" panose="02020603050405020304" pitchFamily="18" charset="0"/>
+              </a:rPr>
+              <a:t>função na classe.</a:t>
+            </a:r>
+            <a:endParaRPr lang="pt-BR" sz="2400" dirty="0">
+              <a:latin typeface="Times New Roman" panose="02020603050405020304" pitchFamily="18" charset="0"/>
+              <a:cs typeface="Times New Roman" panose="02020603050405020304" pitchFamily="18" charset="0"/>
+            </a:endParaRPr>
           </a:p>
           <a:p>
             <a:pPr marL="0" indent="0" algn="just">
               <a:buNone/>
             </a:pPr>
-            <a:r>
-              <a:rPr lang="en-US" sz="2400" dirty="0">
-                <a:latin typeface="Times New Roman" panose="02020603050405020304" pitchFamily="18" charset="0"/>
-                <a:cs typeface="Times New Roman" panose="02020603050405020304" pitchFamily="18" charset="0"/>
-              </a:rPr>
-              <a:t>    </a:t>
-            </a:r>
-            <a:r>
-              <a:rPr lang="en-US" sz="2400" b="1" dirty="0">
-                <a:latin typeface="Times New Roman" panose="02020603050405020304" pitchFamily="18" charset="0"/>
-                <a:cs typeface="Times New Roman" panose="02020603050405020304" pitchFamily="18" charset="0"/>
-              </a:rPr>
-              <a:t>print</a:t>
-            </a:r>
-            <a:r>
-              <a:rPr lang="en-US" sz="2400" dirty="0">
-                <a:latin typeface="Times New Roman" panose="02020603050405020304" pitchFamily="18" charset="0"/>
-                <a:cs typeface="Times New Roman" panose="02020603050405020304" pitchFamily="18" charset="0"/>
-              </a:rPr>
-              <a:t>(“Meu </a:t>
-            </a:r>
-            <a:r>
-              <a:rPr lang="en-US" sz="2400" dirty="0" err="1">
-                <a:latin typeface="Times New Roman" panose="02020603050405020304" pitchFamily="18" charset="0"/>
-                <a:cs typeface="Times New Roman" panose="02020603050405020304" pitchFamily="18" charset="0"/>
-              </a:rPr>
-              <a:t>nome</a:t>
-            </a:r>
-            <a:r>
-              <a:rPr lang="en-US" sz="2400" dirty="0">
-                <a:latin typeface="Times New Roman" panose="02020603050405020304" pitchFamily="18" charset="0"/>
-                <a:cs typeface="Times New Roman" panose="02020603050405020304" pitchFamily="18" charset="0"/>
-              </a:rPr>
-              <a:t> é: " + </a:t>
-            </a:r>
-            <a:r>
-              <a:rPr lang="en-US" sz="2400" b="1" dirty="0" err="1">
-                <a:latin typeface="Times New Roman" panose="02020603050405020304" pitchFamily="18" charset="0"/>
-                <a:cs typeface="Times New Roman" panose="02020603050405020304" pitchFamily="18" charset="0"/>
-              </a:rPr>
-              <a:t>self</a:t>
-            </a:r>
-            <a:r>
-              <a:rPr lang="en-US" sz="2400" dirty="0" err="1">
-                <a:latin typeface="Times New Roman" panose="02020603050405020304" pitchFamily="18" charset="0"/>
-                <a:cs typeface="Times New Roman" panose="02020603050405020304" pitchFamily="18" charset="0"/>
-              </a:rPr>
-              <a:t>.nome</a:t>
-            </a:r>
-            <a:r>
-              <a:rPr lang="en-US" sz="2400" dirty="0">
-                <a:latin typeface="Times New Roman" panose="02020603050405020304" pitchFamily="18" charset="0"/>
-                <a:cs typeface="Times New Roman" panose="02020603050405020304" pitchFamily="18" charset="0"/>
-              </a:rPr>
-              <a:t>)</a:t>
-            </a:r>
-          </a:p>
-          <a:p>
-            <a:pPr marL="0" indent="0" algn="just">
-              <a:buNone/>
-            </a:pPr>
-            <a:r>
-              <a:rPr lang="pt-BR" sz="2400" dirty="0">
-                <a:latin typeface="Times New Roman" panose="02020603050405020304" pitchFamily="18" charset="0"/>
-                <a:cs typeface="Times New Roman" panose="02020603050405020304" pitchFamily="18" charset="0"/>
-              </a:rPr>
-              <a:t>p1.</a:t>
-            </a:r>
-            <a:r>
-              <a:rPr lang="en-US" sz="2400" b="1" dirty="0">
-                <a:solidFill>
-                  <a:srgbClr val="FF0000"/>
-                </a:solidFill>
-                <a:latin typeface="Times New Roman" panose="02020603050405020304" pitchFamily="18" charset="0"/>
-                <a:cs typeface="Times New Roman" panose="02020603050405020304" pitchFamily="18" charset="0"/>
-              </a:rPr>
-              <a:t> </a:t>
-            </a:r>
-            <a:r>
-              <a:rPr lang="en-US" sz="2400" b="1" dirty="0" err="1">
-                <a:solidFill>
-                  <a:srgbClr val="FF0000"/>
-                </a:solidFill>
-                <a:latin typeface="Times New Roman" panose="02020603050405020304" pitchFamily="18" charset="0"/>
-                <a:cs typeface="Times New Roman" panose="02020603050405020304" pitchFamily="18" charset="0"/>
-              </a:rPr>
-              <a:t>imprime_nome</a:t>
-            </a:r>
-            <a:r>
-              <a:rPr lang="pt-BR" sz="2400" dirty="0">
-                <a:latin typeface="Times New Roman" panose="02020603050405020304" pitchFamily="18" charset="0"/>
-                <a:cs typeface="Times New Roman" panose="02020603050405020304" pitchFamily="18" charset="0"/>
-              </a:rPr>
-              <a:t>()</a:t>
-            </a:r>
+            <a:endParaRPr lang="pt-BR" sz="2400" dirty="0">
+              <a:latin typeface="Times New Roman" panose="02020603050405020304" pitchFamily="18" charset="0"/>
+              <a:cs typeface="Times New Roman" panose="02020603050405020304" pitchFamily="18" charset="0"/>
+            </a:endParaRPr>
           </a:p>
         </p:txBody>
       </p:sp>
     </p:spTree>
     <p:extLst>
       <p:ext uri="{BB962C8B-B14F-4D97-AF65-F5344CB8AC3E}">
-        <p14:creationId xmlns:p14="http://schemas.microsoft.com/office/powerpoint/2010/main" val="4052486642"/>
+        <p14:creationId xmlns:p14="http://schemas.microsoft.com/office/powerpoint/2010/main" val="1196706685"/>
       </p:ext>
     </p:extLst>
   </p:cSld>
@@ -17254,16 +17337,13 @@
                   <a:srgbClr val="0070C0"/>
                 </a:solidFill>
               </a:rPr>
-              <a:t>Parâmetro</a:t>
-            </a:r>
-            <a:r>
-              <a:rPr lang="en-US" b="1" dirty="0">
-                <a:solidFill>
-                  <a:srgbClr val="0070C0"/>
-                </a:solidFill>
-              </a:rPr>
-              <a:t> SELF</a:t>
-            </a:r>
+              <a:t>metódos</a:t>
+            </a:r>
+            <a:endParaRPr lang="en-US" b="1" dirty="0">
+              <a:solidFill>
+                <a:srgbClr val="0070C0"/>
+              </a:solidFill>
+            </a:endParaRPr>
           </a:p>
         </p:txBody>
       </p:sp>
@@ -17293,80 +17373,42 @@
               <a:buNone/>
             </a:pPr>
             <a:r>
-              <a:rPr lang="pt-BR" sz="2000" dirty="0">
-                <a:latin typeface="Times New Roman" panose="02020603050405020304" pitchFamily="18" charset="0"/>
-                <a:cs typeface="Times New Roman" panose="02020603050405020304" pitchFamily="18" charset="0"/>
-              </a:rPr>
-              <a:t>O </a:t>
-            </a:r>
-            <a:r>
-              <a:rPr lang="pt-BR" sz="2000" b="1" dirty="0">
-                <a:solidFill>
-                  <a:srgbClr val="FF0000"/>
-                </a:solidFill>
-                <a:latin typeface="Times New Roman" panose="02020603050405020304" pitchFamily="18" charset="0"/>
-                <a:cs typeface="Times New Roman" panose="02020603050405020304" pitchFamily="18" charset="0"/>
-              </a:rPr>
-              <a:t>parâmetro self </a:t>
-            </a:r>
-            <a:r>
-              <a:rPr lang="pt-BR" sz="2000" dirty="0">
-                <a:latin typeface="Times New Roman" panose="02020603050405020304" pitchFamily="18" charset="0"/>
-                <a:cs typeface="Times New Roman" panose="02020603050405020304" pitchFamily="18" charset="0"/>
-              </a:rPr>
-              <a:t>é uma </a:t>
-            </a:r>
-            <a:r>
-              <a:rPr lang="pt-BR" sz="2000" b="1" dirty="0">
-                <a:solidFill>
-                  <a:srgbClr val="FF0000"/>
-                </a:solidFill>
-                <a:latin typeface="Times New Roman" panose="02020603050405020304" pitchFamily="18" charset="0"/>
-                <a:cs typeface="Times New Roman" panose="02020603050405020304" pitchFamily="18" charset="0"/>
-              </a:rPr>
-              <a:t>referência à instância atual da classe</a:t>
-            </a:r>
-            <a:r>
-              <a:rPr lang="pt-BR" sz="2000" dirty="0">
-                <a:latin typeface="Times New Roman" panose="02020603050405020304" pitchFamily="18" charset="0"/>
-                <a:cs typeface="Times New Roman" panose="02020603050405020304" pitchFamily="18" charset="0"/>
-              </a:rPr>
-              <a:t> e é usado para acessar </a:t>
-            </a:r>
-            <a:r>
-              <a:rPr lang="pt-BR" sz="2000" b="1" dirty="0">
-                <a:latin typeface="Times New Roman" panose="02020603050405020304" pitchFamily="18" charset="0"/>
-                <a:cs typeface="Times New Roman" panose="02020603050405020304" pitchFamily="18" charset="0"/>
-              </a:rPr>
-              <a:t>variáveis</a:t>
-            </a:r>
-            <a:r>
-              <a:rPr lang="pt-BR" sz="2000" dirty="0">
-                <a:latin typeface="Times New Roman" panose="02020603050405020304" pitchFamily="18" charset="0"/>
-                <a:cs typeface="Times New Roman" panose="02020603050405020304" pitchFamily="18" charset="0"/>
-              </a:rPr>
-              <a:t> ​​que pertencem à </a:t>
-            </a:r>
-            <a:r>
-              <a:rPr lang="pt-BR" sz="2000" b="1" dirty="0">
-                <a:latin typeface="Times New Roman" panose="02020603050405020304" pitchFamily="18" charset="0"/>
-                <a:cs typeface="Times New Roman" panose="02020603050405020304" pitchFamily="18" charset="0"/>
-              </a:rPr>
-              <a:t>classe</a:t>
-            </a:r>
-            <a:r>
-              <a:rPr lang="pt-BR" sz="2000" dirty="0">
-                <a:latin typeface="Times New Roman" panose="02020603050405020304" pitchFamily="18" charset="0"/>
-                <a:cs typeface="Times New Roman" panose="02020603050405020304" pitchFamily="18" charset="0"/>
-              </a:rPr>
-              <a:t>.</a:t>
+              <a:rPr lang="pt-BR" sz="2400" b="1" dirty="0">
+                <a:latin typeface="Times New Roman" panose="02020603050405020304" pitchFamily="18" charset="0"/>
+                <a:cs typeface="Times New Roman" panose="02020603050405020304" pitchFamily="18" charset="0"/>
+              </a:rPr>
+              <a:t>Objetos</a:t>
+            </a:r>
+            <a:r>
+              <a:rPr lang="pt-BR" sz="2400" dirty="0">
+                <a:latin typeface="Times New Roman" panose="02020603050405020304" pitchFamily="18" charset="0"/>
+                <a:cs typeface="Times New Roman" panose="02020603050405020304" pitchFamily="18" charset="0"/>
+              </a:rPr>
+              <a:t> também podem conter </a:t>
+            </a:r>
+            <a:r>
+              <a:rPr lang="pt-BR" sz="2400" b="1" dirty="0">
+                <a:latin typeface="Times New Roman" panose="02020603050405020304" pitchFamily="18" charset="0"/>
+                <a:cs typeface="Times New Roman" panose="02020603050405020304" pitchFamily="18" charset="0"/>
+              </a:rPr>
+              <a:t>métodos</a:t>
+            </a:r>
+            <a:r>
+              <a:rPr lang="pt-BR" sz="2400" dirty="0">
+                <a:latin typeface="Times New Roman" panose="02020603050405020304" pitchFamily="18" charset="0"/>
+                <a:cs typeface="Times New Roman" panose="02020603050405020304" pitchFamily="18" charset="0"/>
+              </a:rPr>
+              <a:t>. </a:t>
             </a:r>
           </a:p>
           <a:p>
             <a:pPr marL="0" indent="0" algn="just">
               <a:buNone/>
             </a:pPr>
-            <a:endParaRPr lang="pt-BR" sz="2000" dirty="0">
+            <a:endParaRPr lang="pt-BR" sz="2400" b="1" dirty="0">
+              <a:solidFill>
+                <a:srgbClr val="FF0000"/>
+              </a:solidFill>
               <a:latin typeface="Times New Roman" panose="02020603050405020304" pitchFamily="18" charset="0"/>
               <a:cs typeface="Times New Roman" panose="02020603050405020304" pitchFamily="18" charset="0"/>
             </a:endParaRPr>
@@ -17376,67 +17418,229 @@
               <a:buNone/>
             </a:pPr>
             <a:r>
-              <a:rPr lang="pt-BR" sz="2000" dirty="0">
-                <a:latin typeface="Times New Roman" panose="02020603050405020304" pitchFamily="18" charset="0"/>
-                <a:cs typeface="Times New Roman" panose="02020603050405020304" pitchFamily="18" charset="0"/>
-              </a:rPr>
-              <a:t>Ele não precisa ser </a:t>
-            </a:r>
-            <a:r>
-              <a:rPr lang="pt-BR" sz="2000" b="1" dirty="0">
-                <a:latin typeface="Times New Roman" panose="02020603050405020304" pitchFamily="18" charset="0"/>
-                <a:cs typeface="Times New Roman" panose="02020603050405020304" pitchFamily="18" charset="0"/>
-              </a:rPr>
-              <a:t>nomeado self</a:t>
-            </a:r>
-            <a:r>
-              <a:rPr lang="pt-BR" sz="2000" dirty="0">
-                <a:latin typeface="Times New Roman" panose="02020603050405020304" pitchFamily="18" charset="0"/>
-                <a:cs typeface="Times New Roman" panose="02020603050405020304" pitchFamily="18" charset="0"/>
-              </a:rPr>
-              <a:t>, você pode chamá-lo como quiser, mas deve ser o </a:t>
-            </a:r>
-            <a:r>
-              <a:rPr lang="pt-BR" sz="2000" b="1" dirty="0">
-                <a:latin typeface="Times New Roman" panose="02020603050405020304" pitchFamily="18" charset="0"/>
-                <a:cs typeface="Times New Roman" panose="02020603050405020304" pitchFamily="18" charset="0"/>
-              </a:rPr>
-              <a:t>primeiro parâmetro</a:t>
-            </a:r>
-            <a:r>
-              <a:rPr lang="pt-BR" sz="2000" dirty="0">
-                <a:latin typeface="Times New Roman" panose="02020603050405020304" pitchFamily="18" charset="0"/>
-                <a:cs typeface="Times New Roman" panose="02020603050405020304" pitchFamily="18" charset="0"/>
-              </a:rPr>
-              <a:t> de qualquer </a:t>
-            </a:r>
-            <a:r>
-              <a:rPr lang="pt-BR" sz="2000" b="1" dirty="0">
-                <a:latin typeface="Times New Roman" panose="02020603050405020304" pitchFamily="18" charset="0"/>
-                <a:cs typeface="Times New Roman" panose="02020603050405020304" pitchFamily="18" charset="0"/>
-              </a:rPr>
-              <a:t>função na classe.</a:t>
-            </a:r>
-            <a:endParaRPr lang="pt-BR" sz="2000" dirty="0">
-              <a:latin typeface="Times New Roman" panose="02020603050405020304" pitchFamily="18" charset="0"/>
-              <a:cs typeface="Times New Roman" panose="02020603050405020304" pitchFamily="18" charset="0"/>
-            </a:endParaRPr>
+              <a:rPr lang="pt-BR" sz="2400" b="1" dirty="0">
+                <a:solidFill>
+                  <a:srgbClr val="FF0000"/>
+                </a:solidFill>
+                <a:latin typeface="Times New Roman" panose="02020603050405020304" pitchFamily="18" charset="0"/>
+                <a:cs typeface="Times New Roman" panose="02020603050405020304" pitchFamily="18" charset="0"/>
+              </a:rPr>
+              <a:t>Métodos</a:t>
+            </a:r>
+            <a:r>
+              <a:rPr lang="pt-BR" sz="2400" dirty="0">
+                <a:latin typeface="Times New Roman" panose="02020603050405020304" pitchFamily="18" charset="0"/>
+                <a:cs typeface="Times New Roman" panose="02020603050405020304" pitchFamily="18" charset="0"/>
+              </a:rPr>
+              <a:t> em objetos </a:t>
+            </a:r>
+            <a:r>
+              <a:rPr lang="pt-BR" sz="2400" b="1" dirty="0">
+                <a:latin typeface="Times New Roman" panose="02020603050405020304" pitchFamily="18" charset="0"/>
+                <a:cs typeface="Times New Roman" panose="02020603050405020304" pitchFamily="18" charset="0"/>
+              </a:rPr>
+              <a:t>são funções</a:t>
+            </a:r>
+            <a:r>
+              <a:rPr lang="pt-BR" sz="2400" dirty="0">
+                <a:latin typeface="Times New Roman" panose="02020603050405020304" pitchFamily="18" charset="0"/>
+                <a:cs typeface="Times New Roman" panose="02020603050405020304" pitchFamily="18" charset="0"/>
+              </a:rPr>
+              <a:t> que pertencem ao </a:t>
+            </a:r>
+            <a:r>
+              <a:rPr lang="pt-BR" sz="2400" b="1" dirty="0">
+                <a:solidFill>
+                  <a:srgbClr val="FF0000"/>
+                </a:solidFill>
+                <a:latin typeface="Times New Roman" panose="02020603050405020304" pitchFamily="18" charset="0"/>
+                <a:cs typeface="Times New Roman" panose="02020603050405020304" pitchFamily="18" charset="0"/>
+              </a:rPr>
+              <a:t>objeto</a:t>
+            </a:r>
+            <a:r>
+              <a:rPr lang="pt-BR" sz="2400" dirty="0">
+                <a:latin typeface="Times New Roman" panose="02020603050405020304" pitchFamily="18" charset="0"/>
+                <a:cs typeface="Times New Roman" panose="02020603050405020304" pitchFamily="18" charset="0"/>
+              </a:rPr>
+              <a:t>.</a:t>
+            </a:r>
           </a:p>
           <a:p>
             <a:pPr marL="0" indent="0" algn="just">
               <a:buNone/>
             </a:pPr>
-            <a:endParaRPr lang="pt-BR" sz="2000" dirty="0">
-              <a:latin typeface="Times New Roman" panose="02020603050405020304" pitchFamily="18" charset="0"/>
-              <a:cs typeface="Times New Roman" panose="02020603050405020304" pitchFamily="18" charset="0"/>
-            </a:endParaRPr>
+            <a:r>
+              <a:rPr lang="pt-BR" sz="2400" dirty="0">
+                <a:latin typeface="Times New Roman" panose="02020603050405020304" pitchFamily="18" charset="0"/>
+                <a:cs typeface="Times New Roman" panose="02020603050405020304" pitchFamily="18" charset="0"/>
+              </a:rPr>
+              <a:t>  Ex.: ...</a:t>
+            </a:r>
+          </a:p>
+          <a:p>
+            <a:pPr marL="0" indent="0" algn="just">
+              <a:buNone/>
+            </a:pPr>
+            <a:r>
+              <a:rPr lang="en-US" sz="2400" dirty="0">
+                <a:latin typeface="Times New Roman" panose="02020603050405020304" pitchFamily="18" charset="0"/>
+                <a:cs typeface="Times New Roman" panose="02020603050405020304" pitchFamily="18" charset="0"/>
+              </a:rPr>
+              <a:t> </a:t>
+            </a:r>
+            <a:r>
+              <a:rPr lang="en-US" sz="2400" b="1" dirty="0">
+                <a:latin typeface="Times New Roman" panose="02020603050405020304" pitchFamily="18" charset="0"/>
+                <a:cs typeface="Times New Roman" panose="02020603050405020304" pitchFamily="18" charset="0"/>
+              </a:rPr>
+              <a:t>def</a:t>
+            </a:r>
+            <a:r>
+              <a:rPr lang="en-US" sz="2400" dirty="0">
+                <a:latin typeface="Times New Roman" panose="02020603050405020304" pitchFamily="18" charset="0"/>
+                <a:cs typeface="Times New Roman" panose="02020603050405020304" pitchFamily="18" charset="0"/>
+              </a:rPr>
+              <a:t> </a:t>
+            </a:r>
+            <a:r>
+              <a:rPr lang="en-US" sz="2400" b="1" dirty="0" err="1">
+                <a:solidFill>
+                  <a:srgbClr val="FF0000"/>
+                </a:solidFill>
+                <a:latin typeface="Times New Roman" panose="02020603050405020304" pitchFamily="18" charset="0"/>
+                <a:cs typeface="Times New Roman" panose="02020603050405020304" pitchFamily="18" charset="0"/>
+              </a:rPr>
+              <a:t>imprime_nome</a:t>
+            </a:r>
+            <a:r>
+              <a:rPr lang="en-US" sz="2400" dirty="0">
+                <a:latin typeface="Times New Roman" panose="02020603050405020304" pitchFamily="18" charset="0"/>
+                <a:cs typeface="Times New Roman" panose="02020603050405020304" pitchFamily="18" charset="0"/>
+              </a:rPr>
+              <a:t>(</a:t>
+            </a:r>
+            <a:r>
+              <a:rPr lang="en-US" sz="2400" b="1" dirty="0">
+                <a:latin typeface="Times New Roman" panose="02020603050405020304" pitchFamily="18" charset="0"/>
+                <a:cs typeface="Times New Roman" panose="02020603050405020304" pitchFamily="18" charset="0"/>
+              </a:rPr>
+              <a:t>self</a:t>
+            </a:r>
+            <a:r>
+              <a:rPr lang="en-US" sz="2400" dirty="0">
+                <a:latin typeface="Times New Roman" panose="02020603050405020304" pitchFamily="18" charset="0"/>
+                <a:cs typeface="Times New Roman" panose="02020603050405020304" pitchFamily="18" charset="0"/>
+              </a:rPr>
+              <a:t>):</a:t>
+            </a:r>
+          </a:p>
+          <a:p>
+            <a:pPr marL="0" indent="0" algn="just">
+              <a:buNone/>
+            </a:pPr>
+            <a:r>
+              <a:rPr lang="en-US" sz="2400" dirty="0">
+                <a:latin typeface="Times New Roman" panose="02020603050405020304" pitchFamily="18" charset="0"/>
+                <a:cs typeface="Times New Roman" panose="02020603050405020304" pitchFamily="18" charset="0"/>
+              </a:rPr>
+              <a:t>    </a:t>
+            </a:r>
+            <a:r>
+              <a:rPr lang="en-US" sz="2400" b="1" dirty="0">
+                <a:latin typeface="Times New Roman" panose="02020603050405020304" pitchFamily="18" charset="0"/>
+                <a:cs typeface="Times New Roman" panose="02020603050405020304" pitchFamily="18" charset="0"/>
+              </a:rPr>
+              <a:t>print</a:t>
+            </a:r>
+            <a:r>
+              <a:rPr lang="en-US" sz="2400" dirty="0">
+                <a:latin typeface="Times New Roman" panose="02020603050405020304" pitchFamily="18" charset="0"/>
+                <a:cs typeface="Times New Roman" panose="02020603050405020304" pitchFamily="18" charset="0"/>
+              </a:rPr>
+              <a:t>(“Meu </a:t>
+            </a:r>
+            <a:r>
+              <a:rPr lang="en-US" sz="2400" dirty="0" err="1">
+                <a:latin typeface="Times New Roman" panose="02020603050405020304" pitchFamily="18" charset="0"/>
+                <a:cs typeface="Times New Roman" panose="02020603050405020304" pitchFamily="18" charset="0"/>
+              </a:rPr>
+              <a:t>nome</a:t>
+            </a:r>
+            <a:r>
+              <a:rPr lang="en-US" sz="2400" dirty="0">
+                <a:latin typeface="Times New Roman" panose="02020603050405020304" pitchFamily="18" charset="0"/>
+                <a:cs typeface="Times New Roman" panose="02020603050405020304" pitchFamily="18" charset="0"/>
+              </a:rPr>
+              <a:t> é: " + </a:t>
+            </a:r>
+            <a:r>
+              <a:rPr lang="en-US" sz="2400" b="1" dirty="0" err="1">
+                <a:latin typeface="Times New Roman" panose="02020603050405020304" pitchFamily="18" charset="0"/>
+                <a:cs typeface="Times New Roman" panose="02020603050405020304" pitchFamily="18" charset="0"/>
+              </a:rPr>
+              <a:t>self</a:t>
+            </a:r>
+            <a:r>
+              <a:rPr lang="en-US" sz="2400" dirty="0" err="1">
+                <a:latin typeface="Times New Roman" panose="02020603050405020304" pitchFamily="18" charset="0"/>
+                <a:cs typeface="Times New Roman" panose="02020603050405020304" pitchFamily="18" charset="0"/>
+              </a:rPr>
+              <a:t>.nome</a:t>
+            </a:r>
+            <a:r>
+              <a:rPr lang="en-US" sz="2400" dirty="0">
+                <a:latin typeface="Times New Roman" panose="02020603050405020304" pitchFamily="18" charset="0"/>
+                <a:cs typeface="Times New Roman" panose="02020603050405020304" pitchFamily="18" charset="0"/>
+              </a:rPr>
+              <a:t>)</a:t>
+            </a:r>
+          </a:p>
+          <a:p>
+            <a:pPr marL="0" indent="0" algn="just">
+              <a:buNone/>
+            </a:pPr>
+            <a:r>
+              <a:rPr lang="pt-BR" sz="2400" dirty="0">
+                <a:latin typeface="Times New Roman" panose="02020603050405020304" pitchFamily="18" charset="0"/>
+                <a:cs typeface="Times New Roman" panose="02020603050405020304" pitchFamily="18" charset="0"/>
+              </a:rPr>
+              <a:t>p1.</a:t>
+            </a:r>
+            <a:r>
+              <a:rPr lang="en-US" sz="2400" b="1" dirty="0">
+                <a:solidFill>
+                  <a:srgbClr val="FF0000"/>
+                </a:solidFill>
+                <a:latin typeface="Times New Roman" panose="02020603050405020304" pitchFamily="18" charset="0"/>
+                <a:cs typeface="Times New Roman" panose="02020603050405020304" pitchFamily="18" charset="0"/>
+              </a:rPr>
+              <a:t> </a:t>
+            </a:r>
+            <a:r>
+              <a:rPr lang="en-US" sz="2400" b="1" dirty="0" err="1">
+                <a:solidFill>
+                  <a:srgbClr val="FF0000"/>
+                </a:solidFill>
+                <a:latin typeface="Times New Roman" panose="02020603050405020304" pitchFamily="18" charset="0"/>
+                <a:cs typeface="Times New Roman" panose="02020603050405020304" pitchFamily="18" charset="0"/>
+              </a:rPr>
+              <a:t>imprime_nome</a:t>
+            </a:r>
+            <a:r>
+              <a:rPr lang="pt-BR" sz="2400" dirty="0">
+                <a:latin typeface="Times New Roman" panose="02020603050405020304" pitchFamily="18" charset="0"/>
+                <a:cs typeface="Times New Roman" panose="02020603050405020304" pitchFamily="18" charset="0"/>
+              </a:rPr>
+              <a:t>()</a:t>
+            </a:r>
           </a:p>
         </p:txBody>
       </p:sp>
     </p:spTree>
     <p:extLst>
       <p:ext uri="{BB962C8B-B14F-4D97-AF65-F5344CB8AC3E}">
-        <p14:creationId xmlns:p14="http://schemas.microsoft.com/office/powerpoint/2010/main" val="1196706685"/>
+        <p14:creationId xmlns:p14="http://schemas.microsoft.com/office/powerpoint/2010/main" val="4052486642"/>
       </p:ext>
     </p:extLst>
   </p:cSld>

</xml_diff>

<commit_message>
atualização slides de aulas 12Set2023
</commit_message>
<xml_diff>
--- a/01 Classes/Aula 11 Programação Python - Classes - Orientação a Objetos.pptx
+++ b/01 Classes/Aula 11 Programação Python - Classes - Orientação a Objetos.pptx
@@ -5,7 +5,7 @@
     <p:sldMasterId id="2147483671" r:id="rId1"/>
   </p:sldMasterIdLst>
   <p:notesMasterIdLst>
-    <p:notesMasterId r:id="rId35"/>
+    <p:notesMasterId r:id="rId36"/>
   </p:notesMasterIdLst>
   <p:sldIdLst>
     <p:sldId id="256" r:id="rId2"/>
@@ -33,14 +33,15 @@
     <p:sldId id="348" r:id="rId24"/>
     <p:sldId id="349" r:id="rId25"/>
     <p:sldId id="362" r:id="rId26"/>
-    <p:sldId id="363" r:id="rId27"/>
-    <p:sldId id="364" r:id="rId28"/>
-    <p:sldId id="365" r:id="rId29"/>
-    <p:sldId id="323" r:id="rId30"/>
-    <p:sldId id="333" r:id="rId31"/>
-    <p:sldId id="334" r:id="rId32"/>
-    <p:sldId id="337" r:id="rId33"/>
-    <p:sldId id="309" r:id="rId34"/>
+    <p:sldId id="367" r:id="rId27"/>
+    <p:sldId id="363" r:id="rId28"/>
+    <p:sldId id="364" r:id="rId29"/>
+    <p:sldId id="365" r:id="rId30"/>
+    <p:sldId id="368" r:id="rId31"/>
+    <p:sldId id="333" r:id="rId32"/>
+    <p:sldId id="334" r:id="rId33"/>
+    <p:sldId id="337" r:id="rId34"/>
+    <p:sldId id="309" r:id="rId35"/>
   </p:sldIdLst>
   <p:sldSz cx="9144000" cy="5143500" type="screen16x9"/>
   <p:notesSz cx="6858000" cy="9144000"/>
@@ -1445,7 +1446,7 @@
     </p:spTree>
     <p:extLst>
       <p:ext uri="{BB962C8B-B14F-4D97-AF65-F5344CB8AC3E}">
-        <p14:creationId xmlns:p14="http://schemas.microsoft.com/office/powerpoint/2010/main" val="125070561"/>
+        <p14:creationId xmlns:p14="http://schemas.microsoft.com/office/powerpoint/2010/main" val="145779530"/>
       </p:ext>
     </p:extLst>
   </p:cSld>
@@ -1511,7 +1512,7 @@
     </p:spTree>
     <p:extLst>
       <p:ext uri="{BB962C8B-B14F-4D97-AF65-F5344CB8AC3E}">
-        <p14:creationId xmlns:p14="http://schemas.microsoft.com/office/powerpoint/2010/main" val="11912598"/>
+        <p14:creationId xmlns:p14="http://schemas.microsoft.com/office/powerpoint/2010/main" val="125070561"/>
       </p:ext>
     </p:extLst>
   </p:cSld>
@@ -1577,7 +1578,7 @@
     </p:spTree>
     <p:extLst>
       <p:ext uri="{BB962C8B-B14F-4D97-AF65-F5344CB8AC3E}">
-        <p14:creationId xmlns:p14="http://schemas.microsoft.com/office/powerpoint/2010/main" val="818947722"/>
+        <p14:creationId xmlns:p14="http://schemas.microsoft.com/office/powerpoint/2010/main" val="11912598"/>
       </p:ext>
     </p:extLst>
   </p:cSld>
@@ -1643,7 +1644,7 @@
     </p:spTree>
     <p:extLst>
       <p:ext uri="{BB962C8B-B14F-4D97-AF65-F5344CB8AC3E}">
-        <p14:creationId xmlns:p14="http://schemas.microsoft.com/office/powerpoint/2010/main" val="2709569597"/>
+        <p14:creationId xmlns:p14="http://schemas.microsoft.com/office/powerpoint/2010/main" val="818947722"/>
       </p:ext>
     </p:extLst>
   </p:cSld>
@@ -1709,7 +1710,7 @@
     </p:spTree>
     <p:extLst>
       <p:ext uri="{BB962C8B-B14F-4D97-AF65-F5344CB8AC3E}">
-        <p14:creationId xmlns:p14="http://schemas.microsoft.com/office/powerpoint/2010/main" val="585304384"/>
+        <p14:creationId xmlns:p14="http://schemas.microsoft.com/office/powerpoint/2010/main" val="2709569597"/>
       </p:ext>
     </p:extLst>
   </p:cSld>
@@ -1775,7 +1776,7 @@
     </p:spTree>
     <p:extLst>
       <p:ext uri="{BB962C8B-B14F-4D97-AF65-F5344CB8AC3E}">
-        <p14:creationId xmlns:p14="http://schemas.microsoft.com/office/powerpoint/2010/main" val="2296249050"/>
+        <p14:creationId xmlns:p14="http://schemas.microsoft.com/office/powerpoint/2010/main" val="585304384"/>
       </p:ext>
     </p:extLst>
   </p:cSld>
@@ -1852,6 +1853,72 @@
 </file>
 
 <file path=ppt/notesSlides/notesSlide30.xml><?xml version="1.0" encoding="utf-8"?>
+<p:notes xmlns:a="http://schemas.openxmlformats.org/drawingml/2006/main" xmlns:r="http://schemas.openxmlformats.org/officeDocument/2006/relationships" xmlns:p="http://schemas.openxmlformats.org/presentationml/2006/main">
+  <p:cSld>
+    <p:spTree>
+      <p:nvGrpSpPr>
+        <p:cNvPr id="1" name=""/>
+        <p:cNvGrpSpPr/>
+        <p:nvPr/>
+      </p:nvGrpSpPr>
+      <p:grpSpPr>
+        <a:xfrm>
+          <a:off x="0" y="0"/>
+          <a:ext cx="0" cy="0"/>
+          <a:chOff x="0" y="0"/>
+          <a:chExt cx="0" cy="0"/>
+        </a:xfrm>
+      </p:grpSpPr>
+      <p:sp>
+        <p:nvSpPr>
+          <p:cNvPr id="2" name="Espaço Reservado para Imagem de Slide 1"/>
+          <p:cNvSpPr>
+            <a:spLocks noGrp="1" noRot="1" noChangeAspect="1"/>
+          </p:cNvSpPr>
+          <p:nvPr>
+            <p:ph type="sldImg"/>
+          </p:nvPr>
+        </p:nvSpPr>
+        <p:spPr>
+          <a:xfrm>
+            <a:off x="381000" y="685800"/>
+            <a:ext cx="6096000" cy="3429000"/>
+          </a:xfrm>
+        </p:spPr>
+      </p:sp>
+      <p:sp>
+        <p:nvSpPr>
+          <p:cNvPr id="3" name="Espaço Reservado para Anotações 2"/>
+          <p:cNvSpPr>
+            <a:spLocks noGrp="1"/>
+          </p:cNvSpPr>
+          <p:nvPr>
+            <p:ph type="body" idx="1"/>
+          </p:nvPr>
+        </p:nvSpPr>
+        <p:spPr/>
+        <p:txBody>
+          <a:bodyPr/>
+          <a:lstStyle/>
+          <a:p>
+            <a:endParaRPr lang="pt-BR" dirty="0"/>
+          </a:p>
+        </p:txBody>
+      </p:sp>
+    </p:spTree>
+    <p:extLst>
+      <p:ext uri="{BB962C8B-B14F-4D97-AF65-F5344CB8AC3E}">
+        <p14:creationId xmlns:p14="http://schemas.microsoft.com/office/powerpoint/2010/main" val="2296249050"/>
+      </p:ext>
+    </p:extLst>
+  </p:cSld>
+  <p:clrMapOvr>
+    <a:masterClrMapping/>
+  </p:clrMapOvr>
+</p:notes>
+</file>
+
+<file path=ppt/notesSlides/notesSlide31.xml><?xml version="1.0" encoding="utf-8"?>
 <p:notes xmlns:a="http://schemas.openxmlformats.org/drawingml/2006/main" xmlns:r="http://schemas.openxmlformats.org/officeDocument/2006/relationships" xmlns:p="http://schemas.openxmlformats.org/presentationml/2006/main">
   <p:cSld>
     <p:spTree>
@@ -12719,7 +12786,7 @@
               <a:buNone/>
             </a:pPr>
             <a:r>
-              <a:rPr lang="pt-BR" sz="2000" b="1" dirty="0">
+              <a:rPr lang="pt-BR" sz="2400" b="1" dirty="0">
                 <a:solidFill>
                   <a:srgbClr val="FF0000"/>
                 </a:solidFill>
@@ -12729,28 +12796,28 @@
               <a:t>Polimorfismo</a:t>
             </a:r>
             <a:r>
-              <a:rPr lang="pt-BR" sz="2000" dirty="0">
+              <a:rPr lang="pt-BR" sz="2400" dirty="0">
                 <a:latin typeface="Times New Roman" panose="02020603050405020304" pitchFamily="18" charset="0"/>
                 <a:cs typeface="Times New Roman" panose="02020603050405020304" pitchFamily="18" charset="0"/>
               </a:rPr>
               <a:t>, em Python, é a capacidade que uma </a:t>
             </a:r>
             <a:r>
-              <a:rPr lang="pt-BR" sz="2000" b="1" dirty="0">
+              <a:rPr lang="pt-BR" sz="2400" b="1" dirty="0">
                 <a:latin typeface="Times New Roman" panose="02020603050405020304" pitchFamily="18" charset="0"/>
                 <a:cs typeface="Times New Roman" panose="02020603050405020304" pitchFamily="18" charset="0"/>
               </a:rPr>
               <a:t>subclasse</a:t>
             </a:r>
             <a:r>
-              <a:rPr lang="pt-BR" sz="2000" dirty="0">
+              <a:rPr lang="pt-BR" sz="2400" dirty="0">
                 <a:latin typeface="Times New Roman" panose="02020603050405020304" pitchFamily="18" charset="0"/>
                 <a:cs typeface="Times New Roman" panose="02020603050405020304" pitchFamily="18" charset="0"/>
               </a:rPr>
               <a:t> tem de ter </a:t>
             </a:r>
             <a:r>
-              <a:rPr lang="pt-BR" sz="2000" b="1" dirty="0">
+              <a:rPr lang="pt-BR" sz="2400" b="1" dirty="0">
                 <a:solidFill>
                   <a:srgbClr val="0070C0"/>
                 </a:solidFill>
@@ -12760,14 +12827,14 @@
               <a:t>métodos com o mesmo nome</a:t>
             </a:r>
             <a:r>
-              <a:rPr lang="pt-BR" sz="2000" dirty="0">
+              <a:rPr lang="pt-BR" sz="2400" dirty="0">
                 <a:latin typeface="Times New Roman" panose="02020603050405020304" pitchFamily="18" charset="0"/>
                 <a:cs typeface="Times New Roman" panose="02020603050405020304" pitchFamily="18" charset="0"/>
               </a:rPr>
               <a:t> de sua </a:t>
             </a:r>
             <a:r>
-              <a:rPr lang="pt-BR" sz="2000" b="1" dirty="0">
+              <a:rPr lang="pt-BR" sz="2400" b="1" dirty="0">
                 <a:solidFill>
                   <a:srgbClr val="FF0000"/>
                 </a:solidFill>
@@ -12777,7 +12844,7 @@
               <a:t>superclasse</a:t>
             </a:r>
             <a:r>
-              <a:rPr lang="pt-BR" sz="2000" dirty="0">
+              <a:rPr lang="pt-BR" sz="2400" dirty="0">
                 <a:latin typeface="Times New Roman" panose="02020603050405020304" pitchFamily="18" charset="0"/>
                 <a:cs typeface="Times New Roman" panose="02020603050405020304" pitchFamily="18" charset="0"/>
               </a:rPr>
@@ -12788,7 +12855,7 @@
             <a:pPr marL="0" indent="0" algn="just">
               <a:buNone/>
             </a:pPr>
-            <a:endParaRPr lang="pt-BR" sz="2000" dirty="0">
+            <a:endParaRPr lang="pt-BR" sz="2400" dirty="0">
               <a:latin typeface="Times New Roman" panose="02020603050405020304" pitchFamily="18" charset="0"/>
               <a:cs typeface="Times New Roman" panose="02020603050405020304" pitchFamily="18" charset="0"/>
             </a:endParaRPr>
@@ -12798,42 +12865,42 @@
               <a:buNone/>
             </a:pPr>
             <a:r>
-              <a:rPr lang="pt-BR" sz="2000" dirty="0">
+              <a:rPr lang="pt-BR" sz="2400" dirty="0">
                 <a:latin typeface="Times New Roman" panose="02020603050405020304" pitchFamily="18" charset="0"/>
                 <a:cs typeface="Times New Roman" panose="02020603050405020304" pitchFamily="18" charset="0"/>
               </a:rPr>
               <a:t>Ou seja, o </a:t>
             </a:r>
             <a:r>
-              <a:rPr lang="pt-BR" sz="2000" b="1" dirty="0">
+              <a:rPr lang="pt-BR" sz="2400" b="1" dirty="0">
                 <a:latin typeface="Times New Roman" panose="02020603050405020304" pitchFamily="18" charset="0"/>
                 <a:cs typeface="Times New Roman" panose="02020603050405020304" pitchFamily="18" charset="0"/>
               </a:rPr>
               <a:t>objeto</a:t>
             </a:r>
             <a:r>
-              <a:rPr lang="pt-BR" sz="2000" dirty="0">
+              <a:rPr lang="pt-BR" sz="2400" dirty="0">
                 <a:latin typeface="Times New Roman" panose="02020603050405020304" pitchFamily="18" charset="0"/>
                 <a:cs typeface="Times New Roman" panose="02020603050405020304" pitchFamily="18" charset="0"/>
               </a:rPr>
               <a:t> tem a </a:t>
             </a:r>
             <a:r>
-              <a:rPr lang="pt-BR" sz="2000" b="1" dirty="0">
+              <a:rPr lang="pt-BR" sz="2400" b="1" dirty="0">
                 <a:latin typeface="Times New Roman" panose="02020603050405020304" pitchFamily="18" charset="0"/>
                 <a:cs typeface="Times New Roman" panose="02020603050405020304" pitchFamily="18" charset="0"/>
               </a:rPr>
               <a:t>capacidade</a:t>
             </a:r>
             <a:r>
-              <a:rPr lang="pt-BR" sz="2000" dirty="0">
+              <a:rPr lang="pt-BR" sz="2400" dirty="0">
                 <a:latin typeface="Times New Roman" panose="02020603050405020304" pitchFamily="18" charset="0"/>
                 <a:cs typeface="Times New Roman" panose="02020603050405020304" pitchFamily="18" charset="0"/>
               </a:rPr>
               <a:t> de </a:t>
             </a:r>
             <a:r>
-              <a:rPr lang="pt-BR" sz="2000" b="1" dirty="0">
+              <a:rPr lang="pt-BR" sz="2400" b="1" dirty="0">
                 <a:solidFill>
                   <a:srgbClr val="0070C0"/>
                 </a:solidFill>
@@ -12843,14 +12910,14 @@
               <a:t>assumir diferentes formas </a:t>
             </a:r>
             <a:r>
-              <a:rPr lang="pt-BR" sz="2000" dirty="0">
+              <a:rPr lang="pt-BR" sz="2400" dirty="0">
                 <a:latin typeface="Times New Roman" panose="02020603050405020304" pitchFamily="18" charset="0"/>
                 <a:cs typeface="Times New Roman" panose="02020603050405020304" pitchFamily="18" charset="0"/>
               </a:rPr>
               <a:t>(</a:t>
             </a:r>
             <a:r>
-              <a:rPr lang="pt-BR" sz="2000" b="1" dirty="0">
+              <a:rPr lang="pt-BR" sz="2400" b="1" dirty="0">
                 <a:solidFill>
                   <a:srgbClr val="FF0000"/>
                 </a:solidFill>
@@ -12860,7 +12927,7 @@
               <a:t>polimorfismo</a:t>
             </a:r>
             <a:r>
-              <a:rPr lang="pt-BR" sz="2000" dirty="0">
+              <a:rPr lang="pt-BR" sz="2400" dirty="0">
                 <a:latin typeface="Times New Roman" panose="02020603050405020304" pitchFamily="18" charset="0"/>
                 <a:cs typeface="Times New Roman" panose="02020603050405020304" pitchFamily="18" charset="0"/>
               </a:rPr>
@@ -12929,7 +12996,7 @@
                   <a:srgbClr val="0070C0"/>
                 </a:solidFill>
               </a:rPr>
-              <a:t>Python – CLASSES E OO POLIMORFISMO EXEMPLO</a:t>
+              <a:t>Python – CLASSES E OO POLIMORFISMO</a:t>
             </a:r>
           </a:p>
         </p:txBody>
@@ -12960,31 +13027,35 @@
               <a:buNone/>
             </a:pPr>
             <a:r>
-              <a:rPr lang="pt-BR" sz="2000" b="1" dirty="0" err="1">
-                <a:latin typeface="Times New Roman" panose="02020603050405020304" pitchFamily="18" charset="0"/>
-                <a:cs typeface="Times New Roman" panose="02020603050405020304" pitchFamily="18" charset="0"/>
-              </a:rPr>
-              <a:t>class</a:t>
-            </a:r>
-            <a:r>
-              <a:rPr lang="pt-BR" sz="2000" dirty="0">
-                <a:latin typeface="Times New Roman" panose="02020603050405020304" pitchFamily="18" charset="0"/>
-                <a:cs typeface="Times New Roman" panose="02020603050405020304" pitchFamily="18" charset="0"/>
-              </a:rPr>
-              <a:t> </a:t>
-            </a:r>
-            <a:r>
-              <a:rPr lang="pt-BR" sz="2000" b="1" dirty="0">
-                <a:solidFill>
-                  <a:srgbClr val="FF0000"/>
-                </a:solidFill>
-                <a:latin typeface="Times New Roman" panose="02020603050405020304" pitchFamily="18" charset="0"/>
-                <a:cs typeface="Times New Roman" panose="02020603050405020304" pitchFamily="18" charset="0"/>
-              </a:rPr>
-              <a:t>Super</a:t>
-            </a:r>
-            <a:r>
-              <a:rPr lang="pt-BR" sz="2000" dirty="0">
+              <a:rPr lang="pt-BR" sz="2200" dirty="0">
+                <a:latin typeface="Times New Roman" panose="02020603050405020304" pitchFamily="18" charset="0"/>
+                <a:cs typeface="Times New Roman" panose="02020603050405020304" pitchFamily="18" charset="0"/>
+              </a:rPr>
+              <a:t>O </a:t>
+            </a:r>
+            <a:r>
+              <a:rPr lang="pt-BR" sz="2200" b="1" dirty="0">
+                <a:latin typeface="Times New Roman" panose="02020603050405020304" pitchFamily="18" charset="0"/>
+                <a:cs typeface="Times New Roman" panose="02020603050405020304" pitchFamily="18" charset="0"/>
+              </a:rPr>
+              <a:t>Polimorfismo</a:t>
+            </a:r>
+            <a:r>
+              <a:rPr lang="pt-BR" sz="2200" dirty="0">
+                <a:latin typeface="Times New Roman" panose="02020603050405020304" pitchFamily="18" charset="0"/>
+                <a:cs typeface="Times New Roman" panose="02020603050405020304" pitchFamily="18" charset="0"/>
+              </a:rPr>
+              <a:t> pode ser classificado de </a:t>
+            </a:r>
+            <a:r>
+              <a:rPr lang="pt-BR" sz="2200" b="1" dirty="0">
+                <a:latin typeface="Times New Roman" panose="02020603050405020304" pitchFamily="18" charset="0"/>
+                <a:cs typeface="Times New Roman" panose="02020603050405020304" pitchFamily="18" charset="0"/>
+              </a:rPr>
+              <a:t>três maneiras</a:t>
+            </a:r>
+            <a:r>
+              <a:rPr lang="pt-BR" sz="2200" dirty="0">
                 <a:latin typeface="Times New Roman" panose="02020603050405020304" pitchFamily="18" charset="0"/>
                 <a:cs typeface="Times New Roman" panose="02020603050405020304" pitchFamily="18" charset="0"/>
               </a:rPr>
@@ -12995,232 +13066,127 @@
             <a:pPr marL="0" indent="0" algn="just">
               <a:buNone/>
             </a:pPr>
-            <a:r>
-              <a:rPr lang="pt-BR" sz="2000" dirty="0">
-                <a:latin typeface="Times New Roman" panose="02020603050405020304" pitchFamily="18" charset="0"/>
-                <a:cs typeface="Times New Roman" panose="02020603050405020304" pitchFamily="18" charset="0"/>
-              </a:rPr>
-              <a:t>    </a:t>
-            </a:r>
-            <a:r>
-              <a:rPr lang="pt-BR" sz="2000" b="1" dirty="0" err="1">
-                <a:latin typeface="Times New Roman" panose="02020603050405020304" pitchFamily="18" charset="0"/>
-                <a:cs typeface="Times New Roman" panose="02020603050405020304" pitchFamily="18" charset="0"/>
-              </a:rPr>
-              <a:t>def</a:t>
-            </a:r>
-            <a:r>
-              <a:rPr lang="pt-BR" sz="2000" dirty="0">
-                <a:latin typeface="Times New Roman" panose="02020603050405020304" pitchFamily="18" charset="0"/>
-                <a:cs typeface="Times New Roman" panose="02020603050405020304" pitchFamily="18" charset="0"/>
-              </a:rPr>
-              <a:t> </a:t>
-            </a:r>
-            <a:r>
-              <a:rPr lang="pt-BR" sz="2000" b="1" dirty="0">
-                <a:solidFill>
-                  <a:srgbClr val="FF0000"/>
-                </a:solidFill>
-                <a:latin typeface="Times New Roman" panose="02020603050405020304" pitchFamily="18" charset="0"/>
-                <a:cs typeface="Times New Roman" panose="02020603050405020304" pitchFamily="18" charset="0"/>
-              </a:rPr>
-              <a:t>soma</a:t>
-            </a:r>
-            <a:r>
-              <a:rPr lang="pt-BR" sz="2000" dirty="0">
-                <a:latin typeface="Times New Roman" panose="02020603050405020304" pitchFamily="18" charset="0"/>
-                <a:cs typeface="Times New Roman" panose="02020603050405020304" pitchFamily="18" charset="0"/>
-              </a:rPr>
-              <a:t>(</a:t>
-            </a:r>
-            <a:r>
-              <a:rPr lang="pt-BR" sz="2000" b="1" dirty="0">
-                <a:latin typeface="Times New Roman" panose="02020603050405020304" pitchFamily="18" charset="0"/>
-                <a:cs typeface="Times New Roman" panose="02020603050405020304" pitchFamily="18" charset="0"/>
-              </a:rPr>
-              <a:t>self</a:t>
-            </a:r>
-            <a:r>
-              <a:rPr lang="pt-BR" sz="2000" dirty="0">
-                <a:latin typeface="Times New Roman" panose="02020603050405020304" pitchFamily="18" charset="0"/>
-                <a:cs typeface="Times New Roman" panose="02020603050405020304" pitchFamily="18" charset="0"/>
-              </a:rPr>
-              <a:t>, x, y):</a:t>
-            </a:r>
-          </a:p>
-          <a:p>
-            <a:pPr marL="0" indent="0" algn="just">
-              <a:buNone/>
-            </a:pPr>
-            <a:r>
-              <a:rPr lang="pt-BR" sz="2000" dirty="0">
-                <a:latin typeface="Times New Roman" panose="02020603050405020304" pitchFamily="18" charset="0"/>
-                <a:cs typeface="Times New Roman" panose="02020603050405020304" pitchFamily="18" charset="0"/>
-              </a:rPr>
-              <a:t>        </a:t>
-            </a:r>
-            <a:r>
-              <a:rPr lang="pt-BR" sz="2000" b="1" dirty="0" err="1">
-                <a:latin typeface="Times New Roman" panose="02020603050405020304" pitchFamily="18" charset="0"/>
-                <a:cs typeface="Times New Roman" panose="02020603050405020304" pitchFamily="18" charset="0"/>
-              </a:rPr>
-              <a:t>return</a:t>
-            </a:r>
-            <a:r>
-              <a:rPr lang="pt-BR" sz="2000" dirty="0">
-                <a:latin typeface="Times New Roman" panose="02020603050405020304" pitchFamily="18" charset="0"/>
-                <a:cs typeface="Times New Roman" panose="02020603050405020304" pitchFamily="18" charset="0"/>
-              </a:rPr>
-              <a:t> x + y</a:t>
-            </a:r>
-          </a:p>
-          <a:p>
-            <a:pPr marL="0" indent="0" algn="just">
-              <a:buNone/>
-            </a:pPr>
-            <a:endParaRPr lang="pt-BR" sz="2000" dirty="0">
+            <a:endParaRPr lang="pt-BR" sz="2200" dirty="0">
               <a:latin typeface="Times New Roman" panose="02020603050405020304" pitchFamily="18" charset="0"/>
               <a:cs typeface="Times New Roman" panose="02020603050405020304" pitchFamily="18" charset="0"/>
             </a:endParaRPr>
           </a:p>
           <a:p>
+            <a:pPr algn="just">
+              <a:buFont typeface="Wingdings" panose="05000000000000000000" pitchFamily="2" charset="2"/>
+              <a:buChar char="§"/>
+            </a:pPr>
+            <a:r>
+              <a:rPr lang="pt-BR" sz="2200" dirty="0">
+                <a:latin typeface="Times New Roman" panose="02020603050405020304" pitchFamily="18" charset="0"/>
+                <a:cs typeface="Times New Roman" panose="02020603050405020304" pitchFamily="18" charset="0"/>
+              </a:rPr>
+              <a:t>Polimorfismo de </a:t>
+            </a:r>
+            <a:r>
+              <a:rPr lang="pt-BR" sz="2200" b="1" dirty="0">
+                <a:solidFill>
+                  <a:srgbClr val="FF0000"/>
+                </a:solidFill>
+                <a:latin typeface="Times New Roman" panose="02020603050405020304" pitchFamily="18" charset="0"/>
+                <a:cs typeface="Times New Roman" panose="02020603050405020304" pitchFamily="18" charset="0"/>
+              </a:rPr>
+              <a:t>sobrecarga</a:t>
+            </a:r>
+            <a:r>
+              <a:rPr lang="pt-BR" sz="2200" dirty="0">
+                <a:latin typeface="Times New Roman" panose="02020603050405020304" pitchFamily="18" charset="0"/>
+                <a:cs typeface="Times New Roman" panose="02020603050405020304" pitchFamily="18" charset="0"/>
+              </a:rPr>
+              <a:t> (</a:t>
+            </a:r>
+            <a:r>
+              <a:rPr lang="pt-BR" sz="2200" b="1" dirty="0">
+                <a:latin typeface="Times New Roman" panose="02020603050405020304" pitchFamily="18" charset="0"/>
+                <a:cs typeface="Times New Roman" panose="02020603050405020304" pitchFamily="18" charset="0"/>
+              </a:rPr>
+              <a:t>estática</a:t>
+            </a:r>
+            <a:r>
+              <a:rPr lang="pt-BR" sz="2200" dirty="0">
+                <a:latin typeface="Times New Roman" panose="02020603050405020304" pitchFamily="18" charset="0"/>
+                <a:cs typeface="Times New Roman" panose="02020603050405020304" pitchFamily="18" charset="0"/>
+              </a:rPr>
+              <a:t>)</a:t>
+            </a:r>
+          </a:p>
+          <a:p>
+            <a:pPr algn="just">
+              <a:buFont typeface="Wingdings" panose="05000000000000000000" pitchFamily="2" charset="2"/>
+              <a:buChar char="§"/>
+            </a:pPr>
+            <a:r>
+              <a:rPr lang="pt-BR" sz="2200" dirty="0">
+                <a:latin typeface="Times New Roman" panose="02020603050405020304" pitchFamily="18" charset="0"/>
+                <a:cs typeface="Times New Roman" panose="02020603050405020304" pitchFamily="18" charset="0"/>
+              </a:rPr>
+              <a:t>Polimorfismo de </a:t>
+            </a:r>
+            <a:r>
+              <a:rPr lang="pt-BR" sz="2200" b="1" dirty="0">
+                <a:solidFill>
+                  <a:srgbClr val="FF0000"/>
+                </a:solidFill>
+                <a:latin typeface="Times New Roman" panose="02020603050405020304" pitchFamily="18" charset="0"/>
+                <a:cs typeface="Times New Roman" panose="02020603050405020304" pitchFamily="18" charset="0"/>
+              </a:rPr>
+              <a:t>sobreposição</a:t>
+            </a:r>
+            <a:r>
+              <a:rPr lang="pt-BR" sz="2200" dirty="0">
+                <a:latin typeface="Times New Roman" panose="02020603050405020304" pitchFamily="18" charset="0"/>
+                <a:cs typeface="Times New Roman" panose="02020603050405020304" pitchFamily="18" charset="0"/>
+              </a:rPr>
+              <a:t> (</a:t>
+            </a:r>
+            <a:r>
+              <a:rPr lang="pt-BR" sz="2200" b="1" dirty="0">
+                <a:latin typeface="Times New Roman" panose="02020603050405020304" pitchFamily="18" charset="0"/>
+                <a:cs typeface="Times New Roman" panose="02020603050405020304" pitchFamily="18" charset="0"/>
+              </a:rPr>
+              <a:t>dinâmica</a:t>
+            </a:r>
+            <a:r>
+              <a:rPr lang="pt-BR" sz="2200" dirty="0">
+                <a:latin typeface="Times New Roman" panose="02020603050405020304" pitchFamily="18" charset="0"/>
+                <a:cs typeface="Times New Roman" panose="02020603050405020304" pitchFamily="18" charset="0"/>
+              </a:rPr>
+              <a:t>)</a:t>
+            </a:r>
+          </a:p>
+          <a:p>
+            <a:pPr algn="just">
+              <a:buFont typeface="Wingdings" panose="05000000000000000000" pitchFamily="2" charset="2"/>
+              <a:buChar char="§"/>
+            </a:pPr>
+            <a:r>
+              <a:rPr lang="pt-BR" sz="2200" dirty="0">
+                <a:latin typeface="Times New Roman" panose="02020603050405020304" pitchFamily="18" charset="0"/>
+                <a:cs typeface="Times New Roman" panose="02020603050405020304" pitchFamily="18" charset="0"/>
+              </a:rPr>
+              <a:t>Polimorfismo de </a:t>
+            </a:r>
+            <a:r>
+              <a:rPr lang="pt-BR" sz="2200" b="1" dirty="0">
+                <a:solidFill>
+                  <a:srgbClr val="FF0000"/>
+                </a:solidFill>
+                <a:latin typeface="Times New Roman" panose="02020603050405020304" pitchFamily="18" charset="0"/>
+                <a:cs typeface="Times New Roman" panose="02020603050405020304" pitchFamily="18" charset="0"/>
+              </a:rPr>
+              <a:t>inclusão</a:t>
+            </a:r>
+          </a:p>
+          <a:p>
             <a:pPr marL="0" indent="0" algn="just">
               <a:buNone/>
             </a:pPr>
-            <a:r>
-              <a:rPr lang="pt-BR" sz="2000" b="1" dirty="0" err="1">
-                <a:latin typeface="Times New Roman" panose="02020603050405020304" pitchFamily="18" charset="0"/>
-                <a:cs typeface="Times New Roman" panose="02020603050405020304" pitchFamily="18" charset="0"/>
-              </a:rPr>
-              <a:t>class</a:t>
-            </a:r>
-            <a:r>
-              <a:rPr lang="pt-BR" sz="2000" dirty="0">
-                <a:latin typeface="Times New Roman" panose="02020603050405020304" pitchFamily="18" charset="0"/>
-                <a:cs typeface="Times New Roman" panose="02020603050405020304" pitchFamily="18" charset="0"/>
-              </a:rPr>
-              <a:t> </a:t>
-            </a:r>
-            <a:r>
-              <a:rPr lang="pt-BR" sz="2000" b="1" dirty="0">
-                <a:latin typeface="Times New Roman" panose="02020603050405020304" pitchFamily="18" charset="0"/>
-                <a:cs typeface="Times New Roman" panose="02020603050405020304" pitchFamily="18" charset="0"/>
-              </a:rPr>
-              <a:t>Sub</a:t>
-            </a:r>
-            <a:r>
-              <a:rPr lang="pt-BR" sz="2000" dirty="0">
-                <a:latin typeface="Times New Roman" panose="02020603050405020304" pitchFamily="18" charset="0"/>
-                <a:cs typeface="Times New Roman" panose="02020603050405020304" pitchFamily="18" charset="0"/>
-              </a:rPr>
-              <a:t>(</a:t>
-            </a:r>
-            <a:r>
-              <a:rPr lang="pt-BR" sz="2000" b="1" dirty="0">
-                <a:solidFill>
-                  <a:srgbClr val="FF0000"/>
-                </a:solidFill>
-                <a:latin typeface="Times New Roman" panose="02020603050405020304" pitchFamily="18" charset="0"/>
-                <a:cs typeface="Times New Roman" panose="02020603050405020304" pitchFamily="18" charset="0"/>
-              </a:rPr>
-              <a:t>Super</a:t>
-            </a:r>
-            <a:r>
-              <a:rPr lang="pt-BR" sz="2000" dirty="0">
-                <a:latin typeface="Times New Roman" panose="02020603050405020304" pitchFamily="18" charset="0"/>
-                <a:cs typeface="Times New Roman" panose="02020603050405020304" pitchFamily="18" charset="0"/>
-              </a:rPr>
-              <a:t>):</a:t>
-            </a:r>
-          </a:p>
-          <a:p>
-            <a:pPr marL="0" indent="0" algn="just">
-              <a:buNone/>
-            </a:pPr>
-            <a:r>
-              <a:rPr lang="pt-BR" sz="2000" dirty="0">
-                <a:latin typeface="Times New Roman" panose="02020603050405020304" pitchFamily="18" charset="0"/>
-                <a:cs typeface="Times New Roman" panose="02020603050405020304" pitchFamily="18" charset="0"/>
-              </a:rPr>
-              <a:t>    </a:t>
-            </a:r>
-            <a:r>
-              <a:rPr lang="pt-BR" sz="2000" b="1" dirty="0" err="1">
-                <a:latin typeface="Times New Roman" panose="02020603050405020304" pitchFamily="18" charset="0"/>
-                <a:cs typeface="Times New Roman" panose="02020603050405020304" pitchFamily="18" charset="0"/>
-              </a:rPr>
-              <a:t>def</a:t>
-            </a:r>
-            <a:r>
-              <a:rPr lang="pt-BR" sz="2000" dirty="0">
-                <a:latin typeface="Times New Roman" panose="02020603050405020304" pitchFamily="18" charset="0"/>
-                <a:cs typeface="Times New Roman" panose="02020603050405020304" pitchFamily="18" charset="0"/>
-              </a:rPr>
-              <a:t> </a:t>
-            </a:r>
-            <a:r>
-              <a:rPr lang="pt-BR" sz="2000" b="1" dirty="0">
-                <a:solidFill>
-                  <a:srgbClr val="FF0000"/>
-                </a:solidFill>
-                <a:latin typeface="Times New Roman" panose="02020603050405020304" pitchFamily="18" charset="0"/>
-                <a:cs typeface="Times New Roman" panose="02020603050405020304" pitchFamily="18" charset="0"/>
-              </a:rPr>
-              <a:t>soma</a:t>
-            </a:r>
-            <a:r>
-              <a:rPr lang="pt-BR" sz="2000" dirty="0">
-                <a:latin typeface="Times New Roman" panose="02020603050405020304" pitchFamily="18" charset="0"/>
-                <a:cs typeface="Times New Roman" panose="02020603050405020304" pitchFamily="18" charset="0"/>
-              </a:rPr>
-              <a:t>(</a:t>
-            </a:r>
-            <a:r>
-              <a:rPr lang="pt-BR" sz="2000" b="1" dirty="0">
-                <a:latin typeface="Times New Roman" panose="02020603050405020304" pitchFamily="18" charset="0"/>
-                <a:cs typeface="Times New Roman" panose="02020603050405020304" pitchFamily="18" charset="0"/>
-              </a:rPr>
-              <a:t>self</a:t>
-            </a:r>
-            <a:r>
-              <a:rPr lang="pt-BR" sz="2000" dirty="0">
-                <a:latin typeface="Times New Roman" panose="02020603050405020304" pitchFamily="18" charset="0"/>
-                <a:cs typeface="Times New Roman" panose="02020603050405020304" pitchFamily="18" charset="0"/>
-              </a:rPr>
-              <a:t>, x, y, z):</a:t>
-            </a:r>
-          </a:p>
-          <a:p>
-            <a:pPr marL="0" indent="0" algn="just">
-              <a:buNone/>
-            </a:pPr>
-            <a:r>
-              <a:rPr lang="pt-BR" sz="2000" dirty="0">
-                <a:latin typeface="Times New Roman" panose="02020603050405020304" pitchFamily="18" charset="0"/>
-                <a:cs typeface="Times New Roman" panose="02020603050405020304" pitchFamily="18" charset="0"/>
-              </a:rPr>
-              <a:t>        </a:t>
-            </a:r>
-            <a:r>
-              <a:rPr lang="pt-BR" sz="2000" b="1" dirty="0" err="1">
-                <a:latin typeface="Times New Roman" panose="02020603050405020304" pitchFamily="18" charset="0"/>
-                <a:cs typeface="Times New Roman" panose="02020603050405020304" pitchFamily="18" charset="0"/>
-              </a:rPr>
-              <a:t>return</a:t>
-            </a:r>
-            <a:r>
-              <a:rPr lang="pt-BR" sz="2000" dirty="0">
-                <a:latin typeface="Times New Roman" panose="02020603050405020304" pitchFamily="18" charset="0"/>
-                <a:cs typeface="Times New Roman" panose="02020603050405020304" pitchFamily="18" charset="0"/>
-              </a:rPr>
-              <a:t> x + y + z</a:t>
-            </a:r>
-          </a:p>
-          <a:p>
-            <a:pPr marL="0" indent="0" algn="just">
-              <a:buNone/>
-            </a:pPr>
-            <a:endParaRPr lang="pt-BR" sz="2000" dirty="0">
+            <a:endParaRPr lang="pt-BR" sz="2200" dirty="0">
               <a:latin typeface="Times New Roman" panose="02020603050405020304" pitchFamily="18" charset="0"/>
               <a:cs typeface="Times New Roman" panose="02020603050405020304" pitchFamily="18" charset="0"/>
             </a:endParaRPr>
@@ -13230,119 +13196,27 @@
               <a:buNone/>
             </a:pPr>
             <a:r>
-              <a:rPr lang="pt-BR" sz="2000" b="1" dirty="0">
-                <a:latin typeface="Times New Roman" panose="02020603050405020304" pitchFamily="18" charset="0"/>
-                <a:cs typeface="Times New Roman" panose="02020603050405020304" pitchFamily="18" charset="0"/>
-              </a:rPr>
-              <a:t>print</a:t>
-            </a:r>
-            <a:r>
-              <a:rPr lang="pt-BR" sz="2000" dirty="0">
-                <a:latin typeface="Times New Roman" panose="02020603050405020304" pitchFamily="18" charset="0"/>
-                <a:cs typeface="Times New Roman" panose="02020603050405020304" pitchFamily="18" charset="0"/>
-              </a:rPr>
-              <a:t>(</a:t>
-            </a:r>
-            <a:r>
-              <a:rPr lang="pt-BR" sz="2000" b="1" dirty="0">
-                <a:solidFill>
-                  <a:srgbClr val="FF0000"/>
-                </a:solidFill>
-                <a:latin typeface="Times New Roman" panose="02020603050405020304" pitchFamily="18" charset="0"/>
-                <a:cs typeface="Times New Roman" panose="02020603050405020304" pitchFamily="18" charset="0"/>
-              </a:rPr>
-              <a:t>Super</a:t>
-            </a:r>
-            <a:r>
-              <a:rPr lang="pt-BR" sz="2000" dirty="0">
-                <a:latin typeface="Times New Roman" panose="02020603050405020304" pitchFamily="18" charset="0"/>
-                <a:cs typeface="Times New Roman" panose="02020603050405020304" pitchFamily="18" charset="0"/>
-              </a:rPr>
-              <a:t>().</a:t>
-            </a:r>
-            <a:r>
-              <a:rPr lang="pt-BR" sz="2000" b="1" dirty="0">
-                <a:solidFill>
-                  <a:srgbClr val="FF0000"/>
-                </a:solidFill>
-                <a:latin typeface="Times New Roman" panose="02020603050405020304" pitchFamily="18" charset="0"/>
-                <a:cs typeface="Times New Roman" panose="02020603050405020304" pitchFamily="18" charset="0"/>
-              </a:rPr>
-              <a:t>soma</a:t>
-            </a:r>
-            <a:r>
-              <a:rPr lang="pt-BR" sz="2000" dirty="0">
-                <a:latin typeface="Times New Roman" panose="02020603050405020304" pitchFamily="18" charset="0"/>
-                <a:cs typeface="Times New Roman" panose="02020603050405020304" pitchFamily="18" charset="0"/>
-              </a:rPr>
-              <a:t>(2, 3)) # </a:t>
-            </a:r>
-            <a:r>
-              <a:rPr lang="pt-BR" sz="2000" b="1" dirty="0">
-                <a:latin typeface="Times New Roman" panose="02020603050405020304" pitchFamily="18" charset="0"/>
-                <a:cs typeface="Times New Roman" panose="02020603050405020304" pitchFamily="18" charset="0"/>
-              </a:rPr>
-              <a:t>print</a:t>
-            </a:r>
-            <a:r>
-              <a:rPr lang="pt-BR" sz="2000">
-                <a:latin typeface="Times New Roman" panose="02020603050405020304" pitchFamily="18" charset="0"/>
-                <a:cs typeface="Times New Roman" panose="02020603050405020304" pitchFamily="18" charset="0"/>
-              </a:rPr>
-              <a:t>(</a:t>
-            </a:r>
-            <a:r>
-              <a:rPr lang="pt-BR" sz="2000" b="1">
-                <a:solidFill>
-                  <a:srgbClr val="FF0000"/>
-                </a:solidFill>
-                <a:latin typeface="Times New Roman" panose="02020603050405020304" pitchFamily="18" charset="0"/>
-                <a:cs typeface="Times New Roman" panose="02020603050405020304" pitchFamily="18" charset="0"/>
-              </a:rPr>
-              <a:t>Sub</a:t>
-            </a:r>
-            <a:r>
-              <a:rPr lang="pt-BR" sz="2000">
-                <a:latin typeface="Times New Roman" panose="02020603050405020304" pitchFamily="18" charset="0"/>
-                <a:cs typeface="Times New Roman" panose="02020603050405020304" pitchFamily="18" charset="0"/>
-              </a:rPr>
-              <a:t>().</a:t>
-            </a:r>
-            <a:r>
-              <a:rPr lang="pt-BR" sz="2000" b="1" dirty="0">
-                <a:solidFill>
-                  <a:srgbClr val="FF0000"/>
-                </a:solidFill>
-                <a:latin typeface="Times New Roman" panose="02020603050405020304" pitchFamily="18" charset="0"/>
-                <a:cs typeface="Times New Roman" panose="02020603050405020304" pitchFamily="18" charset="0"/>
-              </a:rPr>
-              <a:t>soma</a:t>
-            </a:r>
-            <a:r>
-              <a:rPr lang="pt-BR" sz="2000" dirty="0">
-                <a:latin typeface="Times New Roman" panose="02020603050405020304" pitchFamily="18" charset="0"/>
-                <a:cs typeface="Times New Roman" panose="02020603050405020304" pitchFamily="18" charset="0"/>
-              </a:rPr>
-              <a:t>(2</a:t>
-            </a:r>
-            <a:r>
-              <a:rPr lang="pt-BR" sz="2000">
-                <a:latin typeface="Times New Roman" panose="02020603050405020304" pitchFamily="18" charset="0"/>
-                <a:cs typeface="Times New Roman" panose="02020603050405020304" pitchFamily="18" charset="0"/>
-              </a:rPr>
-              <a:t>, 3, 7)) </a:t>
-            </a:r>
-            <a:endParaRPr lang="pt-BR" sz="2000" dirty="0">
-              <a:latin typeface="Times New Roman" panose="02020603050405020304" pitchFamily="18" charset="0"/>
-              <a:cs typeface="Times New Roman" panose="02020603050405020304" pitchFamily="18" charset="0"/>
-            </a:endParaRPr>
+              <a:rPr lang="pt-BR" sz="2200" dirty="0">
+                <a:latin typeface="Times New Roman" panose="02020603050405020304" pitchFamily="18" charset="0"/>
+                <a:cs typeface="Times New Roman" panose="02020603050405020304" pitchFamily="18" charset="0"/>
+                <a:hlinkClick r:id="rId3"/>
+              </a:rPr>
+              <a:t>https://www.devmedia.com.br/sobrecarga-e-sobreposicao-de-metodos-em-orientacao-a-objetos/33066</a:t>
+            </a:r>
+            <a:r>
+              <a:rPr lang="pt-BR" sz="2200" dirty="0">
+                <a:latin typeface="Times New Roman" panose="02020603050405020304" pitchFamily="18" charset="0"/>
+                <a:cs typeface="Times New Roman" panose="02020603050405020304" pitchFamily="18" charset="0"/>
+              </a:rPr>
+              <a:t> </a:t>
+            </a:r>
           </a:p>
         </p:txBody>
       </p:sp>
     </p:spTree>
     <p:extLst>
       <p:ext uri="{BB962C8B-B14F-4D97-AF65-F5344CB8AC3E}">
-        <p14:creationId xmlns:p14="http://schemas.microsoft.com/office/powerpoint/2010/main" val="1050614927"/>
+        <p14:creationId xmlns:p14="http://schemas.microsoft.com/office/powerpoint/2010/main" val="2086610683"/>
       </p:ext>
     </p:extLst>
   </p:cSld>
@@ -13430,24 +13304,60 @@
               <a:buNone/>
             </a:pPr>
             <a:r>
+              <a:rPr lang="pt-BR" sz="2000" b="1" dirty="0" err="1">
+                <a:latin typeface="Times New Roman" panose="02020603050405020304" pitchFamily="18" charset="0"/>
+                <a:cs typeface="Times New Roman" panose="02020603050405020304" pitchFamily="18" charset="0"/>
+              </a:rPr>
+              <a:t>class</a:t>
+            </a:r>
+            <a:r>
               <a:rPr lang="pt-BR" sz="2000" dirty="0">
                 <a:latin typeface="Times New Roman" panose="02020603050405020304" pitchFamily="18" charset="0"/>
                 <a:cs typeface="Times New Roman" panose="02020603050405020304" pitchFamily="18" charset="0"/>
               </a:rPr>
-              <a:t>A classe </a:t>
+              <a:t> </a:t>
             </a:r>
             <a:r>
               <a:rPr lang="pt-BR" sz="2000" b="1" dirty="0">
-                <a:latin typeface="Times New Roman" panose="02020603050405020304" pitchFamily="18" charset="0"/>
-                <a:cs typeface="Times New Roman" panose="02020603050405020304" pitchFamily="18" charset="0"/>
-              </a:rPr>
-              <a:t>Sub</a:t>
+                <a:solidFill>
+                  <a:srgbClr val="FF0000"/>
+                </a:solidFill>
+                <a:latin typeface="Times New Roman" panose="02020603050405020304" pitchFamily="18" charset="0"/>
+                <a:cs typeface="Times New Roman" panose="02020603050405020304" pitchFamily="18" charset="0"/>
+              </a:rPr>
+              <a:t>Super</a:t>
             </a:r>
             <a:r>
               <a:rPr lang="pt-BR" sz="2000" dirty="0">
                 <a:latin typeface="Times New Roman" panose="02020603050405020304" pitchFamily="18" charset="0"/>
                 <a:cs typeface="Times New Roman" panose="02020603050405020304" pitchFamily="18" charset="0"/>
               </a:rPr>
+              <a:t>:</a:t>
+            </a:r>
+          </a:p>
+          <a:p>
+            <a:pPr marL="0" indent="0" algn="just">
+              <a:buNone/>
+            </a:pPr>
+            <a:r>
+              <a:rPr lang="pt-BR" sz="2000" dirty="0">
+                <a:latin typeface="Times New Roman" panose="02020603050405020304" pitchFamily="18" charset="0"/>
+                <a:cs typeface="Times New Roman" panose="02020603050405020304" pitchFamily="18" charset="0"/>
+              </a:rPr>
+              <a:t>    </a:t>
+            </a:r>
+            <a:r>
+              <a:rPr lang="pt-BR" sz="2000" b="1" dirty="0" err="1">
+                <a:latin typeface="Times New Roman" panose="02020603050405020304" pitchFamily="18" charset="0"/>
+                <a:cs typeface="Times New Roman" panose="02020603050405020304" pitchFamily="18" charset="0"/>
+              </a:rPr>
+              <a:t>def</a:t>
+            </a:r>
+            <a:r>
+              <a:rPr lang="pt-BR" sz="2000" dirty="0">
+                <a:latin typeface="Times New Roman" panose="02020603050405020304" pitchFamily="18" charset="0"/>
+                <a:cs typeface="Times New Roman" panose="02020603050405020304" pitchFamily="18" charset="0"/>
+              </a:rPr>
               <a:t> </a:t>
             </a:r>
             <a:r>
@@ -13458,45 +13368,54 @@
                 <a:latin typeface="Times New Roman" panose="02020603050405020304" pitchFamily="18" charset="0"/>
                 <a:cs typeface="Times New Roman" panose="02020603050405020304" pitchFamily="18" charset="0"/>
               </a:rPr>
-              <a:t>herda a Superclasse</a:t>
+              <a:t>soma</a:t>
             </a:r>
             <a:r>
               <a:rPr lang="pt-BR" sz="2000" dirty="0">
                 <a:latin typeface="Times New Roman" panose="02020603050405020304" pitchFamily="18" charset="0"/>
                 <a:cs typeface="Times New Roman" panose="02020603050405020304" pitchFamily="18" charset="0"/>
               </a:rPr>
-              <a:t>, ou seja, tudo que nem na </a:t>
+              <a:t>(</a:t>
             </a:r>
             <a:r>
               <a:rPr lang="pt-BR" sz="2000" b="1" dirty="0">
-                <a:solidFill>
-                  <a:srgbClr val="FF0000"/>
-                </a:solidFill>
-                <a:latin typeface="Times New Roman" panose="02020603050405020304" pitchFamily="18" charset="0"/>
-                <a:cs typeface="Times New Roman" panose="02020603050405020304" pitchFamily="18" charset="0"/>
-              </a:rPr>
-              <a:t>superclasse</a:t>
+                <a:latin typeface="Times New Roman" panose="02020603050405020304" pitchFamily="18" charset="0"/>
+                <a:cs typeface="Times New Roman" panose="02020603050405020304" pitchFamily="18" charset="0"/>
+              </a:rPr>
+              <a:t>self</a:t>
             </a:r>
             <a:r>
               <a:rPr lang="pt-BR" sz="2000" dirty="0">
                 <a:latin typeface="Times New Roman" panose="02020603050405020304" pitchFamily="18" charset="0"/>
                 <a:cs typeface="Times New Roman" panose="02020603050405020304" pitchFamily="18" charset="0"/>
               </a:rPr>
-              <a:t> (</a:t>
-            </a:r>
-            <a:r>
-              <a:rPr lang="pt-BR" sz="2000" b="1" dirty="0">
-                <a:latin typeface="Times New Roman" panose="02020603050405020304" pitchFamily="18" charset="0"/>
-                <a:cs typeface="Times New Roman" panose="02020603050405020304" pitchFamily="18" charset="0"/>
-              </a:rPr>
-              <a:t>atributos e métodos</a:t>
-            </a:r>
+              <a:t>, x, y):</a:t>
+            </a:r>
+          </a:p>
+          <a:p>
+            <a:pPr marL="0" indent="0" algn="just">
+              <a:buNone/>
+            </a:pPr>
             <a:r>
               <a:rPr lang="pt-BR" sz="2000" dirty="0">
                 <a:latin typeface="Times New Roman" panose="02020603050405020304" pitchFamily="18" charset="0"/>
                 <a:cs typeface="Times New Roman" panose="02020603050405020304" pitchFamily="18" charset="0"/>
               </a:rPr>
-              <a:t>), vai ter na subclasse.</a:t>
+              <a:t>        </a:t>
+            </a:r>
+            <a:r>
+              <a:rPr lang="pt-BR" sz="2000" b="1" dirty="0" err="1">
+                <a:latin typeface="Times New Roman" panose="02020603050405020304" pitchFamily="18" charset="0"/>
+                <a:cs typeface="Times New Roman" panose="02020603050405020304" pitchFamily="18" charset="0"/>
+              </a:rPr>
+              <a:t>return</a:t>
+            </a:r>
+            <a:r>
+              <a:rPr lang="pt-BR" sz="2000" dirty="0">
+                <a:latin typeface="Times New Roman" panose="02020603050405020304" pitchFamily="18" charset="0"/>
+                <a:cs typeface="Times New Roman" panose="02020603050405020304" pitchFamily="18" charset="0"/>
+              </a:rPr>
+              <a:t> x + y</a:t>
             </a:r>
           </a:p>
           <a:p>
@@ -13513,25 +13432,32 @@
               <a:buNone/>
             </a:pPr>
             <a:r>
+              <a:rPr lang="pt-BR" sz="2000" b="1" dirty="0" err="1">
+                <a:latin typeface="Times New Roman" panose="02020603050405020304" pitchFamily="18" charset="0"/>
+                <a:cs typeface="Times New Roman" panose="02020603050405020304" pitchFamily="18" charset="0"/>
+              </a:rPr>
+              <a:t>class</a:t>
+            </a:r>
+            <a:r>
               <a:rPr lang="pt-BR" sz="2000" dirty="0">
                 <a:latin typeface="Times New Roman" panose="02020603050405020304" pitchFamily="18" charset="0"/>
                 <a:cs typeface="Times New Roman" panose="02020603050405020304" pitchFamily="18" charset="0"/>
               </a:rPr>
-              <a:t>Porém, quando chamamos o método soma(), ele vai invocar o </a:t>
+              <a:t> </a:t>
             </a:r>
             <a:r>
               <a:rPr lang="pt-BR" sz="2000" b="1" dirty="0">
                 <a:latin typeface="Times New Roman" panose="02020603050405020304" pitchFamily="18" charset="0"/>
                 <a:cs typeface="Times New Roman" panose="02020603050405020304" pitchFamily="18" charset="0"/>
               </a:rPr>
-              <a:t>método da subclasse </a:t>
+              <a:t>Sub</a:t>
             </a:r>
             <a:r>
               <a:rPr lang="pt-BR" sz="2000" dirty="0">
                 <a:latin typeface="Times New Roman" panose="02020603050405020304" pitchFamily="18" charset="0"/>
                 <a:cs typeface="Times New Roman" panose="02020603050405020304" pitchFamily="18" charset="0"/>
               </a:rPr>
-              <a:t>e </a:t>
+              <a:t>(</a:t>
             </a:r>
             <a:r>
               <a:rPr lang="pt-BR" sz="2000" b="1" dirty="0">
@@ -13541,45 +13467,97 @@
                 <a:latin typeface="Times New Roman" panose="02020603050405020304" pitchFamily="18" charset="0"/>
                 <a:cs typeface="Times New Roman" panose="02020603050405020304" pitchFamily="18" charset="0"/>
               </a:rPr>
-              <a:t>não da superclasse</a:t>
+              <a:t>Super</a:t>
             </a:r>
             <a:r>
               <a:rPr lang="pt-BR" sz="2000" dirty="0">
                 <a:latin typeface="Times New Roman" panose="02020603050405020304" pitchFamily="18" charset="0"/>
                 <a:cs typeface="Times New Roman" panose="02020603050405020304" pitchFamily="18" charset="0"/>
               </a:rPr>
-              <a:t>! O Python entende: "Opa, ele instanciou um objeto da </a:t>
+              <a:t>):</a:t>
+            </a:r>
+          </a:p>
+          <a:p>
+            <a:pPr marL="0" indent="0" algn="just">
+              <a:buNone/>
+            </a:pPr>
+            <a:r>
+              <a:rPr lang="pt-BR" sz="2000" dirty="0">
+                <a:latin typeface="Times New Roman" panose="02020603050405020304" pitchFamily="18" charset="0"/>
+                <a:cs typeface="Times New Roman" panose="02020603050405020304" pitchFamily="18" charset="0"/>
+              </a:rPr>
+              <a:t>    </a:t>
+            </a:r>
+            <a:r>
+              <a:rPr lang="pt-BR" sz="2000" b="1" dirty="0" err="1">
+                <a:latin typeface="Times New Roman" panose="02020603050405020304" pitchFamily="18" charset="0"/>
+                <a:cs typeface="Times New Roman" panose="02020603050405020304" pitchFamily="18" charset="0"/>
+              </a:rPr>
+              <a:t>def</a:t>
+            </a:r>
+            <a:r>
+              <a:rPr lang="pt-BR" sz="2000" dirty="0">
+                <a:latin typeface="Times New Roman" panose="02020603050405020304" pitchFamily="18" charset="0"/>
+                <a:cs typeface="Times New Roman" panose="02020603050405020304" pitchFamily="18" charset="0"/>
+              </a:rPr>
+              <a:t> </a:t>
             </a:r>
             <a:r>
               <a:rPr lang="pt-BR" sz="2000" b="1" dirty="0">
-                <a:latin typeface="Times New Roman" panose="02020603050405020304" pitchFamily="18" charset="0"/>
-                <a:cs typeface="Times New Roman" panose="02020603050405020304" pitchFamily="18" charset="0"/>
-              </a:rPr>
-              <a:t>subclasse</a:t>
+                <a:solidFill>
+                  <a:srgbClr val="FF0000"/>
+                </a:solidFill>
+                <a:latin typeface="Times New Roman" panose="02020603050405020304" pitchFamily="18" charset="0"/>
+                <a:cs typeface="Times New Roman" panose="02020603050405020304" pitchFamily="18" charset="0"/>
+              </a:rPr>
+              <a:t>soma</a:t>
             </a:r>
             <a:r>
               <a:rPr lang="pt-BR" sz="2000" dirty="0">
                 <a:latin typeface="Times New Roman" panose="02020603050405020304" pitchFamily="18" charset="0"/>
                 <a:cs typeface="Times New Roman" panose="02020603050405020304" pitchFamily="18" charset="0"/>
               </a:rPr>
-              <a:t>. Por isso </a:t>
+              <a:t>(</a:t>
             </a:r>
             <a:r>
               <a:rPr lang="pt-BR" sz="2000" b="1" dirty="0">
-                <a:solidFill>
-                  <a:srgbClr val="FF0000"/>
-                </a:solidFill>
-                <a:latin typeface="Times New Roman" panose="02020603050405020304" pitchFamily="18" charset="0"/>
-                <a:cs typeface="Times New Roman" panose="02020603050405020304" pitchFamily="18" charset="0"/>
-              </a:rPr>
-              <a:t>vou invocar o método da subclasse e não da superclasse</a:t>
+                <a:latin typeface="Times New Roman" panose="02020603050405020304" pitchFamily="18" charset="0"/>
+                <a:cs typeface="Times New Roman" panose="02020603050405020304" pitchFamily="18" charset="0"/>
+              </a:rPr>
+              <a:t>self</a:t>
             </a:r>
             <a:r>
               <a:rPr lang="pt-BR" sz="2000" dirty="0">
                 <a:latin typeface="Times New Roman" panose="02020603050405020304" pitchFamily="18" charset="0"/>
                 <a:cs typeface="Times New Roman" panose="02020603050405020304" pitchFamily="18" charset="0"/>
               </a:rPr>
-              <a:t>“.</a:t>
+              <a:t>, x, y, z):</a:t>
+            </a:r>
+          </a:p>
+          <a:p>
+            <a:pPr marL="0" indent="0" algn="just">
+              <a:buNone/>
+            </a:pPr>
+            <a:r>
+              <a:rPr lang="pt-BR" sz="2000" dirty="0">
+                <a:latin typeface="Times New Roman" panose="02020603050405020304" pitchFamily="18" charset="0"/>
+                <a:cs typeface="Times New Roman" panose="02020603050405020304" pitchFamily="18" charset="0"/>
+              </a:rPr>
+              <a:t>        </a:t>
+            </a:r>
+            <a:r>
+              <a:rPr lang="pt-BR" sz="2000" b="1" dirty="0" err="1">
+                <a:latin typeface="Times New Roman" panose="02020603050405020304" pitchFamily="18" charset="0"/>
+                <a:cs typeface="Times New Roman" panose="02020603050405020304" pitchFamily="18" charset="0"/>
+              </a:rPr>
+              <a:t>return</a:t>
+            </a:r>
+            <a:r>
+              <a:rPr lang="pt-BR" sz="2000" dirty="0">
+                <a:latin typeface="Times New Roman" panose="02020603050405020304" pitchFamily="18" charset="0"/>
+                <a:cs typeface="Times New Roman" panose="02020603050405020304" pitchFamily="18" charset="0"/>
+              </a:rPr>
+              <a:t> x + y + z</a:t>
             </a:r>
           </a:p>
           <a:p>
@@ -13596,25 +13574,35 @@
               <a:buNone/>
             </a:pPr>
             <a:r>
+              <a:rPr lang="pt-BR" sz="2000" b="1" dirty="0">
+                <a:latin typeface="Times New Roman" panose="02020603050405020304" pitchFamily="18" charset="0"/>
+                <a:cs typeface="Times New Roman" panose="02020603050405020304" pitchFamily="18" charset="0"/>
+              </a:rPr>
+              <a:t>print</a:t>
+            </a:r>
+            <a:r>
               <a:rPr lang="pt-BR" sz="2000" dirty="0">
                 <a:latin typeface="Times New Roman" panose="02020603050405020304" pitchFamily="18" charset="0"/>
                 <a:cs typeface="Times New Roman" panose="02020603050405020304" pitchFamily="18" charset="0"/>
               </a:rPr>
-              <a:t>Ou seja, seu </a:t>
+              <a:t>(</a:t>
             </a:r>
             <a:r>
               <a:rPr lang="pt-BR" sz="2000" b="1" dirty="0">
-                <a:latin typeface="Times New Roman" panose="02020603050405020304" pitchFamily="18" charset="0"/>
-                <a:cs typeface="Times New Roman" panose="02020603050405020304" pitchFamily="18" charset="0"/>
-              </a:rPr>
-              <a:t>objeto assumiu a forma da subclasse</a:t>
+                <a:solidFill>
+                  <a:srgbClr val="FF0000"/>
+                </a:solidFill>
+                <a:latin typeface="Times New Roman" panose="02020603050405020304" pitchFamily="18" charset="0"/>
+                <a:cs typeface="Times New Roman" panose="02020603050405020304" pitchFamily="18" charset="0"/>
+              </a:rPr>
+              <a:t>Super</a:t>
             </a:r>
             <a:r>
               <a:rPr lang="pt-BR" sz="2000" dirty="0">
                 <a:latin typeface="Times New Roman" panose="02020603050405020304" pitchFamily="18" charset="0"/>
                 <a:cs typeface="Times New Roman" panose="02020603050405020304" pitchFamily="18" charset="0"/>
               </a:rPr>
-              <a:t>, embora ele também seja uma </a:t>
+              <a:t>().</a:t>
             </a:r>
             <a:r>
               <a:rPr lang="pt-BR" sz="2000" b="1" dirty="0">
@@ -13624,50 +13612,81 @@
                 <a:latin typeface="Times New Roman" panose="02020603050405020304" pitchFamily="18" charset="0"/>
                 <a:cs typeface="Times New Roman" panose="02020603050405020304" pitchFamily="18" charset="0"/>
               </a:rPr>
-              <a:t>superclasse</a:t>
+              <a:t>soma</a:t>
             </a:r>
             <a:r>
               <a:rPr lang="pt-BR" sz="2000" dirty="0">
                 <a:latin typeface="Times New Roman" panose="02020603050405020304" pitchFamily="18" charset="0"/>
                 <a:cs typeface="Times New Roman" panose="02020603050405020304" pitchFamily="18" charset="0"/>
               </a:rPr>
-              <a:t>. Dizemos que o método da subclasse fez uma </a:t>
+              <a:t>(2, 3)) # </a:t>
             </a:r>
             <a:r>
               <a:rPr lang="pt-BR" sz="2000" b="1" dirty="0">
                 <a:latin typeface="Times New Roman" panose="02020603050405020304" pitchFamily="18" charset="0"/>
                 <a:cs typeface="Times New Roman" panose="02020603050405020304" pitchFamily="18" charset="0"/>
               </a:rPr>
-              <a:t>sobreposição</a:t>
+              <a:t>print</a:t>
+            </a:r>
+            <a:r>
+              <a:rPr lang="pt-BR" sz="2000">
+                <a:latin typeface="Times New Roman" panose="02020603050405020304" pitchFamily="18" charset="0"/>
+                <a:cs typeface="Times New Roman" panose="02020603050405020304" pitchFamily="18" charset="0"/>
+              </a:rPr>
+              <a:t>(</a:t>
+            </a:r>
+            <a:r>
+              <a:rPr lang="pt-BR" sz="2000" b="1">
+                <a:solidFill>
+                  <a:srgbClr val="FF0000"/>
+                </a:solidFill>
+                <a:latin typeface="Times New Roman" panose="02020603050405020304" pitchFamily="18" charset="0"/>
+                <a:cs typeface="Times New Roman" panose="02020603050405020304" pitchFamily="18" charset="0"/>
+              </a:rPr>
+              <a:t>Sub</a:t>
+            </a:r>
+            <a:r>
+              <a:rPr lang="pt-BR" sz="2000">
+                <a:latin typeface="Times New Roman" panose="02020603050405020304" pitchFamily="18" charset="0"/>
+                <a:cs typeface="Times New Roman" panose="02020603050405020304" pitchFamily="18" charset="0"/>
+              </a:rPr>
+              <a:t>().</a:t>
+            </a:r>
+            <a:r>
+              <a:rPr lang="pt-BR" sz="2000" b="1" dirty="0">
+                <a:solidFill>
+                  <a:srgbClr val="FF0000"/>
+                </a:solidFill>
+                <a:latin typeface="Times New Roman" panose="02020603050405020304" pitchFamily="18" charset="0"/>
+                <a:cs typeface="Times New Roman" panose="02020603050405020304" pitchFamily="18" charset="0"/>
+              </a:rPr>
+              <a:t>soma</a:t>
             </a:r>
             <a:r>
               <a:rPr lang="pt-BR" sz="2000" dirty="0">
                 <a:latin typeface="Times New Roman" panose="02020603050405020304" pitchFamily="18" charset="0"/>
                 <a:cs typeface="Times New Roman" panose="02020603050405020304" pitchFamily="18" charset="0"/>
               </a:rPr>
-              <a:t>, ele sobrepôs, passou por cima, do </a:t>
-            </a:r>
-            <a:r>
-              <a:rPr lang="pt-BR" sz="2000" b="1" dirty="0">
-                <a:latin typeface="Times New Roman" panose="02020603050405020304" pitchFamily="18" charset="0"/>
-                <a:cs typeface="Times New Roman" panose="02020603050405020304" pitchFamily="18" charset="0"/>
-              </a:rPr>
-              <a:t>método da superclasse</a:t>
-            </a:r>
-            <a:r>
-              <a:rPr lang="pt-BR" sz="2000" dirty="0">
-                <a:latin typeface="Times New Roman" panose="02020603050405020304" pitchFamily="18" charset="0"/>
-                <a:cs typeface="Times New Roman" panose="02020603050405020304" pitchFamily="18" charset="0"/>
-              </a:rPr>
-              <a:t>.</a:t>
-            </a:r>
+              <a:t>(2</a:t>
+            </a:r>
+            <a:r>
+              <a:rPr lang="pt-BR" sz="2000">
+                <a:latin typeface="Times New Roman" panose="02020603050405020304" pitchFamily="18" charset="0"/>
+                <a:cs typeface="Times New Roman" panose="02020603050405020304" pitchFamily="18" charset="0"/>
+              </a:rPr>
+              <a:t>, 3, 7)) </a:t>
+            </a:r>
+            <a:endParaRPr lang="pt-BR" sz="2000" dirty="0">
+              <a:latin typeface="Times New Roman" panose="02020603050405020304" pitchFamily="18" charset="0"/>
+              <a:cs typeface="Times New Roman" panose="02020603050405020304" pitchFamily="18" charset="0"/>
+            </a:endParaRPr>
           </a:p>
         </p:txBody>
       </p:sp>
     </p:spTree>
     <p:extLst>
       <p:ext uri="{BB962C8B-B14F-4D97-AF65-F5344CB8AC3E}">
-        <p14:creationId xmlns:p14="http://schemas.microsoft.com/office/powerpoint/2010/main" val="1451181704"/>
+        <p14:creationId xmlns:p14="http://schemas.microsoft.com/office/powerpoint/2010/main" val="1050614927"/>
       </p:ext>
     </p:extLst>
   </p:cSld>
@@ -13755,577 +13774,244 @@
               <a:buNone/>
             </a:pPr>
             <a:r>
-              <a:rPr lang="en-US" sz="1600" b="1" dirty="0">
-                <a:highlight>
-                  <a:srgbClr val="FFFF00"/>
-                </a:highlight>
-                <a:latin typeface="Times New Roman" panose="02020603050405020304" pitchFamily="18" charset="0"/>
-                <a:cs typeface="Times New Roman" panose="02020603050405020304" pitchFamily="18" charset="0"/>
-              </a:rPr>
-              <a:t>class</a:t>
-            </a:r>
-            <a:r>
-              <a:rPr lang="en-US" sz="1600" dirty="0">
-                <a:highlight>
-                  <a:srgbClr val="FFFF00"/>
-                </a:highlight>
+              <a:rPr lang="pt-BR" sz="2000" dirty="0">
+                <a:latin typeface="Times New Roman" panose="02020603050405020304" pitchFamily="18" charset="0"/>
+                <a:cs typeface="Times New Roman" panose="02020603050405020304" pitchFamily="18" charset="0"/>
+              </a:rPr>
+              <a:t>A classe </a:t>
+            </a:r>
+            <a:r>
+              <a:rPr lang="pt-BR" sz="2000" b="1" dirty="0">
+                <a:latin typeface="Times New Roman" panose="02020603050405020304" pitchFamily="18" charset="0"/>
+                <a:cs typeface="Times New Roman" panose="02020603050405020304" pitchFamily="18" charset="0"/>
+              </a:rPr>
+              <a:t>Sub</a:t>
+            </a:r>
+            <a:r>
+              <a:rPr lang="pt-BR" sz="2000" dirty="0">
                 <a:latin typeface="Times New Roman" panose="02020603050405020304" pitchFamily="18" charset="0"/>
                 <a:cs typeface="Times New Roman" panose="02020603050405020304" pitchFamily="18" charset="0"/>
               </a:rPr>
               <a:t> </a:t>
             </a:r>
             <a:r>
-              <a:rPr lang="en-US" sz="1600" b="1" dirty="0">
+              <a:rPr lang="pt-BR" sz="2000" b="1" dirty="0">
                 <a:solidFill>
                   <a:srgbClr val="FF0000"/>
                 </a:solidFill>
-                <a:highlight>
-                  <a:srgbClr val="FFFF00"/>
-                </a:highlight>
-                <a:latin typeface="Times New Roman" panose="02020603050405020304" pitchFamily="18" charset="0"/>
-                <a:cs typeface="Times New Roman" panose="02020603050405020304" pitchFamily="18" charset="0"/>
-              </a:rPr>
-              <a:t>Super</a:t>
-            </a:r>
-            <a:r>
-              <a:rPr lang="en-US" sz="1600" dirty="0">
-                <a:highlight>
-                  <a:srgbClr val="FFFF00"/>
-                </a:highlight>
-                <a:latin typeface="Times New Roman" panose="02020603050405020304" pitchFamily="18" charset="0"/>
-                <a:cs typeface="Times New Roman" panose="02020603050405020304" pitchFamily="18" charset="0"/>
-              </a:rPr>
-              <a:t>:</a:t>
+                <a:latin typeface="Times New Roman" panose="02020603050405020304" pitchFamily="18" charset="0"/>
+                <a:cs typeface="Times New Roman" panose="02020603050405020304" pitchFamily="18" charset="0"/>
+              </a:rPr>
+              <a:t>herda a Superclasse</a:t>
+            </a:r>
+            <a:r>
+              <a:rPr lang="pt-BR" sz="2000" dirty="0">
+                <a:latin typeface="Times New Roman" panose="02020603050405020304" pitchFamily="18" charset="0"/>
+                <a:cs typeface="Times New Roman" panose="02020603050405020304" pitchFamily="18" charset="0"/>
+              </a:rPr>
+              <a:t>, ou seja, tudo que nem na </a:t>
+            </a:r>
+            <a:r>
+              <a:rPr lang="pt-BR" sz="2000" b="1" dirty="0">
+                <a:solidFill>
+                  <a:srgbClr val="FF0000"/>
+                </a:solidFill>
+                <a:latin typeface="Times New Roman" panose="02020603050405020304" pitchFamily="18" charset="0"/>
+                <a:cs typeface="Times New Roman" panose="02020603050405020304" pitchFamily="18" charset="0"/>
+              </a:rPr>
+              <a:t>superclasse</a:t>
+            </a:r>
+            <a:r>
+              <a:rPr lang="pt-BR" sz="2000" dirty="0">
+                <a:latin typeface="Times New Roman" panose="02020603050405020304" pitchFamily="18" charset="0"/>
+                <a:cs typeface="Times New Roman" panose="02020603050405020304" pitchFamily="18" charset="0"/>
+              </a:rPr>
+              <a:t> (</a:t>
+            </a:r>
+            <a:r>
+              <a:rPr lang="pt-BR" sz="2000" b="1" dirty="0">
+                <a:latin typeface="Times New Roman" panose="02020603050405020304" pitchFamily="18" charset="0"/>
+                <a:cs typeface="Times New Roman" panose="02020603050405020304" pitchFamily="18" charset="0"/>
+              </a:rPr>
+              <a:t>atributos e métodos</a:t>
+            </a:r>
+            <a:r>
+              <a:rPr lang="pt-BR" sz="2000" dirty="0">
+                <a:latin typeface="Times New Roman" panose="02020603050405020304" pitchFamily="18" charset="0"/>
+                <a:cs typeface="Times New Roman" panose="02020603050405020304" pitchFamily="18" charset="0"/>
+              </a:rPr>
+              <a:t>), vai ter na subclasse.</a:t>
             </a:r>
           </a:p>
           <a:p>
             <a:pPr marL="0" indent="0" algn="just">
               <a:buNone/>
             </a:pPr>
-            <a:r>
-              <a:rPr lang="en-US" sz="1600" b="1" dirty="0">
-                <a:highlight>
-                  <a:srgbClr val="FFFF00"/>
-                </a:highlight>
-                <a:latin typeface="Times New Roman" panose="02020603050405020304" pitchFamily="18" charset="0"/>
-                <a:cs typeface="Times New Roman" panose="02020603050405020304" pitchFamily="18" charset="0"/>
-              </a:rPr>
-              <a:t> def</a:t>
-            </a:r>
-            <a:r>
-              <a:rPr lang="en-US" sz="1600" dirty="0">
-                <a:highlight>
-                  <a:srgbClr val="FFFF00"/>
-                </a:highlight>
-                <a:latin typeface="Times New Roman" panose="02020603050405020304" pitchFamily="18" charset="0"/>
-                <a:cs typeface="Times New Roman" panose="02020603050405020304" pitchFamily="18" charset="0"/>
-              </a:rPr>
-              <a:t> hello(</a:t>
-            </a:r>
-            <a:r>
-              <a:rPr lang="en-US" sz="1600" b="1" dirty="0">
-                <a:highlight>
-                  <a:srgbClr val="FFFF00"/>
-                </a:highlight>
-                <a:latin typeface="Times New Roman" panose="02020603050405020304" pitchFamily="18" charset="0"/>
-                <a:cs typeface="Times New Roman" panose="02020603050405020304" pitchFamily="18" charset="0"/>
-              </a:rPr>
-              <a:t>self</a:t>
-            </a:r>
-            <a:r>
-              <a:rPr lang="en-US" sz="1600" dirty="0">
-                <a:highlight>
-                  <a:srgbClr val="FFFF00"/>
-                </a:highlight>
-                <a:latin typeface="Times New Roman" panose="02020603050405020304" pitchFamily="18" charset="0"/>
-                <a:cs typeface="Times New Roman" panose="02020603050405020304" pitchFamily="18" charset="0"/>
-              </a:rPr>
-              <a:t>):</a:t>
-            </a:r>
-          </a:p>
-          <a:p>
-            <a:pPr marL="0" indent="0" algn="just">
-              <a:buNone/>
-            </a:pPr>
-            <a:r>
-              <a:rPr lang="en-US" sz="1600" dirty="0">
-                <a:highlight>
-                  <a:srgbClr val="FFFF00"/>
-                </a:highlight>
-                <a:latin typeface="Times New Roman" panose="02020603050405020304" pitchFamily="18" charset="0"/>
-                <a:cs typeface="Times New Roman" panose="02020603050405020304" pitchFamily="18" charset="0"/>
-              </a:rPr>
-              <a:t>    </a:t>
-            </a:r>
-            <a:r>
-              <a:rPr lang="en-US" sz="1600" b="1" dirty="0">
-                <a:highlight>
-                  <a:srgbClr val="FFFF00"/>
-                </a:highlight>
-                <a:latin typeface="Times New Roman" panose="02020603050405020304" pitchFamily="18" charset="0"/>
-                <a:cs typeface="Times New Roman" panose="02020603050405020304" pitchFamily="18" charset="0"/>
-              </a:rPr>
-              <a:t>print</a:t>
-            </a:r>
-            <a:r>
-              <a:rPr lang="en-US" sz="1600" dirty="0">
-                <a:highlight>
-                  <a:srgbClr val="FFFF00"/>
-                </a:highlight>
-                <a:latin typeface="Times New Roman" panose="02020603050405020304" pitchFamily="18" charset="0"/>
-                <a:cs typeface="Times New Roman" panose="02020603050405020304" pitchFamily="18" charset="0"/>
-              </a:rPr>
-              <a:t>("</a:t>
-            </a:r>
-            <a:r>
-              <a:rPr lang="en-US" sz="1600" dirty="0" err="1">
-                <a:highlight>
-                  <a:srgbClr val="FFFF00"/>
-                </a:highlight>
-                <a:latin typeface="Times New Roman" panose="02020603050405020304" pitchFamily="18" charset="0"/>
-                <a:cs typeface="Times New Roman" panose="02020603050405020304" pitchFamily="18" charset="0"/>
-              </a:rPr>
-              <a:t>Olá</a:t>
-            </a:r>
-            <a:r>
-              <a:rPr lang="en-US" sz="1600" dirty="0">
-                <a:highlight>
-                  <a:srgbClr val="FFFF00"/>
-                </a:highlight>
-                <a:latin typeface="Times New Roman" panose="02020603050405020304" pitchFamily="18" charset="0"/>
-                <a:cs typeface="Times New Roman" panose="02020603050405020304" pitchFamily="18" charset="0"/>
-              </a:rPr>
-              <a:t>, sou a </a:t>
-            </a:r>
-            <a:r>
-              <a:rPr lang="en-US" sz="1600" dirty="0" err="1">
-                <a:highlight>
-                  <a:srgbClr val="FFFF00"/>
-                </a:highlight>
-                <a:latin typeface="Times New Roman" panose="02020603050405020304" pitchFamily="18" charset="0"/>
-                <a:cs typeface="Times New Roman" panose="02020603050405020304" pitchFamily="18" charset="0"/>
-              </a:rPr>
-              <a:t>superclasse</a:t>
-            </a:r>
-            <a:r>
-              <a:rPr lang="en-US" sz="1600" dirty="0">
-                <a:highlight>
-                  <a:srgbClr val="FFFF00"/>
-                </a:highlight>
-                <a:latin typeface="Times New Roman" panose="02020603050405020304" pitchFamily="18" charset="0"/>
-                <a:cs typeface="Times New Roman" panose="02020603050405020304" pitchFamily="18" charset="0"/>
-              </a:rPr>
-              <a:t>!")</a:t>
-            </a:r>
-          </a:p>
-          <a:p>
-            <a:pPr marL="0" indent="0" algn="just">
-              <a:buNone/>
-            </a:pPr>
-            <a:r>
-              <a:rPr lang="en-US" sz="1600" b="1" dirty="0">
-                <a:highlight>
-                  <a:srgbClr val="00FF00"/>
-                </a:highlight>
-                <a:latin typeface="Times New Roman" panose="02020603050405020304" pitchFamily="18" charset="0"/>
-                <a:cs typeface="Times New Roman" panose="02020603050405020304" pitchFamily="18" charset="0"/>
-              </a:rPr>
-              <a:t>class</a:t>
-            </a:r>
-            <a:r>
-              <a:rPr lang="en-US" sz="1600" dirty="0">
-                <a:highlight>
-                  <a:srgbClr val="00FF00"/>
-                </a:highlight>
-                <a:latin typeface="Times New Roman" panose="02020603050405020304" pitchFamily="18" charset="0"/>
-                <a:cs typeface="Times New Roman" panose="02020603050405020304" pitchFamily="18" charset="0"/>
-              </a:rPr>
-              <a:t> </a:t>
-            </a:r>
-            <a:r>
-              <a:rPr lang="en-US" sz="1600" b="1" dirty="0">
-                <a:highlight>
-                  <a:srgbClr val="00FF00"/>
-                </a:highlight>
-                <a:latin typeface="Times New Roman" panose="02020603050405020304" pitchFamily="18" charset="0"/>
-                <a:cs typeface="Times New Roman" panose="02020603050405020304" pitchFamily="18" charset="0"/>
-              </a:rPr>
-              <a:t>Sub</a:t>
-            </a:r>
-            <a:r>
-              <a:rPr lang="en-US" sz="1600" dirty="0">
-                <a:highlight>
-                  <a:srgbClr val="00FF00"/>
-                </a:highlight>
-                <a:latin typeface="Times New Roman" panose="02020603050405020304" pitchFamily="18" charset="0"/>
-                <a:cs typeface="Times New Roman" panose="02020603050405020304" pitchFamily="18" charset="0"/>
-              </a:rPr>
-              <a:t> (</a:t>
-            </a:r>
-            <a:r>
-              <a:rPr lang="en-US" sz="1600" b="1" dirty="0">
-                <a:solidFill>
-                  <a:srgbClr val="FF0000"/>
-                </a:solidFill>
-                <a:highlight>
-                  <a:srgbClr val="00FF00"/>
-                </a:highlight>
-                <a:latin typeface="Times New Roman" panose="02020603050405020304" pitchFamily="18" charset="0"/>
-                <a:cs typeface="Times New Roman" panose="02020603050405020304" pitchFamily="18" charset="0"/>
-              </a:rPr>
-              <a:t>Super</a:t>
-            </a:r>
-            <a:r>
-              <a:rPr lang="en-US" sz="1600" dirty="0">
-                <a:highlight>
-                  <a:srgbClr val="00FF00"/>
-                </a:highlight>
-                <a:latin typeface="Times New Roman" panose="02020603050405020304" pitchFamily="18" charset="0"/>
-                <a:cs typeface="Times New Roman" panose="02020603050405020304" pitchFamily="18" charset="0"/>
-              </a:rPr>
-              <a:t>):</a:t>
-            </a:r>
-          </a:p>
-          <a:p>
-            <a:pPr marL="0" indent="0" algn="just">
-              <a:buNone/>
-            </a:pPr>
-            <a:r>
-              <a:rPr lang="en-US" sz="1600" b="1" dirty="0">
-                <a:highlight>
-                  <a:srgbClr val="00FF00"/>
-                </a:highlight>
-                <a:latin typeface="Times New Roman" panose="02020603050405020304" pitchFamily="18" charset="0"/>
-                <a:cs typeface="Times New Roman" panose="02020603050405020304" pitchFamily="18" charset="0"/>
-              </a:rPr>
-              <a:t>  def</a:t>
-            </a:r>
-            <a:r>
-              <a:rPr lang="en-US" sz="1600" dirty="0">
-                <a:highlight>
-                  <a:srgbClr val="00FF00"/>
-                </a:highlight>
-                <a:latin typeface="Times New Roman" panose="02020603050405020304" pitchFamily="18" charset="0"/>
-                <a:cs typeface="Times New Roman" panose="02020603050405020304" pitchFamily="18" charset="0"/>
-              </a:rPr>
-              <a:t> hello(self):</a:t>
-            </a:r>
-          </a:p>
-          <a:p>
-            <a:pPr marL="0" indent="0" algn="just">
-              <a:buNone/>
-            </a:pPr>
-            <a:r>
-              <a:rPr lang="en-US" sz="1600" b="1" dirty="0">
-                <a:highlight>
-                  <a:srgbClr val="00FF00"/>
-                </a:highlight>
-                <a:latin typeface="Times New Roman" panose="02020603050405020304" pitchFamily="18" charset="0"/>
-                <a:cs typeface="Times New Roman" panose="02020603050405020304" pitchFamily="18" charset="0"/>
-              </a:rPr>
-              <a:t>     print</a:t>
-            </a:r>
-            <a:r>
-              <a:rPr lang="en-US" sz="1600" dirty="0">
-                <a:highlight>
-                  <a:srgbClr val="00FF00"/>
-                </a:highlight>
-                <a:latin typeface="Times New Roman" panose="02020603050405020304" pitchFamily="18" charset="0"/>
-                <a:cs typeface="Times New Roman" panose="02020603050405020304" pitchFamily="18" charset="0"/>
-              </a:rPr>
-              <a:t>("</a:t>
-            </a:r>
-            <a:r>
-              <a:rPr lang="en-US" sz="1600" dirty="0" err="1">
-                <a:highlight>
-                  <a:srgbClr val="00FF00"/>
-                </a:highlight>
-                <a:latin typeface="Times New Roman" panose="02020603050405020304" pitchFamily="18" charset="0"/>
-                <a:cs typeface="Times New Roman" panose="02020603050405020304" pitchFamily="18" charset="0"/>
-              </a:rPr>
-              <a:t>Olá</a:t>
-            </a:r>
-            <a:r>
-              <a:rPr lang="en-US" sz="1600" dirty="0">
-                <a:highlight>
-                  <a:srgbClr val="00FF00"/>
-                </a:highlight>
-                <a:latin typeface="Times New Roman" panose="02020603050405020304" pitchFamily="18" charset="0"/>
-                <a:cs typeface="Times New Roman" panose="02020603050405020304" pitchFamily="18" charset="0"/>
-              </a:rPr>
-              <a:t>, sou a </a:t>
-            </a:r>
-            <a:r>
-              <a:rPr lang="en-US" sz="1600" dirty="0" err="1">
-                <a:highlight>
-                  <a:srgbClr val="00FF00"/>
-                </a:highlight>
-                <a:latin typeface="Times New Roman" panose="02020603050405020304" pitchFamily="18" charset="0"/>
-                <a:cs typeface="Times New Roman" panose="02020603050405020304" pitchFamily="18" charset="0"/>
-              </a:rPr>
-              <a:t>subclasse</a:t>
-            </a:r>
-            <a:r>
-              <a:rPr lang="en-US" sz="1600" dirty="0">
-                <a:highlight>
-                  <a:srgbClr val="00FF00"/>
-                </a:highlight>
-                <a:latin typeface="Times New Roman" panose="02020603050405020304" pitchFamily="18" charset="0"/>
-                <a:cs typeface="Times New Roman" panose="02020603050405020304" pitchFamily="18" charset="0"/>
-              </a:rPr>
-              <a:t>!")</a:t>
-            </a:r>
-          </a:p>
-          <a:p>
-            <a:pPr marL="0" indent="0" algn="just">
-              <a:buNone/>
-            </a:pPr>
-            <a:r>
-              <a:rPr lang="en-US" sz="1600" b="1" dirty="0">
-                <a:highlight>
-                  <a:srgbClr val="00FFFF"/>
-                </a:highlight>
-                <a:latin typeface="Times New Roman" panose="02020603050405020304" pitchFamily="18" charset="0"/>
-                <a:cs typeface="Times New Roman" panose="02020603050405020304" pitchFamily="18" charset="0"/>
-              </a:rPr>
-              <a:t>class</a:t>
-            </a:r>
-            <a:r>
-              <a:rPr lang="en-US" sz="1600" dirty="0">
-                <a:highlight>
-                  <a:srgbClr val="00FFFF"/>
-                </a:highlight>
-                <a:latin typeface="Times New Roman" panose="02020603050405020304" pitchFamily="18" charset="0"/>
-                <a:cs typeface="Times New Roman" panose="02020603050405020304" pitchFamily="18" charset="0"/>
-              </a:rPr>
-              <a:t> </a:t>
-            </a:r>
-            <a:r>
-              <a:rPr lang="en-US" sz="1600" b="1" dirty="0" err="1">
-                <a:solidFill>
-                  <a:srgbClr val="FF0000"/>
-                </a:solidFill>
-                <a:highlight>
-                  <a:srgbClr val="00FFFF"/>
-                </a:highlight>
-                <a:latin typeface="Times New Roman" panose="02020603050405020304" pitchFamily="18" charset="0"/>
-                <a:cs typeface="Times New Roman" panose="02020603050405020304" pitchFamily="18" charset="0"/>
-              </a:rPr>
-              <a:t>Subsub</a:t>
-            </a:r>
-            <a:r>
-              <a:rPr lang="en-US" sz="1600" dirty="0">
-                <a:highlight>
-                  <a:srgbClr val="00FFFF"/>
-                </a:highlight>
-                <a:latin typeface="Times New Roman" panose="02020603050405020304" pitchFamily="18" charset="0"/>
-                <a:cs typeface="Times New Roman" panose="02020603050405020304" pitchFamily="18" charset="0"/>
-              </a:rPr>
-              <a:t> (</a:t>
-            </a:r>
-            <a:r>
-              <a:rPr lang="en-US" sz="1600" b="1" dirty="0">
-                <a:highlight>
-                  <a:srgbClr val="00FFFF"/>
-                </a:highlight>
-                <a:latin typeface="Times New Roman" panose="02020603050405020304" pitchFamily="18" charset="0"/>
-                <a:cs typeface="Times New Roman" panose="02020603050405020304" pitchFamily="18" charset="0"/>
-              </a:rPr>
-              <a:t>Sub</a:t>
-            </a:r>
-            <a:r>
-              <a:rPr lang="en-US" sz="1600" dirty="0">
-                <a:highlight>
-                  <a:srgbClr val="00FFFF"/>
-                </a:highlight>
-                <a:latin typeface="Times New Roman" panose="02020603050405020304" pitchFamily="18" charset="0"/>
-                <a:cs typeface="Times New Roman" panose="02020603050405020304" pitchFamily="18" charset="0"/>
-              </a:rPr>
-              <a:t>):</a:t>
-            </a:r>
-          </a:p>
-          <a:p>
-            <a:pPr marL="0" indent="0" algn="just">
-              <a:buNone/>
-            </a:pPr>
-            <a:r>
-              <a:rPr lang="en-US" sz="1600" dirty="0">
-                <a:highlight>
-                  <a:srgbClr val="00FFFF"/>
-                </a:highlight>
-                <a:latin typeface="Times New Roman" panose="02020603050405020304" pitchFamily="18" charset="0"/>
-                <a:cs typeface="Times New Roman" panose="02020603050405020304" pitchFamily="18" charset="0"/>
-              </a:rPr>
-              <a:t>   </a:t>
-            </a:r>
-            <a:r>
-              <a:rPr lang="en-US" sz="1600" b="1" dirty="0">
-                <a:highlight>
-                  <a:srgbClr val="00FFFF"/>
-                </a:highlight>
-                <a:latin typeface="Times New Roman" panose="02020603050405020304" pitchFamily="18" charset="0"/>
-                <a:cs typeface="Times New Roman" panose="02020603050405020304" pitchFamily="18" charset="0"/>
-              </a:rPr>
-              <a:t>def</a:t>
-            </a:r>
-            <a:r>
-              <a:rPr lang="en-US" sz="1600" dirty="0">
-                <a:highlight>
-                  <a:srgbClr val="00FFFF"/>
-                </a:highlight>
-                <a:latin typeface="Times New Roman" panose="02020603050405020304" pitchFamily="18" charset="0"/>
-                <a:cs typeface="Times New Roman" panose="02020603050405020304" pitchFamily="18" charset="0"/>
-              </a:rPr>
-              <a:t> hello(self):</a:t>
-            </a:r>
-          </a:p>
-          <a:p>
-            <a:pPr marL="0" indent="0" algn="just">
-              <a:buNone/>
-            </a:pPr>
-            <a:r>
-              <a:rPr lang="en-US" sz="1600" b="1" dirty="0">
-                <a:highlight>
-                  <a:srgbClr val="00FFFF"/>
-                </a:highlight>
-                <a:latin typeface="Times New Roman" panose="02020603050405020304" pitchFamily="18" charset="0"/>
-                <a:cs typeface="Times New Roman" panose="02020603050405020304" pitchFamily="18" charset="0"/>
-              </a:rPr>
-              <a:t>       print</a:t>
-            </a:r>
-            <a:r>
-              <a:rPr lang="en-US" sz="1600" dirty="0">
-                <a:highlight>
-                  <a:srgbClr val="00FFFF"/>
-                </a:highlight>
-                <a:latin typeface="Times New Roman" panose="02020603050405020304" pitchFamily="18" charset="0"/>
-                <a:cs typeface="Times New Roman" panose="02020603050405020304" pitchFamily="18" charset="0"/>
-              </a:rPr>
-              <a:t>("</a:t>
-            </a:r>
-            <a:r>
-              <a:rPr lang="en-US" sz="1600" dirty="0" err="1">
-                <a:highlight>
-                  <a:srgbClr val="00FFFF"/>
-                </a:highlight>
-                <a:latin typeface="Times New Roman" panose="02020603050405020304" pitchFamily="18" charset="0"/>
-                <a:cs typeface="Times New Roman" panose="02020603050405020304" pitchFamily="18" charset="0"/>
-              </a:rPr>
-              <a:t>Olá</a:t>
-            </a:r>
-            <a:r>
-              <a:rPr lang="en-US" sz="1600" dirty="0">
-                <a:highlight>
-                  <a:srgbClr val="00FFFF"/>
-                </a:highlight>
-                <a:latin typeface="Times New Roman" panose="02020603050405020304" pitchFamily="18" charset="0"/>
-                <a:cs typeface="Times New Roman" panose="02020603050405020304" pitchFamily="18" charset="0"/>
-              </a:rPr>
-              <a:t>, sou a </a:t>
-            </a:r>
-            <a:r>
-              <a:rPr lang="en-US" sz="1600" dirty="0" err="1">
-                <a:highlight>
-                  <a:srgbClr val="00FFFF"/>
-                </a:highlight>
-                <a:latin typeface="Times New Roman" panose="02020603050405020304" pitchFamily="18" charset="0"/>
-                <a:cs typeface="Times New Roman" panose="02020603050405020304" pitchFamily="18" charset="0"/>
-              </a:rPr>
-              <a:t>subsubclasse</a:t>
-            </a:r>
-            <a:r>
-              <a:rPr lang="en-US" sz="1600" dirty="0">
-                <a:highlight>
-                  <a:srgbClr val="00FFFF"/>
-                </a:highlight>
-                <a:latin typeface="Times New Roman" panose="02020603050405020304" pitchFamily="18" charset="0"/>
-                <a:cs typeface="Times New Roman" panose="02020603050405020304" pitchFamily="18" charset="0"/>
-              </a:rPr>
-              <a:t>!")</a:t>
-            </a:r>
-          </a:p>
-          <a:p>
-            <a:pPr marL="0" indent="0" algn="just">
-              <a:buNone/>
-            </a:pPr>
-            <a:r>
-              <a:rPr lang="en-US" sz="1600" b="1" dirty="0">
-                <a:latin typeface="Times New Roman" panose="02020603050405020304" pitchFamily="18" charset="0"/>
-                <a:cs typeface="Times New Roman" panose="02020603050405020304" pitchFamily="18" charset="0"/>
-              </a:rPr>
-              <a:t>teste</a:t>
-            </a:r>
-            <a:r>
-              <a:rPr lang="en-US" sz="1600" dirty="0">
-                <a:latin typeface="Times New Roman" panose="02020603050405020304" pitchFamily="18" charset="0"/>
-                <a:cs typeface="Times New Roman" panose="02020603050405020304" pitchFamily="18" charset="0"/>
-              </a:rPr>
-              <a:t> = </a:t>
-            </a:r>
-            <a:r>
-              <a:rPr lang="en-US" sz="1600" b="1" dirty="0" err="1">
-                <a:highlight>
-                  <a:srgbClr val="00FFFF"/>
-                </a:highlight>
-                <a:latin typeface="Times New Roman" panose="02020603050405020304" pitchFamily="18" charset="0"/>
-                <a:cs typeface="Times New Roman" panose="02020603050405020304" pitchFamily="18" charset="0"/>
-              </a:rPr>
-              <a:t>Subsub</a:t>
-            </a:r>
-            <a:r>
-              <a:rPr lang="en-US" sz="1600" dirty="0">
-                <a:latin typeface="Times New Roman" panose="02020603050405020304" pitchFamily="18" charset="0"/>
-                <a:cs typeface="Times New Roman" panose="02020603050405020304" pitchFamily="18" charset="0"/>
-              </a:rPr>
-              <a:t>()</a:t>
-            </a:r>
-          </a:p>
-          <a:p>
-            <a:pPr marL="0" indent="0" algn="just">
-              <a:buNone/>
-            </a:pPr>
-            <a:r>
-              <a:rPr lang="en-US" sz="1600" b="1" dirty="0" err="1">
-                <a:latin typeface="Times New Roman" panose="02020603050405020304" pitchFamily="18" charset="0"/>
-                <a:cs typeface="Times New Roman" panose="02020603050405020304" pitchFamily="18" charset="0"/>
-              </a:rPr>
-              <a:t>teste</a:t>
-            </a:r>
-            <a:r>
-              <a:rPr lang="en-US" sz="1600" dirty="0" err="1">
-                <a:latin typeface="Times New Roman" panose="02020603050405020304" pitchFamily="18" charset="0"/>
-                <a:cs typeface="Times New Roman" panose="02020603050405020304" pitchFamily="18" charset="0"/>
-              </a:rPr>
-              <a:t>.</a:t>
-            </a:r>
-            <a:r>
-              <a:rPr lang="en-US" sz="1600" b="1" dirty="0" err="1">
-                <a:solidFill>
-                  <a:srgbClr val="FF0000"/>
-                </a:solidFill>
-                <a:latin typeface="Times New Roman" panose="02020603050405020304" pitchFamily="18" charset="0"/>
-                <a:cs typeface="Times New Roman" panose="02020603050405020304" pitchFamily="18" charset="0"/>
-              </a:rPr>
-              <a:t>hello</a:t>
-            </a:r>
-            <a:r>
-              <a:rPr lang="en-US" sz="1600" dirty="0">
-                <a:latin typeface="Times New Roman" panose="02020603050405020304" pitchFamily="18" charset="0"/>
-                <a:cs typeface="Times New Roman" panose="02020603050405020304" pitchFamily="18" charset="0"/>
-              </a:rPr>
-              <a:t>()</a:t>
-            </a:r>
-            <a:endParaRPr lang="pt-BR" sz="1600" dirty="0">
+            <a:endParaRPr lang="pt-BR" sz="2000" dirty="0">
               <a:latin typeface="Times New Roman" panose="02020603050405020304" pitchFamily="18" charset="0"/>
               <a:cs typeface="Times New Roman" panose="02020603050405020304" pitchFamily="18" charset="0"/>
             </a:endParaRPr>
           </a:p>
+          <a:p>
+            <a:pPr marL="0" indent="0" algn="just">
+              <a:buNone/>
+            </a:pPr>
+            <a:r>
+              <a:rPr lang="pt-BR" sz="2000" dirty="0">
+                <a:latin typeface="Times New Roman" panose="02020603050405020304" pitchFamily="18" charset="0"/>
+                <a:cs typeface="Times New Roman" panose="02020603050405020304" pitchFamily="18" charset="0"/>
+              </a:rPr>
+              <a:t>Porém, quando chamamos o método soma(), ele vai invocar o </a:t>
+            </a:r>
+            <a:r>
+              <a:rPr lang="pt-BR" sz="2000" b="1" dirty="0">
+                <a:latin typeface="Times New Roman" panose="02020603050405020304" pitchFamily="18" charset="0"/>
+                <a:cs typeface="Times New Roman" panose="02020603050405020304" pitchFamily="18" charset="0"/>
+              </a:rPr>
+              <a:t>método da subclasse </a:t>
+            </a:r>
+            <a:r>
+              <a:rPr lang="pt-BR" sz="2000" dirty="0">
+                <a:latin typeface="Times New Roman" panose="02020603050405020304" pitchFamily="18" charset="0"/>
+                <a:cs typeface="Times New Roman" panose="02020603050405020304" pitchFamily="18" charset="0"/>
+              </a:rPr>
+              <a:t>e </a:t>
+            </a:r>
+            <a:r>
+              <a:rPr lang="pt-BR" sz="2000" b="1" dirty="0">
+                <a:solidFill>
+                  <a:srgbClr val="FF0000"/>
+                </a:solidFill>
+                <a:latin typeface="Times New Roman" panose="02020603050405020304" pitchFamily="18" charset="0"/>
+                <a:cs typeface="Times New Roman" panose="02020603050405020304" pitchFamily="18" charset="0"/>
+              </a:rPr>
+              <a:t>não da superclasse</a:t>
+            </a:r>
+            <a:r>
+              <a:rPr lang="pt-BR" sz="2000" dirty="0">
+                <a:latin typeface="Times New Roman" panose="02020603050405020304" pitchFamily="18" charset="0"/>
+                <a:cs typeface="Times New Roman" panose="02020603050405020304" pitchFamily="18" charset="0"/>
+              </a:rPr>
+              <a:t>! O Python entende: "Opa, ele instanciou um objeto da </a:t>
+            </a:r>
+            <a:r>
+              <a:rPr lang="pt-BR" sz="2000" b="1" dirty="0">
+                <a:latin typeface="Times New Roman" panose="02020603050405020304" pitchFamily="18" charset="0"/>
+                <a:cs typeface="Times New Roman" panose="02020603050405020304" pitchFamily="18" charset="0"/>
+              </a:rPr>
+              <a:t>subclasse</a:t>
+            </a:r>
+            <a:r>
+              <a:rPr lang="pt-BR" sz="2000" dirty="0">
+                <a:latin typeface="Times New Roman" panose="02020603050405020304" pitchFamily="18" charset="0"/>
+                <a:cs typeface="Times New Roman" panose="02020603050405020304" pitchFamily="18" charset="0"/>
+              </a:rPr>
+              <a:t>. Por isso </a:t>
+            </a:r>
+            <a:r>
+              <a:rPr lang="pt-BR" sz="2000" b="1" dirty="0">
+                <a:solidFill>
+                  <a:srgbClr val="FF0000"/>
+                </a:solidFill>
+                <a:latin typeface="Times New Roman" panose="02020603050405020304" pitchFamily="18" charset="0"/>
+                <a:cs typeface="Times New Roman" panose="02020603050405020304" pitchFamily="18" charset="0"/>
+              </a:rPr>
+              <a:t>vou invocar o método da subclasse e não da superclasse</a:t>
+            </a:r>
+            <a:r>
+              <a:rPr lang="pt-BR" sz="2000" dirty="0">
+                <a:latin typeface="Times New Roman" panose="02020603050405020304" pitchFamily="18" charset="0"/>
+                <a:cs typeface="Times New Roman" panose="02020603050405020304" pitchFamily="18" charset="0"/>
+              </a:rPr>
+              <a:t>“.</a:t>
+            </a:r>
+          </a:p>
+          <a:p>
+            <a:pPr marL="0" indent="0" algn="just">
+              <a:buNone/>
+            </a:pPr>
+            <a:endParaRPr lang="pt-BR" sz="2000" dirty="0">
+              <a:latin typeface="Times New Roman" panose="02020603050405020304" pitchFamily="18" charset="0"/>
+              <a:cs typeface="Times New Roman" panose="02020603050405020304" pitchFamily="18" charset="0"/>
+            </a:endParaRPr>
+          </a:p>
+          <a:p>
+            <a:pPr marL="0" indent="0" algn="just">
+              <a:buNone/>
+            </a:pPr>
+            <a:r>
+              <a:rPr lang="pt-BR" sz="2000" dirty="0">
+                <a:latin typeface="Times New Roman" panose="02020603050405020304" pitchFamily="18" charset="0"/>
+                <a:cs typeface="Times New Roman" panose="02020603050405020304" pitchFamily="18" charset="0"/>
+              </a:rPr>
+              <a:t>Ou seja, seu </a:t>
+            </a:r>
+            <a:r>
+              <a:rPr lang="pt-BR" sz="2000" b="1" dirty="0">
+                <a:latin typeface="Times New Roman" panose="02020603050405020304" pitchFamily="18" charset="0"/>
+                <a:cs typeface="Times New Roman" panose="02020603050405020304" pitchFamily="18" charset="0"/>
+              </a:rPr>
+              <a:t>objeto assumiu a forma da subclasse</a:t>
+            </a:r>
+            <a:r>
+              <a:rPr lang="pt-BR" sz="2000" dirty="0">
+                <a:latin typeface="Times New Roman" panose="02020603050405020304" pitchFamily="18" charset="0"/>
+                <a:cs typeface="Times New Roman" panose="02020603050405020304" pitchFamily="18" charset="0"/>
+              </a:rPr>
+              <a:t>, embora ele também seja uma </a:t>
+            </a:r>
+            <a:r>
+              <a:rPr lang="pt-BR" sz="2000" b="1" dirty="0">
+                <a:solidFill>
+                  <a:srgbClr val="FF0000"/>
+                </a:solidFill>
+                <a:latin typeface="Times New Roman" panose="02020603050405020304" pitchFamily="18" charset="0"/>
+                <a:cs typeface="Times New Roman" panose="02020603050405020304" pitchFamily="18" charset="0"/>
+              </a:rPr>
+              <a:t>superclasse</a:t>
+            </a:r>
+            <a:r>
+              <a:rPr lang="pt-BR" sz="2000" dirty="0">
+                <a:latin typeface="Times New Roman" panose="02020603050405020304" pitchFamily="18" charset="0"/>
+                <a:cs typeface="Times New Roman" panose="02020603050405020304" pitchFamily="18" charset="0"/>
+              </a:rPr>
+              <a:t>. Dizemos que o método da subclasse fez uma </a:t>
+            </a:r>
+            <a:r>
+              <a:rPr lang="pt-BR" sz="2000" b="1" dirty="0">
+                <a:latin typeface="Times New Roman" panose="02020603050405020304" pitchFamily="18" charset="0"/>
+                <a:cs typeface="Times New Roman" panose="02020603050405020304" pitchFamily="18" charset="0"/>
+              </a:rPr>
+              <a:t>sobreposição</a:t>
+            </a:r>
+            <a:r>
+              <a:rPr lang="pt-BR" sz="2000" dirty="0">
+                <a:latin typeface="Times New Roman" panose="02020603050405020304" pitchFamily="18" charset="0"/>
+                <a:cs typeface="Times New Roman" panose="02020603050405020304" pitchFamily="18" charset="0"/>
+              </a:rPr>
+              <a:t>, ele sobrepôs, passou por cima, do </a:t>
+            </a:r>
+            <a:r>
+              <a:rPr lang="pt-BR" sz="2000" b="1" dirty="0">
+                <a:latin typeface="Times New Roman" panose="02020603050405020304" pitchFamily="18" charset="0"/>
+                <a:cs typeface="Times New Roman" panose="02020603050405020304" pitchFamily="18" charset="0"/>
+              </a:rPr>
+              <a:t>método da superclasse</a:t>
+            </a:r>
+            <a:r>
+              <a:rPr lang="pt-BR" sz="2000" dirty="0">
+                <a:latin typeface="Times New Roman" panose="02020603050405020304" pitchFamily="18" charset="0"/>
+                <a:cs typeface="Times New Roman" panose="02020603050405020304" pitchFamily="18" charset="0"/>
+              </a:rPr>
+              <a:t>.</a:t>
+            </a:r>
+          </a:p>
         </p:txBody>
       </p:sp>
     </p:spTree>
     <p:extLst>
       <p:ext uri="{BB962C8B-B14F-4D97-AF65-F5344CB8AC3E}">
-        <p14:creationId xmlns:p14="http://schemas.microsoft.com/office/powerpoint/2010/main" val="3350536174"/>
+        <p14:creationId xmlns:p14="http://schemas.microsoft.com/office/powerpoint/2010/main" val="1451181704"/>
       </p:ext>
     </p:extLst>
   </p:cSld>
@@ -14363,42 +14049,27 @@
             <p:ph type="title"/>
           </p:nvPr>
         </p:nvSpPr>
-        <p:spPr/>
+        <p:spPr>
+          <a:xfrm>
+            <a:off x="288099" y="603389"/>
+            <a:ext cx="8719822" cy="549005"/>
+          </a:xfrm>
+        </p:spPr>
         <p:txBody>
           <a:bodyPr>
             <a:normAutofit/>
           </a:bodyPr>
           <a:lstStyle/>
           <a:p>
-            <a:r>
-              <a:rPr lang="en-US" b="1" dirty="0" err="1">
+            <a:pPr algn="ctr"/>
+            <a:r>
+              <a:rPr lang="en-US" b="1" dirty="0">
                 <a:solidFill>
                   <a:srgbClr val="0070C0"/>
                 </a:solidFill>
               </a:rPr>
-              <a:t>Leitura</a:t>
-            </a:r>
-            <a:r>
-              <a:rPr lang="en-US" b="1" dirty="0">
-                <a:solidFill>
-                  <a:srgbClr val="0070C0"/>
-                </a:solidFill>
-              </a:rPr>
-              <a:t> </a:t>
-            </a:r>
-            <a:r>
-              <a:rPr lang="en-US" b="1" dirty="0" err="1">
-                <a:solidFill>
-                  <a:srgbClr val="0070C0"/>
-                </a:solidFill>
-              </a:rPr>
-              <a:t>Específica</a:t>
-            </a:r>
-            <a:endParaRPr lang="en-US" b="1" dirty="0">
-              <a:solidFill>
-                <a:srgbClr val="0070C0"/>
-              </a:solidFill>
-            </a:endParaRPr>
+              <a:t>Python – CLASSES E OO POLIMORFISMO EXEMPLO</a:t>
+            </a:r>
           </a:p>
         </p:txBody>
       </p:sp>
@@ -14414,8 +14085,8 @@
         </p:nvSpPr>
         <p:spPr>
           <a:xfrm>
-            <a:off x="142865" y="1200151"/>
-            <a:ext cx="8865056" cy="3394472"/>
+            <a:off x="142865" y="1152394"/>
+            <a:ext cx="8865056" cy="3948048"/>
           </a:xfrm>
         </p:spPr>
         <p:txBody>
@@ -14427,133 +14098,578 @@
             <a:pPr marL="0" indent="0" algn="just">
               <a:buNone/>
             </a:pPr>
-            <a:endParaRPr lang="pt-BR" sz="2400" dirty="0">
+            <a:r>
+              <a:rPr lang="en-US" sz="1600" b="1" dirty="0">
+                <a:highlight>
+                  <a:srgbClr val="FFFF00"/>
+                </a:highlight>
+                <a:latin typeface="Times New Roman" panose="02020603050405020304" pitchFamily="18" charset="0"/>
+                <a:cs typeface="Times New Roman" panose="02020603050405020304" pitchFamily="18" charset="0"/>
+              </a:rPr>
+              <a:t>class</a:t>
+            </a:r>
+            <a:r>
+              <a:rPr lang="en-US" sz="1600" dirty="0">
+                <a:highlight>
+                  <a:srgbClr val="FFFF00"/>
+                </a:highlight>
+                <a:latin typeface="Times New Roman" panose="02020603050405020304" pitchFamily="18" charset="0"/>
+                <a:cs typeface="Times New Roman" panose="02020603050405020304" pitchFamily="18" charset="0"/>
+              </a:rPr>
+              <a:t> </a:t>
+            </a:r>
+            <a:r>
+              <a:rPr lang="en-US" sz="1600" b="1" dirty="0">
+                <a:solidFill>
+                  <a:srgbClr val="FF0000"/>
+                </a:solidFill>
+                <a:highlight>
+                  <a:srgbClr val="FFFF00"/>
+                </a:highlight>
+                <a:latin typeface="Times New Roman" panose="02020603050405020304" pitchFamily="18" charset="0"/>
+                <a:cs typeface="Times New Roman" panose="02020603050405020304" pitchFamily="18" charset="0"/>
+              </a:rPr>
+              <a:t>Super</a:t>
+            </a:r>
+            <a:r>
+              <a:rPr lang="en-US" sz="1600" dirty="0">
+                <a:highlight>
+                  <a:srgbClr val="FFFF00"/>
+                </a:highlight>
+                <a:latin typeface="Times New Roman" panose="02020603050405020304" pitchFamily="18" charset="0"/>
+                <a:cs typeface="Times New Roman" panose="02020603050405020304" pitchFamily="18" charset="0"/>
+              </a:rPr>
+              <a:t>:</a:t>
+            </a:r>
+          </a:p>
+          <a:p>
+            <a:pPr marL="0" indent="0" algn="just">
+              <a:buNone/>
+            </a:pPr>
+            <a:r>
+              <a:rPr lang="en-US" sz="1600" b="1" dirty="0">
+                <a:highlight>
+                  <a:srgbClr val="FFFF00"/>
+                </a:highlight>
+                <a:latin typeface="Times New Roman" panose="02020603050405020304" pitchFamily="18" charset="0"/>
+                <a:cs typeface="Times New Roman" panose="02020603050405020304" pitchFamily="18" charset="0"/>
+              </a:rPr>
+              <a:t> def</a:t>
+            </a:r>
+            <a:r>
+              <a:rPr lang="en-US" sz="1600" dirty="0">
+                <a:highlight>
+                  <a:srgbClr val="FFFF00"/>
+                </a:highlight>
+                <a:latin typeface="Times New Roman" panose="02020603050405020304" pitchFamily="18" charset="0"/>
+                <a:cs typeface="Times New Roman" panose="02020603050405020304" pitchFamily="18" charset="0"/>
+              </a:rPr>
+              <a:t> hello(</a:t>
+            </a:r>
+            <a:r>
+              <a:rPr lang="en-US" sz="1600" b="1" dirty="0">
+                <a:highlight>
+                  <a:srgbClr val="FFFF00"/>
+                </a:highlight>
+                <a:latin typeface="Times New Roman" panose="02020603050405020304" pitchFamily="18" charset="0"/>
+                <a:cs typeface="Times New Roman" panose="02020603050405020304" pitchFamily="18" charset="0"/>
+              </a:rPr>
+              <a:t>self</a:t>
+            </a:r>
+            <a:r>
+              <a:rPr lang="en-US" sz="1600" dirty="0">
+                <a:highlight>
+                  <a:srgbClr val="FFFF00"/>
+                </a:highlight>
+                <a:latin typeface="Times New Roman" panose="02020603050405020304" pitchFamily="18" charset="0"/>
+                <a:cs typeface="Times New Roman" panose="02020603050405020304" pitchFamily="18" charset="0"/>
+              </a:rPr>
+              <a:t>):</a:t>
+            </a:r>
+          </a:p>
+          <a:p>
+            <a:pPr marL="0" indent="0" algn="just">
+              <a:buNone/>
+            </a:pPr>
+            <a:r>
+              <a:rPr lang="en-US" sz="1600" dirty="0">
+                <a:highlight>
+                  <a:srgbClr val="FFFF00"/>
+                </a:highlight>
+                <a:latin typeface="Times New Roman" panose="02020603050405020304" pitchFamily="18" charset="0"/>
+                <a:cs typeface="Times New Roman" panose="02020603050405020304" pitchFamily="18" charset="0"/>
+              </a:rPr>
+              <a:t>    </a:t>
+            </a:r>
+            <a:r>
+              <a:rPr lang="en-US" sz="1600" b="1" dirty="0">
+                <a:highlight>
+                  <a:srgbClr val="FFFF00"/>
+                </a:highlight>
+                <a:latin typeface="Times New Roman" panose="02020603050405020304" pitchFamily="18" charset="0"/>
+                <a:cs typeface="Times New Roman" panose="02020603050405020304" pitchFamily="18" charset="0"/>
+              </a:rPr>
+              <a:t>print</a:t>
+            </a:r>
+            <a:r>
+              <a:rPr lang="en-US" sz="1600" dirty="0">
+                <a:highlight>
+                  <a:srgbClr val="FFFF00"/>
+                </a:highlight>
+                <a:latin typeface="Times New Roman" panose="02020603050405020304" pitchFamily="18" charset="0"/>
+                <a:cs typeface="Times New Roman" panose="02020603050405020304" pitchFamily="18" charset="0"/>
+              </a:rPr>
+              <a:t>("</a:t>
+            </a:r>
+            <a:r>
+              <a:rPr lang="en-US" sz="1600" dirty="0" err="1">
+                <a:highlight>
+                  <a:srgbClr val="FFFF00"/>
+                </a:highlight>
+                <a:latin typeface="Times New Roman" panose="02020603050405020304" pitchFamily="18" charset="0"/>
+                <a:cs typeface="Times New Roman" panose="02020603050405020304" pitchFamily="18" charset="0"/>
+              </a:rPr>
+              <a:t>Olá</a:t>
+            </a:r>
+            <a:r>
+              <a:rPr lang="en-US" sz="1600" dirty="0">
+                <a:highlight>
+                  <a:srgbClr val="FFFF00"/>
+                </a:highlight>
+                <a:latin typeface="Times New Roman" panose="02020603050405020304" pitchFamily="18" charset="0"/>
+                <a:cs typeface="Times New Roman" panose="02020603050405020304" pitchFamily="18" charset="0"/>
+              </a:rPr>
+              <a:t>, sou a </a:t>
+            </a:r>
+            <a:r>
+              <a:rPr lang="en-US" sz="1600" dirty="0" err="1">
+                <a:highlight>
+                  <a:srgbClr val="FFFF00"/>
+                </a:highlight>
+                <a:latin typeface="Times New Roman" panose="02020603050405020304" pitchFamily="18" charset="0"/>
+                <a:cs typeface="Times New Roman" panose="02020603050405020304" pitchFamily="18" charset="0"/>
+              </a:rPr>
+              <a:t>superclasse</a:t>
+            </a:r>
+            <a:r>
+              <a:rPr lang="en-US" sz="1600" dirty="0">
+                <a:highlight>
+                  <a:srgbClr val="FFFF00"/>
+                </a:highlight>
+                <a:latin typeface="Times New Roman" panose="02020603050405020304" pitchFamily="18" charset="0"/>
+                <a:cs typeface="Times New Roman" panose="02020603050405020304" pitchFamily="18" charset="0"/>
+              </a:rPr>
+              <a:t>!")</a:t>
+            </a:r>
+          </a:p>
+          <a:p>
+            <a:pPr marL="0" indent="0" algn="just">
+              <a:buNone/>
+            </a:pPr>
+            <a:r>
+              <a:rPr lang="en-US" sz="1600" b="1" dirty="0">
+                <a:highlight>
+                  <a:srgbClr val="00FF00"/>
+                </a:highlight>
+                <a:latin typeface="Times New Roman" panose="02020603050405020304" pitchFamily="18" charset="0"/>
+                <a:cs typeface="Times New Roman" panose="02020603050405020304" pitchFamily="18" charset="0"/>
+              </a:rPr>
+              <a:t>class</a:t>
+            </a:r>
+            <a:r>
+              <a:rPr lang="en-US" sz="1600" dirty="0">
+                <a:highlight>
+                  <a:srgbClr val="00FF00"/>
+                </a:highlight>
+                <a:latin typeface="Times New Roman" panose="02020603050405020304" pitchFamily="18" charset="0"/>
+                <a:cs typeface="Times New Roman" panose="02020603050405020304" pitchFamily="18" charset="0"/>
+              </a:rPr>
+              <a:t> </a:t>
+            </a:r>
+            <a:r>
+              <a:rPr lang="en-US" sz="1600" b="1" dirty="0">
+                <a:highlight>
+                  <a:srgbClr val="00FF00"/>
+                </a:highlight>
+                <a:latin typeface="Times New Roman" panose="02020603050405020304" pitchFamily="18" charset="0"/>
+                <a:cs typeface="Times New Roman" panose="02020603050405020304" pitchFamily="18" charset="0"/>
+              </a:rPr>
+              <a:t>Sub</a:t>
+            </a:r>
+            <a:r>
+              <a:rPr lang="en-US" sz="1600" dirty="0">
+                <a:highlight>
+                  <a:srgbClr val="00FF00"/>
+                </a:highlight>
+                <a:latin typeface="Times New Roman" panose="02020603050405020304" pitchFamily="18" charset="0"/>
+                <a:cs typeface="Times New Roman" panose="02020603050405020304" pitchFamily="18" charset="0"/>
+              </a:rPr>
+              <a:t> (</a:t>
+            </a:r>
+            <a:r>
+              <a:rPr lang="en-US" sz="1600" b="1" dirty="0">
+                <a:solidFill>
+                  <a:srgbClr val="FF0000"/>
+                </a:solidFill>
+                <a:highlight>
+                  <a:srgbClr val="00FF00"/>
+                </a:highlight>
+                <a:latin typeface="Times New Roman" panose="02020603050405020304" pitchFamily="18" charset="0"/>
+                <a:cs typeface="Times New Roman" panose="02020603050405020304" pitchFamily="18" charset="0"/>
+              </a:rPr>
+              <a:t>Super</a:t>
+            </a:r>
+            <a:r>
+              <a:rPr lang="en-US" sz="1600" dirty="0">
+                <a:highlight>
+                  <a:srgbClr val="00FF00"/>
+                </a:highlight>
+                <a:latin typeface="Times New Roman" panose="02020603050405020304" pitchFamily="18" charset="0"/>
+                <a:cs typeface="Times New Roman" panose="02020603050405020304" pitchFamily="18" charset="0"/>
+              </a:rPr>
+              <a:t>):</a:t>
+            </a:r>
+          </a:p>
+          <a:p>
+            <a:pPr marL="0" indent="0" algn="just">
+              <a:buNone/>
+            </a:pPr>
+            <a:r>
+              <a:rPr lang="en-US" sz="1600" b="1" dirty="0">
+                <a:highlight>
+                  <a:srgbClr val="00FF00"/>
+                </a:highlight>
+                <a:latin typeface="Times New Roman" panose="02020603050405020304" pitchFamily="18" charset="0"/>
+                <a:cs typeface="Times New Roman" panose="02020603050405020304" pitchFamily="18" charset="0"/>
+              </a:rPr>
+              <a:t>  def</a:t>
+            </a:r>
+            <a:r>
+              <a:rPr lang="en-US" sz="1600" dirty="0">
+                <a:highlight>
+                  <a:srgbClr val="00FF00"/>
+                </a:highlight>
+                <a:latin typeface="Times New Roman" panose="02020603050405020304" pitchFamily="18" charset="0"/>
+                <a:cs typeface="Times New Roman" panose="02020603050405020304" pitchFamily="18" charset="0"/>
+              </a:rPr>
+              <a:t> hello(self):</a:t>
+            </a:r>
+          </a:p>
+          <a:p>
+            <a:pPr marL="0" indent="0" algn="just">
+              <a:buNone/>
+            </a:pPr>
+            <a:r>
+              <a:rPr lang="en-US" sz="1600" b="1" dirty="0">
+                <a:highlight>
+                  <a:srgbClr val="00FF00"/>
+                </a:highlight>
+                <a:latin typeface="Times New Roman" panose="02020603050405020304" pitchFamily="18" charset="0"/>
+                <a:cs typeface="Times New Roman" panose="02020603050405020304" pitchFamily="18" charset="0"/>
+              </a:rPr>
+              <a:t>     print</a:t>
+            </a:r>
+            <a:r>
+              <a:rPr lang="en-US" sz="1600" dirty="0">
+                <a:highlight>
+                  <a:srgbClr val="00FF00"/>
+                </a:highlight>
+                <a:latin typeface="Times New Roman" panose="02020603050405020304" pitchFamily="18" charset="0"/>
+                <a:cs typeface="Times New Roman" panose="02020603050405020304" pitchFamily="18" charset="0"/>
+              </a:rPr>
+              <a:t>("</a:t>
+            </a:r>
+            <a:r>
+              <a:rPr lang="en-US" sz="1600" dirty="0" err="1">
+                <a:highlight>
+                  <a:srgbClr val="00FF00"/>
+                </a:highlight>
+                <a:latin typeface="Times New Roman" panose="02020603050405020304" pitchFamily="18" charset="0"/>
+                <a:cs typeface="Times New Roman" panose="02020603050405020304" pitchFamily="18" charset="0"/>
+              </a:rPr>
+              <a:t>Olá</a:t>
+            </a:r>
+            <a:r>
+              <a:rPr lang="en-US" sz="1600" dirty="0">
+                <a:highlight>
+                  <a:srgbClr val="00FF00"/>
+                </a:highlight>
+                <a:latin typeface="Times New Roman" panose="02020603050405020304" pitchFamily="18" charset="0"/>
+                <a:cs typeface="Times New Roman" panose="02020603050405020304" pitchFamily="18" charset="0"/>
+              </a:rPr>
+              <a:t>, sou a </a:t>
+            </a:r>
+            <a:r>
+              <a:rPr lang="en-US" sz="1600" dirty="0" err="1">
+                <a:highlight>
+                  <a:srgbClr val="00FF00"/>
+                </a:highlight>
+                <a:latin typeface="Times New Roman" panose="02020603050405020304" pitchFamily="18" charset="0"/>
+                <a:cs typeface="Times New Roman" panose="02020603050405020304" pitchFamily="18" charset="0"/>
+              </a:rPr>
+              <a:t>subclasse</a:t>
+            </a:r>
+            <a:r>
+              <a:rPr lang="en-US" sz="1600" dirty="0">
+                <a:highlight>
+                  <a:srgbClr val="00FF00"/>
+                </a:highlight>
+                <a:latin typeface="Times New Roman" panose="02020603050405020304" pitchFamily="18" charset="0"/>
+                <a:cs typeface="Times New Roman" panose="02020603050405020304" pitchFamily="18" charset="0"/>
+              </a:rPr>
+              <a:t>!")</a:t>
+            </a:r>
+          </a:p>
+          <a:p>
+            <a:pPr marL="0" indent="0" algn="just">
+              <a:buNone/>
+            </a:pPr>
+            <a:r>
+              <a:rPr lang="en-US" sz="1600" b="1" dirty="0">
+                <a:highlight>
+                  <a:srgbClr val="00FFFF"/>
+                </a:highlight>
+                <a:latin typeface="Times New Roman" panose="02020603050405020304" pitchFamily="18" charset="0"/>
+                <a:cs typeface="Times New Roman" panose="02020603050405020304" pitchFamily="18" charset="0"/>
+              </a:rPr>
+              <a:t>class</a:t>
+            </a:r>
+            <a:r>
+              <a:rPr lang="en-US" sz="1600" dirty="0">
+                <a:highlight>
+                  <a:srgbClr val="00FFFF"/>
+                </a:highlight>
+                <a:latin typeface="Times New Roman" panose="02020603050405020304" pitchFamily="18" charset="0"/>
+                <a:cs typeface="Times New Roman" panose="02020603050405020304" pitchFamily="18" charset="0"/>
+              </a:rPr>
+              <a:t> </a:t>
+            </a:r>
+            <a:r>
+              <a:rPr lang="en-US" sz="1600" b="1" dirty="0" err="1">
+                <a:solidFill>
+                  <a:srgbClr val="FF0000"/>
+                </a:solidFill>
+                <a:highlight>
+                  <a:srgbClr val="00FFFF"/>
+                </a:highlight>
+                <a:latin typeface="Times New Roman" panose="02020603050405020304" pitchFamily="18" charset="0"/>
+                <a:cs typeface="Times New Roman" panose="02020603050405020304" pitchFamily="18" charset="0"/>
+              </a:rPr>
+              <a:t>Subsub</a:t>
+            </a:r>
+            <a:r>
+              <a:rPr lang="en-US" sz="1600" dirty="0">
+                <a:highlight>
+                  <a:srgbClr val="00FFFF"/>
+                </a:highlight>
+                <a:latin typeface="Times New Roman" panose="02020603050405020304" pitchFamily="18" charset="0"/>
+                <a:cs typeface="Times New Roman" panose="02020603050405020304" pitchFamily="18" charset="0"/>
+              </a:rPr>
+              <a:t> (</a:t>
+            </a:r>
+            <a:r>
+              <a:rPr lang="en-US" sz="1600" b="1" dirty="0">
+                <a:highlight>
+                  <a:srgbClr val="00FFFF"/>
+                </a:highlight>
+                <a:latin typeface="Times New Roman" panose="02020603050405020304" pitchFamily="18" charset="0"/>
+                <a:cs typeface="Times New Roman" panose="02020603050405020304" pitchFamily="18" charset="0"/>
+              </a:rPr>
+              <a:t>Sub</a:t>
+            </a:r>
+            <a:r>
+              <a:rPr lang="en-US" sz="1600" dirty="0">
+                <a:highlight>
+                  <a:srgbClr val="00FFFF"/>
+                </a:highlight>
+                <a:latin typeface="Times New Roman" panose="02020603050405020304" pitchFamily="18" charset="0"/>
+                <a:cs typeface="Times New Roman" panose="02020603050405020304" pitchFamily="18" charset="0"/>
+              </a:rPr>
+              <a:t>):</a:t>
+            </a:r>
+          </a:p>
+          <a:p>
+            <a:pPr marL="0" indent="0" algn="just">
+              <a:buNone/>
+            </a:pPr>
+            <a:r>
+              <a:rPr lang="en-US" sz="1600" dirty="0">
+                <a:highlight>
+                  <a:srgbClr val="00FFFF"/>
+                </a:highlight>
+                <a:latin typeface="Times New Roman" panose="02020603050405020304" pitchFamily="18" charset="0"/>
+                <a:cs typeface="Times New Roman" panose="02020603050405020304" pitchFamily="18" charset="0"/>
+              </a:rPr>
+              <a:t>   </a:t>
+            </a:r>
+            <a:r>
+              <a:rPr lang="en-US" sz="1600" b="1" dirty="0">
+                <a:highlight>
+                  <a:srgbClr val="00FFFF"/>
+                </a:highlight>
+                <a:latin typeface="Times New Roman" panose="02020603050405020304" pitchFamily="18" charset="0"/>
+                <a:cs typeface="Times New Roman" panose="02020603050405020304" pitchFamily="18" charset="0"/>
+              </a:rPr>
+              <a:t>def</a:t>
+            </a:r>
+            <a:r>
+              <a:rPr lang="en-US" sz="1600" dirty="0">
+                <a:highlight>
+                  <a:srgbClr val="00FFFF"/>
+                </a:highlight>
+                <a:latin typeface="Times New Roman" panose="02020603050405020304" pitchFamily="18" charset="0"/>
+                <a:cs typeface="Times New Roman" panose="02020603050405020304" pitchFamily="18" charset="0"/>
+              </a:rPr>
+              <a:t> hello(self):</a:t>
+            </a:r>
+          </a:p>
+          <a:p>
+            <a:pPr marL="0" indent="0" algn="just">
+              <a:buNone/>
+            </a:pPr>
+            <a:r>
+              <a:rPr lang="en-US" sz="1600" b="1" dirty="0">
+                <a:highlight>
+                  <a:srgbClr val="00FFFF"/>
+                </a:highlight>
+                <a:latin typeface="Times New Roman" panose="02020603050405020304" pitchFamily="18" charset="0"/>
+                <a:cs typeface="Times New Roman" panose="02020603050405020304" pitchFamily="18" charset="0"/>
+              </a:rPr>
+              <a:t>       print</a:t>
+            </a:r>
+            <a:r>
+              <a:rPr lang="en-US" sz="1600" dirty="0">
+                <a:highlight>
+                  <a:srgbClr val="00FFFF"/>
+                </a:highlight>
+                <a:latin typeface="Times New Roman" panose="02020603050405020304" pitchFamily="18" charset="0"/>
+                <a:cs typeface="Times New Roman" panose="02020603050405020304" pitchFamily="18" charset="0"/>
+              </a:rPr>
+              <a:t>("</a:t>
+            </a:r>
+            <a:r>
+              <a:rPr lang="en-US" sz="1600" dirty="0" err="1">
+                <a:highlight>
+                  <a:srgbClr val="00FFFF"/>
+                </a:highlight>
+                <a:latin typeface="Times New Roman" panose="02020603050405020304" pitchFamily="18" charset="0"/>
+                <a:cs typeface="Times New Roman" panose="02020603050405020304" pitchFamily="18" charset="0"/>
+              </a:rPr>
+              <a:t>Olá</a:t>
+            </a:r>
+            <a:r>
+              <a:rPr lang="en-US" sz="1600" dirty="0">
+                <a:highlight>
+                  <a:srgbClr val="00FFFF"/>
+                </a:highlight>
+                <a:latin typeface="Times New Roman" panose="02020603050405020304" pitchFamily="18" charset="0"/>
+                <a:cs typeface="Times New Roman" panose="02020603050405020304" pitchFamily="18" charset="0"/>
+              </a:rPr>
+              <a:t>, sou a </a:t>
+            </a:r>
+            <a:r>
+              <a:rPr lang="en-US" sz="1600" dirty="0" err="1">
+                <a:highlight>
+                  <a:srgbClr val="00FFFF"/>
+                </a:highlight>
+                <a:latin typeface="Times New Roman" panose="02020603050405020304" pitchFamily="18" charset="0"/>
+                <a:cs typeface="Times New Roman" panose="02020603050405020304" pitchFamily="18" charset="0"/>
+              </a:rPr>
+              <a:t>subsubclasse</a:t>
+            </a:r>
+            <a:r>
+              <a:rPr lang="en-US" sz="1600" dirty="0">
+                <a:highlight>
+                  <a:srgbClr val="00FFFF"/>
+                </a:highlight>
+                <a:latin typeface="Times New Roman" panose="02020603050405020304" pitchFamily="18" charset="0"/>
+                <a:cs typeface="Times New Roman" panose="02020603050405020304" pitchFamily="18" charset="0"/>
+              </a:rPr>
+              <a:t>!")</a:t>
+            </a:r>
+          </a:p>
+          <a:p>
+            <a:pPr marL="0" indent="0" algn="just">
+              <a:buNone/>
+            </a:pPr>
+            <a:r>
+              <a:rPr lang="en-US" sz="1600" b="1" dirty="0">
+                <a:latin typeface="Times New Roman" panose="02020603050405020304" pitchFamily="18" charset="0"/>
+                <a:cs typeface="Times New Roman" panose="02020603050405020304" pitchFamily="18" charset="0"/>
+              </a:rPr>
+              <a:t>teste</a:t>
+            </a:r>
+            <a:r>
+              <a:rPr lang="en-US" sz="1600" dirty="0">
+                <a:latin typeface="Times New Roman" panose="02020603050405020304" pitchFamily="18" charset="0"/>
+                <a:cs typeface="Times New Roman" panose="02020603050405020304" pitchFamily="18" charset="0"/>
+              </a:rPr>
+              <a:t> = </a:t>
+            </a:r>
+            <a:r>
+              <a:rPr lang="en-US" sz="1600" b="1" dirty="0" err="1">
+                <a:highlight>
+                  <a:srgbClr val="00FFFF"/>
+                </a:highlight>
+                <a:latin typeface="Times New Roman" panose="02020603050405020304" pitchFamily="18" charset="0"/>
+                <a:cs typeface="Times New Roman" panose="02020603050405020304" pitchFamily="18" charset="0"/>
+              </a:rPr>
+              <a:t>Subsub</a:t>
+            </a:r>
+            <a:r>
+              <a:rPr lang="en-US" sz="1600" dirty="0">
+                <a:latin typeface="Times New Roman" panose="02020603050405020304" pitchFamily="18" charset="0"/>
+                <a:cs typeface="Times New Roman" panose="02020603050405020304" pitchFamily="18" charset="0"/>
+              </a:rPr>
+              <a:t>()</a:t>
+            </a:r>
+          </a:p>
+          <a:p>
+            <a:pPr marL="0" indent="0" algn="just">
+              <a:buNone/>
+            </a:pPr>
+            <a:r>
+              <a:rPr lang="en-US" sz="1600" b="1" dirty="0" err="1">
+                <a:latin typeface="Times New Roman" panose="02020603050405020304" pitchFamily="18" charset="0"/>
+                <a:cs typeface="Times New Roman" panose="02020603050405020304" pitchFamily="18" charset="0"/>
+              </a:rPr>
+              <a:t>teste</a:t>
+            </a:r>
+            <a:r>
+              <a:rPr lang="en-US" sz="1600" dirty="0" err="1">
+                <a:latin typeface="Times New Roman" panose="02020603050405020304" pitchFamily="18" charset="0"/>
+                <a:cs typeface="Times New Roman" panose="02020603050405020304" pitchFamily="18" charset="0"/>
+              </a:rPr>
+              <a:t>.</a:t>
+            </a:r>
+            <a:r>
+              <a:rPr lang="en-US" sz="1600" b="1" dirty="0" err="1">
+                <a:solidFill>
+                  <a:srgbClr val="FF0000"/>
+                </a:solidFill>
+                <a:latin typeface="Times New Roman" panose="02020603050405020304" pitchFamily="18" charset="0"/>
+                <a:cs typeface="Times New Roman" panose="02020603050405020304" pitchFamily="18" charset="0"/>
+              </a:rPr>
+              <a:t>hello</a:t>
+            </a:r>
+            <a:r>
+              <a:rPr lang="en-US" sz="1600" dirty="0">
+                <a:latin typeface="Times New Roman" panose="02020603050405020304" pitchFamily="18" charset="0"/>
+                <a:cs typeface="Times New Roman" panose="02020603050405020304" pitchFamily="18" charset="0"/>
+              </a:rPr>
+              <a:t>()</a:t>
+            </a:r>
+            <a:endParaRPr lang="pt-BR" sz="1600" dirty="0">
               <a:latin typeface="Times New Roman" panose="02020603050405020304" pitchFamily="18" charset="0"/>
               <a:cs typeface="Times New Roman" panose="02020603050405020304" pitchFamily="18" charset="0"/>
             </a:endParaRPr>
           </a:p>
-          <a:p>
-            <a:pPr marL="0" indent="0" algn="just">
-              <a:buNone/>
-            </a:pPr>
-            <a:r>
-              <a:rPr lang="pt-BR" sz="2400" dirty="0">
-                <a:latin typeface="Times New Roman" panose="02020603050405020304" pitchFamily="18" charset="0"/>
-                <a:cs typeface="Times New Roman" panose="02020603050405020304" pitchFamily="18" charset="0"/>
-              </a:rPr>
-              <a:t>[1] URL:</a:t>
-            </a:r>
-          </a:p>
-          <a:p>
-            <a:pPr marL="0" indent="0" algn="just">
-              <a:buNone/>
-            </a:pPr>
-            <a:r>
-              <a:rPr lang="pt-BR" sz="2400" dirty="0">
-                <a:latin typeface="Times New Roman" panose="02020603050405020304" pitchFamily="18" charset="0"/>
-                <a:cs typeface="Times New Roman" panose="02020603050405020304" pitchFamily="18" charset="0"/>
-              </a:rPr>
-              <a:t> </a:t>
-            </a:r>
-            <a:r>
-              <a:rPr lang="pt-BR" sz="2400" dirty="0">
-                <a:latin typeface="Times New Roman" panose="02020603050405020304" pitchFamily="18" charset="0"/>
-                <a:cs typeface="Times New Roman" panose="02020603050405020304" pitchFamily="18" charset="0"/>
-                <a:hlinkClick r:id="rId3"/>
-              </a:rPr>
-              <a:t>https://www.w3schools.com/python/python_classes.asp</a:t>
-            </a:r>
-            <a:r>
-              <a:rPr lang="pt-BR" sz="2400" dirty="0">
-                <a:latin typeface="Times New Roman" panose="02020603050405020304" pitchFamily="18" charset="0"/>
-                <a:cs typeface="Times New Roman" panose="02020603050405020304" pitchFamily="18" charset="0"/>
-              </a:rPr>
-              <a:t> </a:t>
-            </a:r>
-          </a:p>
-          <a:p>
-            <a:pPr marL="0" indent="0" algn="just">
-              <a:buNone/>
-            </a:pPr>
-            <a:endParaRPr lang="pt-BR" sz="2400" dirty="0">
-              <a:latin typeface="Times New Roman" panose="02020603050405020304" pitchFamily="18" charset="0"/>
-              <a:cs typeface="Times New Roman" panose="02020603050405020304" pitchFamily="18" charset="0"/>
-            </a:endParaRPr>
-          </a:p>
-          <a:p>
-            <a:pPr marL="0" indent="0" algn="just">
-              <a:buNone/>
-            </a:pPr>
-            <a:r>
-              <a:rPr lang="pt-BR" sz="2400" dirty="0">
-                <a:latin typeface="Times New Roman" panose="02020603050405020304" pitchFamily="18" charset="0"/>
-                <a:cs typeface="Times New Roman" panose="02020603050405020304" pitchFamily="18" charset="0"/>
-              </a:rPr>
-              <a:t>[2] URL : </a:t>
-            </a:r>
-            <a:r>
-              <a:rPr lang="pt-BR" sz="2400" dirty="0">
-                <a:latin typeface="Times New Roman" panose="02020603050405020304" pitchFamily="18" charset="0"/>
-                <a:cs typeface="Times New Roman" panose="02020603050405020304" pitchFamily="18" charset="0"/>
-                <a:hlinkClick r:id="rId4"/>
-              </a:rPr>
-              <a:t>https://docs.python.org/pt-br/3/tutorial/</a:t>
-            </a:r>
-            <a:endParaRPr lang="pt-BR" sz="2400" dirty="0">
-              <a:latin typeface="Times New Roman" panose="02020603050405020304" pitchFamily="18" charset="0"/>
-              <a:cs typeface="Times New Roman" panose="02020603050405020304" pitchFamily="18" charset="0"/>
-            </a:endParaRPr>
-          </a:p>
-          <a:p>
-            <a:pPr marL="0" indent="0" algn="just">
-              <a:buNone/>
-            </a:pPr>
-            <a:endParaRPr lang="pt-BR" sz="2400" dirty="0">
-              <a:latin typeface="Times New Roman" panose="02020603050405020304" pitchFamily="18" charset="0"/>
-              <a:cs typeface="Times New Roman" panose="02020603050405020304" pitchFamily="18" charset="0"/>
-            </a:endParaRPr>
-          </a:p>
-          <a:p>
-            <a:pPr marL="0" indent="0" algn="just">
-              <a:buNone/>
-            </a:pPr>
-            <a:endParaRPr lang="pt-BR" sz="2400" dirty="0">
-              <a:latin typeface="Times New Roman" panose="02020603050405020304" pitchFamily="18" charset="0"/>
-              <a:cs typeface="Times New Roman" panose="02020603050405020304" pitchFamily="18" charset="0"/>
-            </a:endParaRPr>
-          </a:p>
-          <a:p>
-            <a:pPr marL="0" indent="0" algn="just">
-              <a:buNone/>
-            </a:pPr>
-            <a:endParaRPr lang="pt-BR" sz="2400" dirty="0">
-              <a:latin typeface="Times New Roman" panose="02020603050405020304" pitchFamily="18" charset="0"/>
-              <a:cs typeface="Times New Roman" panose="02020603050405020304" pitchFamily="18" charset="0"/>
-            </a:endParaRPr>
-          </a:p>
-          <a:p>
-            <a:pPr marL="0" indent="0" algn="just">
-              <a:buNone/>
-            </a:pPr>
-            <a:endParaRPr lang="pt-BR" sz="2400" dirty="0">
-              <a:latin typeface="Times New Roman" panose="02020603050405020304" pitchFamily="18" charset="0"/>
-              <a:cs typeface="Times New Roman" panose="02020603050405020304" pitchFamily="18" charset="0"/>
-            </a:endParaRPr>
-          </a:p>
-          <a:p>
-            <a:pPr marL="0" indent="0" algn="just">
-              <a:buNone/>
-            </a:pPr>
-            <a:endParaRPr lang="pt-BR" sz="2400" dirty="0">
-              <a:latin typeface="Calibri" panose="020F0502020204030204" pitchFamily="34" charset="0"/>
-            </a:endParaRPr>
-          </a:p>
         </p:txBody>
       </p:sp>
     </p:spTree>
     <p:extLst>
       <p:ext uri="{BB962C8B-B14F-4D97-AF65-F5344CB8AC3E}">
-        <p14:creationId xmlns:p14="http://schemas.microsoft.com/office/powerpoint/2010/main" val="2747596967"/>
+        <p14:creationId xmlns:p14="http://schemas.microsoft.com/office/powerpoint/2010/main" val="3350536174"/>
       </p:ext>
     </p:extLst>
   </p:cSld>
@@ -14812,7 +14928,7 @@
                   <a:srgbClr val="0070C0"/>
                 </a:solidFill>
               </a:rPr>
-              <a:t>Aprenda</a:t>
+              <a:t>Leitura</a:t>
             </a:r>
             <a:r>
               <a:rPr lang="en-US" b="1" dirty="0">
@@ -14820,8 +14936,21 @@
                   <a:srgbClr val="0070C0"/>
                 </a:solidFill>
               </a:rPr>
-              <a:t>+</a:t>
-            </a:r>
+              <a:t> </a:t>
+            </a:r>
+            <a:r>
+              <a:rPr lang="en-US" b="1" dirty="0" err="1">
+                <a:solidFill>
+                  <a:srgbClr val="0070C0"/>
+                </a:solidFill>
+              </a:rPr>
+              <a:t>Específica</a:t>
+            </a:r>
+            <a:endParaRPr lang="en-US" b="1" dirty="0">
+              <a:solidFill>
+                <a:srgbClr val="0070C0"/>
+              </a:solidFill>
+            </a:endParaRPr>
           </a:p>
         </p:txBody>
       </p:sp>
@@ -14837,8 +14966,8 @@
         </p:nvSpPr>
         <p:spPr>
           <a:xfrm>
-            <a:off x="142865" y="1200151"/>
-            <a:ext cx="8865056" cy="3394472"/>
+            <a:off x="142865" y="1200150"/>
+            <a:ext cx="8865056" cy="3867149"/>
           </a:xfrm>
         </p:spPr>
         <p:txBody>
@@ -14850,7 +14979,21 @@
             <a:pPr marL="0" indent="0" algn="just">
               <a:buNone/>
             </a:pPr>
-            <a:endParaRPr lang="pt-BR" sz="2000" dirty="0">
+            <a:r>
+              <a:rPr lang="pt-BR" sz="2400" dirty="0">
+                <a:latin typeface="Times New Roman" panose="02020603050405020304" pitchFamily="18" charset="0"/>
+                <a:cs typeface="Times New Roman" panose="02020603050405020304" pitchFamily="18" charset="0"/>
+              </a:rPr>
+              <a:t>-- </a:t>
+            </a:r>
+            <a:r>
+              <a:rPr lang="pt-BR" sz="2400" b="1" dirty="0">
+                <a:latin typeface="Times New Roman" panose="02020603050405020304" pitchFamily="18" charset="0"/>
+                <a:cs typeface="Times New Roman" panose="02020603050405020304" pitchFamily="18" charset="0"/>
+              </a:rPr>
+              <a:t>Classe/Herança/Polimorfismo</a:t>
+            </a:r>
+            <a:endParaRPr lang="pt-BR" sz="2400" dirty="0">
               <a:latin typeface="Times New Roman" panose="02020603050405020304" pitchFamily="18" charset="0"/>
               <a:cs typeface="Times New Roman" panose="02020603050405020304" pitchFamily="18" charset="0"/>
             </a:endParaRPr>
@@ -14860,7 +15003,7 @@
               <a:buNone/>
             </a:pPr>
             <a:r>
-              <a:rPr lang="pt-BR" sz="2000" dirty="0">
+              <a:rPr lang="pt-BR" sz="2400" dirty="0">
                 <a:latin typeface="Times New Roman" panose="02020603050405020304" pitchFamily="18" charset="0"/>
                 <a:cs typeface="Times New Roman" panose="02020603050405020304" pitchFamily="18" charset="0"/>
               </a:rPr>
@@ -14872,21 +15015,47 @@
               <a:buNone/>
             </a:pPr>
             <a:r>
-              <a:rPr lang="pt-BR" sz="2000" dirty="0">
+              <a:rPr lang="pt-BR" sz="2400" dirty="0">
                 <a:latin typeface="Times New Roman" panose="02020603050405020304" pitchFamily="18" charset="0"/>
                 <a:cs typeface="Times New Roman" panose="02020603050405020304" pitchFamily="18" charset="0"/>
               </a:rPr>
               <a:t> </a:t>
             </a:r>
             <a:r>
-              <a:rPr lang="pt-BR" sz="2000" dirty="0">
+              <a:rPr lang="pt-BR" sz="2400" dirty="0">
                 <a:latin typeface="Times New Roman" panose="02020603050405020304" pitchFamily="18" charset="0"/>
                 <a:cs typeface="Times New Roman" panose="02020603050405020304" pitchFamily="18" charset="0"/>
                 <a:hlinkClick r:id="rId3"/>
               </a:rPr>
-              <a:t>https://www.youtube.com/watch?v=Xo1oCx6hqG4/</a:t>
-            </a:r>
-            <a:endParaRPr lang="pt-BR" sz="2000" dirty="0">
+              <a:t>https://www.w3schools.com/python/python_classes.asp</a:t>
+            </a:r>
+            <a:r>
+              <a:rPr lang="pt-BR" sz="2400" dirty="0">
+                <a:latin typeface="Times New Roman" panose="02020603050405020304" pitchFamily="18" charset="0"/>
+                <a:cs typeface="Times New Roman" panose="02020603050405020304" pitchFamily="18" charset="0"/>
+              </a:rPr>
+              <a:t> </a:t>
+            </a:r>
+          </a:p>
+          <a:p>
+            <a:pPr marL="0" indent="0" algn="just">
+              <a:buNone/>
+            </a:pPr>
+            <a:r>
+              <a:rPr lang="pt-BR" sz="2400" dirty="0">
+                <a:latin typeface="Times New Roman" panose="02020603050405020304" pitchFamily="18" charset="0"/>
+                <a:cs typeface="Times New Roman" panose="02020603050405020304" pitchFamily="18" charset="0"/>
+              </a:rPr>
+              <a:t>-- </a:t>
+            </a:r>
+            <a:r>
+              <a:rPr lang="pt-BR" sz="2400" b="1" dirty="0">
+                <a:latin typeface="Times New Roman" panose="02020603050405020304" pitchFamily="18" charset="0"/>
+                <a:cs typeface="Times New Roman" panose="02020603050405020304" pitchFamily="18" charset="0"/>
+              </a:rPr>
+              <a:t>OO</a:t>
+            </a:r>
+            <a:endParaRPr lang="pt-BR" sz="2400" dirty="0">
               <a:latin typeface="Times New Roman" panose="02020603050405020304" pitchFamily="18" charset="0"/>
               <a:cs typeface="Times New Roman" panose="02020603050405020304" pitchFamily="18" charset="0"/>
             </a:endParaRPr>
@@ -14895,7 +15064,22 @@
             <a:pPr marL="0" indent="0" algn="just">
               <a:buNone/>
             </a:pPr>
-            <a:endParaRPr lang="pt-BR" sz="2000" dirty="0">
+            <a:r>
+              <a:rPr lang="pt-BR" sz="2400" dirty="0">
+                <a:latin typeface="Times New Roman" panose="02020603050405020304" pitchFamily="18" charset="0"/>
+                <a:cs typeface="Times New Roman" panose="02020603050405020304" pitchFamily="18" charset="0"/>
+              </a:rPr>
+              <a:t>[2] URL : </a:t>
+            </a:r>
+            <a:r>
+              <a:rPr lang="pt-BR" sz="2400" dirty="0">
+                <a:latin typeface="Times New Roman" panose="02020603050405020304" pitchFamily="18" charset="0"/>
+                <a:cs typeface="Times New Roman" panose="02020603050405020304" pitchFamily="18" charset="0"/>
+                <a:hlinkClick r:id="rId4"/>
+              </a:rPr>
+              <a:t>https://docs.python.org/pt-br/3/tutorial/</a:t>
+            </a:r>
+            <a:endParaRPr lang="pt-BR" sz="2400" dirty="0">
               <a:latin typeface="Times New Roman" panose="02020603050405020304" pitchFamily="18" charset="0"/>
               <a:cs typeface="Times New Roman" panose="02020603050405020304" pitchFamily="18" charset="0"/>
             </a:endParaRPr>
@@ -14905,11 +15089,18 @@
               <a:buNone/>
             </a:pPr>
             <a:r>
-              <a:rPr lang="pt-BR" sz="2000" dirty="0">
-                <a:latin typeface="Times New Roman" panose="02020603050405020304" pitchFamily="18" charset="0"/>
-                <a:cs typeface="Times New Roman" panose="02020603050405020304" pitchFamily="18" charset="0"/>
-              </a:rPr>
-              <a:t>[2] URL:</a:t>
+              <a:rPr lang="pt-BR" sz="2400" dirty="0">
+                <a:latin typeface="Times New Roman" panose="02020603050405020304" pitchFamily="18" charset="0"/>
+                <a:cs typeface="Times New Roman" panose="02020603050405020304" pitchFamily="18" charset="0"/>
+              </a:rPr>
+              <a:t>- </a:t>
+            </a:r>
+            <a:r>
+              <a:rPr lang="pt-BR" sz="2400" b="1" dirty="0">
+                <a:latin typeface="Times New Roman" panose="02020603050405020304" pitchFamily="18" charset="0"/>
+                <a:cs typeface="Times New Roman" panose="02020603050405020304" pitchFamily="18" charset="0"/>
+              </a:rPr>
+              <a:t>Polimorfismo</a:t>
             </a:r>
           </a:p>
           <a:p>
@@ -14917,54 +15108,28 @@
               <a:buNone/>
             </a:pPr>
             <a:r>
-              <a:rPr lang="pt-BR" sz="2000" dirty="0">
-                <a:latin typeface="Times New Roman" panose="02020603050405020304" pitchFamily="18" charset="0"/>
-                <a:cs typeface="Times New Roman" panose="02020603050405020304" pitchFamily="18" charset="0"/>
-              </a:rPr>
-              <a:t> </a:t>
-            </a:r>
-            <a:r>
-              <a:rPr lang="pt-BR" sz="2000" dirty="0">
-                <a:solidFill>
-                  <a:schemeClr val="tx1"/>
-                </a:solidFill>
-                <a:latin typeface="Times New Roman" panose="02020603050405020304" pitchFamily="18" charset="0"/>
-                <a:cs typeface="Times New Roman" panose="02020603050405020304" pitchFamily="18" charset="0"/>
-                <a:hlinkClick r:id="rId4"/>
-              </a:rPr>
-              <a:t>https://algoritmosempython.com.br/cursos/programacao-python/encapsulamento/</a:t>
-            </a:r>
-            <a:endParaRPr lang="pt-BR" sz="2000" dirty="0">
-              <a:solidFill>
-                <a:schemeClr val="tx1"/>
-              </a:solidFill>
-              <a:latin typeface="Times New Roman" panose="02020603050405020304" pitchFamily="18" charset="0"/>
-              <a:cs typeface="Times New Roman" panose="02020603050405020304" pitchFamily="18" charset="0"/>
-            </a:endParaRPr>
-          </a:p>
-          <a:p>
-            <a:pPr marL="0" indent="0" algn="just">
-              <a:buNone/>
-            </a:pPr>
-            <a:endParaRPr lang="pt-BR" sz="2000" dirty="0">
-              <a:latin typeface="Times New Roman" panose="02020603050405020304" pitchFamily="18" charset="0"/>
-              <a:cs typeface="Times New Roman" panose="02020603050405020304" pitchFamily="18" charset="0"/>
-            </a:endParaRPr>
-          </a:p>
-          <a:p>
-            <a:pPr marL="0" indent="0" algn="just">
-              <a:buNone/>
-            </a:pPr>
-            <a:endParaRPr lang="pt-BR" sz="2000" dirty="0">
-              <a:latin typeface="Times New Roman" panose="02020603050405020304" pitchFamily="18" charset="0"/>
-              <a:cs typeface="Times New Roman" panose="02020603050405020304" pitchFamily="18" charset="0"/>
-            </a:endParaRPr>
-          </a:p>
-          <a:p>
-            <a:pPr marL="0" indent="0" algn="just">
-              <a:buNone/>
-            </a:pPr>
-            <a:endParaRPr lang="pt-BR" sz="2000" dirty="0">
+              <a:rPr lang="pt-BR" sz="2400" dirty="0">
+                <a:latin typeface="Times New Roman" panose="02020603050405020304" pitchFamily="18" charset="0"/>
+                <a:cs typeface="Times New Roman" panose="02020603050405020304" pitchFamily="18" charset="0"/>
+              </a:rPr>
+              <a:t>[3] URL: </a:t>
+            </a:r>
+            <a:r>
+              <a:rPr lang="pt-BR" sz="2400" dirty="0">
+                <a:latin typeface="Times New Roman" panose="02020603050405020304" pitchFamily="18" charset="0"/>
+                <a:cs typeface="Times New Roman" panose="02020603050405020304" pitchFamily="18" charset="0"/>
+                <a:hlinkClick r:id="rId5"/>
+              </a:rPr>
+              <a:t>https://materialpublic.imd.ufrn.br/curso/disciplina/2/8</a:t>
+            </a:r>
+            <a:r>
+              <a:rPr lang="pt-BR" sz="2400" dirty="0">
+                <a:latin typeface="Times New Roman" panose="02020603050405020304" pitchFamily="18" charset="0"/>
+                <a:cs typeface="Times New Roman" panose="02020603050405020304" pitchFamily="18" charset="0"/>
+              </a:rPr>
+              <a:t>  </a:t>
+            </a:r>
+            <a:endParaRPr lang="pt-BR" sz="2400" dirty="0">
               <a:latin typeface="Calibri" panose="020F0502020204030204" pitchFamily="34" charset="0"/>
             </a:endParaRPr>
           </a:p>
@@ -14973,7 +15138,7 @@
     </p:spTree>
     <p:extLst>
       <p:ext uri="{BB962C8B-B14F-4D97-AF65-F5344CB8AC3E}">
-        <p14:creationId xmlns:p14="http://schemas.microsoft.com/office/powerpoint/2010/main" val="3680270425"/>
+        <p14:creationId xmlns:p14="http://schemas.microsoft.com/office/powerpoint/2010/main" val="1474052100"/>
       </p:ext>
     </p:extLst>
   </p:cSld>
@@ -15024,7 +15189,7 @@
                   <a:srgbClr val="0070C0"/>
                 </a:solidFill>
               </a:rPr>
-              <a:t>Dinâmica</a:t>
+              <a:t>Aprenda</a:t>
             </a:r>
             <a:r>
               <a:rPr lang="en-US" b="1" dirty="0">
@@ -15032,21 +15197,8 @@
                   <a:srgbClr val="0070C0"/>
                 </a:solidFill>
               </a:rPr>
-              <a:t>/</a:t>
-            </a:r>
-            <a:r>
-              <a:rPr lang="en-US" b="1" dirty="0" err="1">
-                <a:solidFill>
-                  <a:srgbClr val="0070C0"/>
-                </a:solidFill>
-              </a:rPr>
-              <a:t>Atividades</a:t>
-            </a:r>
-            <a:endParaRPr lang="en-US" b="1" dirty="0">
-              <a:solidFill>
-                <a:srgbClr val="0070C0"/>
-              </a:solidFill>
-            </a:endParaRPr>
+              <a:t>+</a:t>
+            </a:r>
           </a:p>
         </p:txBody>
       </p:sp>
@@ -15062,8 +15214,8 @@
         </p:nvSpPr>
         <p:spPr>
           <a:xfrm>
-            <a:off x="139472" y="1063230"/>
-            <a:ext cx="8865056" cy="3606305"/>
+            <a:off x="142865" y="1200151"/>
+            <a:ext cx="8865056" cy="3394472"/>
           </a:xfrm>
         </p:spPr>
         <p:txBody>
@@ -15072,36 +15224,133 @@
           </a:bodyPr>
           <a:lstStyle/>
           <a:p>
-            <a:pPr algn="just">
-              <a:buFontTx/>
-              <a:buChar char="-"/>
+            <a:pPr marL="0" indent="0" algn="just">
+              <a:buNone/>
             </a:pPr>
-            <a:r>
-              <a:rPr lang="pt-BR" dirty="0">
-                <a:latin typeface="Times New Roman" panose="02020603050405020304" pitchFamily="18" charset="0"/>
-                <a:cs typeface="Times New Roman" panose="02020603050405020304" pitchFamily="18" charset="0"/>
-              </a:rPr>
-              <a:t>Exercícios de Fixação</a:t>
-            </a:r>
+            <a:endParaRPr lang="pt-BR" sz="2000" dirty="0">
+              <a:latin typeface="Times New Roman" panose="02020603050405020304" pitchFamily="18" charset="0"/>
+              <a:cs typeface="Times New Roman" panose="02020603050405020304" pitchFamily="18" charset="0"/>
+            </a:endParaRPr>
           </a:p>
           <a:p>
             <a:pPr marL="0" indent="0" algn="just">
               <a:buNone/>
             </a:pPr>
             <a:r>
-              <a:rPr lang="pt-BR" dirty="0">
-                <a:latin typeface="Times New Roman" panose="02020603050405020304" pitchFamily="18" charset="0"/>
-                <a:cs typeface="Times New Roman" panose="02020603050405020304" pitchFamily="18" charset="0"/>
-              </a:rPr>
-              <a:t>	Desafios em Sala de Aula.</a:t>
-            </a:r>
+              <a:rPr lang="pt-BR" sz="2000" dirty="0">
+                <a:latin typeface="Times New Roman" panose="02020603050405020304" pitchFamily="18" charset="0"/>
+                <a:cs typeface="Times New Roman" panose="02020603050405020304" pitchFamily="18" charset="0"/>
+              </a:rPr>
+              <a:t>[1] URL:</a:t>
+            </a:r>
+          </a:p>
+          <a:p>
+            <a:pPr marL="0" indent="0" algn="just">
+              <a:buNone/>
+            </a:pPr>
+            <a:r>
+              <a:rPr lang="pt-BR" sz="2000" dirty="0">
+                <a:latin typeface="Times New Roman" panose="02020603050405020304" pitchFamily="18" charset="0"/>
+                <a:cs typeface="Times New Roman" panose="02020603050405020304" pitchFamily="18" charset="0"/>
+              </a:rPr>
+              <a:t> </a:t>
+            </a:r>
+            <a:r>
+              <a:rPr lang="pt-BR" sz="2000" dirty="0">
+                <a:latin typeface="Times New Roman" panose="02020603050405020304" pitchFamily="18" charset="0"/>
+                <a:cs typeface="Times New Roman" panose="02020603050405020304" pitchFamily="18" charset="0"/>
+                <a:hlinkClick r:id="rId3"/>
+              </a:rPr>
+              <a:t>https://www.youtube.com/watch?v=Xo1oCx6hqG4/</a:t>
+            </a:r>
+            <a:endParaRPr lang="pt-BR" sz="2000" dirty="0">
+              <a:latin typeface="Times New Roman" panose="02020603050405020304" pitchFamily="18" charset="0"/>
+              <a:cs typeface="Times New Roman" panose="02020603050405020304" pitchFamily="18" charset="0"/>
+            </a:endParaRPr>
+          </a:p>
+          <a:p>
+            <a:pPr marL="0" indent="0" algn="just">
+              <a:buNone/>
+            </a:pPr>
+            <a:endParaRPr lang="pt-BR" sz="2000" dirty="0">
+              <a:latin typeface="Times New Roman" panose="02020603050405020304" pitchFamily="18" charset="0"/>
+              <a:cs typeface="Times New Roman" panose="02020603050405020304" pitchFamily="18" charset="0"/>
+            </a:endParaRPr>
+          </a:p>
+          <a:p>
+            <a:pPr marL="0" indent="0" algn="just">
+              <a:buNone/>
+            </a:pPr>
+            <a:r>
+              <a:rPr lang="pt-BR" sz="2000" dirty="0">
+                <a:latin typeface="Times New Roman" panose="02020603050405020304" pitchFamily="18" charset="0"/>
+                <a:cs typeface="Times New Roman" panose="02020603050405020304" pitchFamily="18" charset="0"/>
+              </a:rPr>
+              <a:t>[2] URL:</a:t>
+            </a:r>
+          </a:p>
+          <a:p>
+            <a:pPr marL="0" indent="0" algn="just">
+              <a:buNone/>
+            </a:pPr>
+            <a:r>
+              <a:rPr lang="pt-BR" sz="2000" dirty="0">
+                <a:latin typeface="Times New Roman" panose="02020603050405020304" pitchFamily="18" charset="0"/>
+                <a:cs typeface="Times New Roman" panose="02020603050405020304" pitchFamily="18" charset="0"/>
+              </a:rPr>
+              <a:t> </a:t>
+            </a:r>
+            <a:r>
+              <a:rPr lang="pt-BR" sz="2000" dirty="0">
+                <a:solidFill>
+                  <a:schemeClr val="tx1"/>
+                </a:solidFill>
+                <a:latin typeface="Times New Roman" panose="02020603050405020304" pitchFamily="18" charset="0"/>
+                <a:cs typeface="Times New Roman" panose="02020603050405020304" pitchFamily="18" charset="0"/>
+                <a:hlinkClick r:id="rId4"/>
+              </a:rPr>
+              <a:t>https://algoritmosempython.com.br/cursos/programacao-python/encapsulamento/</a:t>
+            </a:r>
+            <a:endParaRPr lang="pt-BR" sz="2000" dirty="0">
+              <a:solidFill>
+                <a:schemeClr val="tx1"/>
+              </a:solidFill>
+              <a:latin typeface="Times New Roman" panose="02020603050405020304" pitchFamily="18" charset="0"/>
+              <a:cs typeface="Times New Roman" panose="02020603050405020304" pitchFamily="18" charset="0"/>
+            </a:endParaRPr>
+          </a:p>
+          <a:p>
+            <a:pPr marL="0" indent="0" algn="just">
+              <a:buNone/>
+            </a:pPr>
+            <a:endParaRPr lang="pt-BR" sz="2000" dirty="0">
+              <a:latin typeface="Times New Roman" panose="02020603050405020304" pitchFamily="18" charset="0"/>
+              <a:cs typeface="Times New Roman" panose="02020603050405020304" pitchFamily="18" charset="0"/>
+            </a:endParaRPr>
+          </a:p>
+          <a:p>
+            <a:pPr marL="0" indent="0" algn="just">
+              <a:buNone/>
+            </a:pPr>
+            <a:endParaRPr lang="pt-BR" sz="2000" dirty="0">
+              <a:latin typeface="Times New Roman" panose="02020603050405020304" pitchFamily="18" charset="0"/>
+              <a:cs typeface="Times New Roman" panose="02020603050405020304" pitchFamily="18" charset="0"/>
+            </a:endParaRPr>
+          </a:p>
+          <a:p>
+            <a:pPr marL="0" indent="0" algn="just">
+              <a:buNone/>
+            </a:pPr>
+            <a:endParaRPr lang="pt-BR" sz="2000" dirty="0">
+              <a:latin typeface="Calibri" panose="020F0502020204030204" pitchFamily="34" charset="0"/>
+            </a:endParaRPr>
           </a:p>
         </p:txBody>
       </p:sp>
     </p:spTree>
     <p:extLst>
       <p:ext uri="{BB962C8B-B14F-4D97-AF65-F5344CB8AC3E}">
-        <p14:creationId xmlns:p14="http://schemas.microsoft.com/office/powerpoint/2010/main" val="2470652989"/>
+        <p14:creationId xmlns:p14="http://schemas.microsoft.com/office/powerpoint/2010/main" val="3680270425"/>
       </p:ext>
     </p:extLst>
   </p:cSld>
@@ -15152,6 +15401,134 @@
                   <a:srgbClr val="0070C0"/>
                 </a:solidFill>
               </a:rPr>
+              <a:t>Dinâmica</a:t>
+            </a:r>
+            <a:r>
+              <a:rPr lang="en-US" b="1" dirty="0">
+                <a:solidFill>
+                  <a:srgbClr val="0070C0"/>
+                </a:solidFill>
+              </a:rPr>
+              <a:t>/</a:t>
+            </a:r>
+            <a:r>
+              <a:rPr lang="en-US" b="1" dirty="0" err="1">
+                <a:solidFill>
+                  <a:srgbClr val="0070C0"/>
+                </a:solidFill>
+              </a:rPr>
+              <a:t>Atividades</a:t>
+            </a:r>
+            <a:endParaRPr lang="en-US" b="1" dirty="0">
+              <a:solidFill>
+                <a:srgbClr val="0070C0"/>
+              </a:solidFill>
+            </a:endParaRPr>
+          </a:p>
+        </p:txBody>
+      </p:sp>
+      <p:sp>
+        <p:nvSpPr>
+          <p:cNvPr id="8" name="Text Placeholder 2"/>
+          <p:cNvSpPr>
+            <a:spLocks noGrp="1"/>
+          </p:cNvSpPr>
+          <p:nvPr>
+            <p:ph type="body" sz="half" idx="1"/>
+          </p:nvPr>
+        </p:nvSpPr>
+        <p:spPr>
+          <a:xfrm>
+            <a:off x="139472" y="1063230"/>
+            <a:ext cx="8865056" cy="3606305"/>
+          </a:xfrm>
+        </p:spPr>
+        <p:txBody>
+          <a:bodyPr>
+            <a:noAutofit/>
+          </a:bodyPr>
+          <a:lstStyle/>
+          <a:p>
+            <a:pPr algn="just">
+              <a:buFontTx/>
+              <a:buChar char="-"/>
+            </a:pPr>
+            <a:r>
+              <a:rPr lang="pt-BR" dirty="0">
+                <a:latin typeface="Times New Roman" panose="02020603050405020304" pitchFamily="18" charset="0"/>
+                <a:cs typeface="Times New Roman" panose="02020603050405020304" pitchFamily="18" charset="0"/>
+              </a:rPr>
+              <a:t>Exercícios de Fixação</a:t>
+            </a:r>
+          </a:p>
+          <a:p>
+            <a:pPr marL="0" indent="0" algn="just">
+              <a:buNone/>
+            </a:pPr>
+            <a:r>
+              <a:rPr lang="pt-BR" dirty="0">
+                <a:latin typeface="Times New Roman" panose="02020603050405020304" pitchFamily="18" charset="0"/>
+                <a:cs typeface="Times New Roman" panose="02020603050405020304" pitchFamily="18" charset="0"/>
+              </a:rPr>
+              <a:t>	Desafios em Sala de Aula.</a:t>
+            </a:r>
+          </a:p>
+        </p:txBody>
+      </p:sp>
+    </p:spTree>
+    <p:extLst>
+      <p:ext uri="{BB962C8B-B14F-4D97-AF65-F5344CB8AC3E}">
+        <p14:creationId xmlns:p14="http://schemas.microsoft.com/office/powerpoint/2010/main" val="2470652989"/>
+      </p:ext>
+    </p:extLst>
+  </p:cSld>
+  <p:clrMapOvr>
+    <a:masterClrMapping/>
+  </p:clrMapOvr>
+  <p:transition spd="med"/>
+</p:sld>
+</file>
+
+<file path=ppt/slides/slide33.xml><?xml version="1.0" encoding="utf-8"?>
+<p:sld xmlns:a="http://schemas.openxmlformats.org/drawingml/2006/main" xmlns:r="http://schemas.openxmlformats.org/officeDocument/2006/relationships" xmlns:p="http://schemas.openxmlformats.org/presentationml/2006/main">
+  <p:cSld>
+    <p:spTree>
+      <p:nvGrpSpPr>
+        <p:cNvPr id="1" name=""/>
+        <p:cNvGrpSpPr/>
+        <p:nvPr/>
+      </p:nvGrpSpPr>
+      <p:grpSpPr>
+        <a:xfrm>
+          <a:off x="0" y="0"/>
+          <a:ext cx="0" cy="0"/>
+          <a:chOff x="0" y="0"/>
+          <a:chExt cx="0" cy="0"/>
+        </a:xfrm>
+      </p:grpSpPr>
+      <p:sp>
+        <p:nvSpPr>
+          <p:cNvPr id="6" name="Title 1"/>
+          <p:cNvSpPr>
+            <a:spLocks noGrp="1"/>
+          </p:cNvSpPr>
+          <p:nvPr>
+            <p:ph type="title"/>
+          </p:nvPr>
+        </p:nvSpPr>
+        <p:spPr/>
+        <p:txBody>
+          <a:bodyPr>
+            <a:normAutofit/>
+          </a:bodyPr>
+          <a:lstStyle/>
+          <a:p>
+            <a:r>
+              <a:rPr lang="en-US" b="1" dirty="0" err="1">
+                <a:solidFill>
+                  <a:srgbClr val="0070C0"/>
+                </a:solidFill>
+              </a:rPr>
               <a:t>Referências</a:t>
             </a:r>
             <a:r>
@@ -15280,7 +15657,7 @@
 </p:sld>
 </file>
 
-<file path=ppt/slides/slide33.xml><?xml version="1.0" encoding="utf-8"?>
+<file path=ppt/slides/slide34.xml><?xml version="1.0" encoding="utf-8"?>
 <p:sld xmlns:a="http://schemas.openxmlformats.org/drawingml/2006/main" xmlns:r="http://schemas.openxmlformats.org/officeDocument/2006/relationships" xmlns:p="http://schemas.openxmlformats.org/presentationml/2006/main">
   <p:cSld>
     <p:spTree>

</xml_diff>